<commit_message>
Novos slides sobre Garbage Collector.
</commit_message>
<xml_diff>
--- a/2-Java-Programmer-Modulo-II/11.Capitulo05.pptx
+++ b/2-Java-Programmer-Modulo-II/11.Capitulo05.pptx
@@ -5,7 +5,7 @@
     <p:sldMasterId id="2147483660" r:id="rId1"/>
   </p:sldMasterIdLst>
   <p:notesMasterIdLst>
-    <p:notesMasterId r:id="rId20"/>
+    <p:notesMasterId r:id="rId22"/>
   </p:notesMasterIdLst>
   <p:sldIdLst>
     <p:sldId id="256" r:id="rId2"/>
@@ -22,10 +22,12 @@
     <p:sldId id="314" r:id="rId13"/>
     <p:sldId id="302" r:id="rId14"/>
     <p:sldId id="315" r:id="rId15"/>
-    <p:sldId id="303" r:id="rId16"/>
-    <p:sldId id="304" r:id="rId17"/>
-    <p:sldId id="305" r:id="rId18"/>
-    <p:sldId id="306" r:id="rId19"/>
+    <p:sldId id="318" r:id="rId16"/>
+    <p:sldId id="317" r:id="rId17"/>
+    <p:sldId id="303" r:id="rId18"/>
+    <p:sldId id="304" r:id="rId19"/>
+    <p:sldId id="305" r:id="rId20"/>
+    <p:sldId id="306" r:id="rId21"/>
   </p:sldIdLst>
   <p:sldSz cx="9144000" cy="6858000" type="screen4x3"/>
   <p:notesSz cx="6858000" cy="9144000"/>
@@ -454,7 +456,7 @@
               <a:pPr>
                 <a:defRPr/>
               </a:pPr>
-              <a:t>‹nº›</a:t>
+              <a:t>‹#›</a:t>
             </a:fld>
             <a:endParaRPr lang="pt-BR"/>
           </a:p>
@@ -1499,6 +1501,93 @@
 </p:notes>
 </file>
 
+<file path=ppt/notesSlides/notesSlide19.xml><?xml version="1.0" encoding="utf-8"?>
+<p:notes xmlns:a="http://schemas.openxmlformats.org/drawingml/2006/main" xmlns:r="http://schemas.openxmlformats.org/officeDocument/2006/relationships" xmlns:p="http://schemas.openxmlformats.org/presentationml/2006/main">
+  <p:cSld>
+    <p:spTree>
+      <p:nvGrpSpPr>
+        <p:cNvPr id="1" name=""/>
+        <p:cNvGrpSpPr/>
+        <p:nvPr/>
+      </p:nvGrpSpPr>
+      <p:grpSpPr>
+        <a:xfrm>
+          <a:off x="0" y="0"/>
+          <a:ext cx="0" cy="0"/>
+          <a:chOff x="0" y="0"/>
+          <a:chExt cx="0" cy="0"/>
+        </a:xfrm>
+      </p:grpSpPr>
+      <p:sp>
+        <p:nvSpPr>
+          <p:cNvPr id="2" name="Espaço Reservado para Imagem de Slide 1"/>
+          <p:cNvSpPr>
+            <a:spLocks noGrp="1" noRot="1" noChangeAspect="1"/>
+          </p:cNvSpPr>
+          <p:nvPr>
+            <p:ph type="sldImg"/>
+          </p:nvPr>
+        </p:nvSpPr>
+        <p:spPr/>
+      </p:sp>
+      <p:sp>
+        <p:nvSpPr>
+          <p:cNvPr id="3" name="Espaço Reservado para Anotações 2"/>
+          <p:cNvSpPr>
+            <a:spLocks noGrp="1"/>
+          </p:cNvSpPr>
+          <p:nvPr>
+            <p:ph type="body" idx="1"/>
+          </p:nvPr>
+        </p:nvSpPr>
+        <p:spPr/>
+        <p:txBody>
+          <a:bodyPr>
+            <a:normAutofit/>
+          </a:bodyPr>
+          <a:lstStyle/>
+          <a:p>
+            <a:endParaRPr lang="pt-BR"/>
+          </a:p>
+        </p:txBody>
+      </p:sp>
+      <p:sp>
+        <p:nvSpPr>
+          <p:cNvPr id="4" name="Espaço Reservado para Número de Slide 3"/>
+          <p:cNvSpPr>
+            <a:spLocks noGrp="1"/>
+          </p:cNvSpPr>
+          <p:nvPr>
+            <p:ph type="sldNum" sz="quarter" idx="10"/>
+          </p:nvPr>
+        </p:nvSpPr>
+        <p:spPr/>
+        <p:txBody>
+          <a:bodyPr/>
+          <a:lstStyle/>
+          <a:p>
+            <a:pPr>
+              <a:defRPr/>
+            </a:pPr>
+            <a:fld id="{1935B8E8-55BE-43E9-B7F8-2CD1361E8ED0}" type="slidenum">
+              <a:rPr lang="pt-BR" smtClean="0"/>
+              <a:pPr>
+                <a:defRPr/>
+              </a:pPr>
+              <a:t>19</a:t>
+            </a:fld>
+            <a:endParaRPr lang="pt-BR"/>
+          </a:p>
+        </p:txBody>
+      </p:sp>
+    </p:spTree>
+  </p:cSld>
+  <p:clrMapOvr>
+    <a:masterClrMapping/>
+  </p:clrMapOvr>
+</p:notes>
+</file>
+
 <file path=ppt/notesSlides/notesSlide2.xml><?xml version="1.0" encoding="utf-8"?>
 <p:notes xmlns:a="http://schemas.openxmlformats.org/drawingml/2006/main" xmlns:r="http://schemas.openxmlformats.org/officeDocument/2006/relationships" xmlns:p="http://schemas.openxmlformats.org/presentationml/2006/main">
   <p:cSld>
@@ -1573,6 +1662,93 @@
                 <a:defRPr/>
               </a:pPr>
               <a:t>2</a:t>
+            </a:fld>
+            <a:endParaRPr lang="pt-BR"/>
+          </a:p>
+        </p:txBody>
+      </p:sp>
+    </p:spTree>
+  </p:cSld>
+  <p:clrMapOvr>
+    <a:masterClrMapping/>
+  </p:clrMapOvr>
+</p:notes>
+</file>
+
+<file path=ppt/notesSlides/notesSlide20.xml><?xml version="1.0" encoding="utf-8"?>
+<p:notes xmlns:a="http://schemas.openxmlformats.org/drawingml/2006/main" xmlns:r="http://schemas.openxmlformats.org/officeDocument/2006/relationships" xmlns:p="http://schemas.openxmlformats.org/presentationml/2006/main">
+  <p:cSld>
+    <p:spTree>
+      <p:nvGrpSpPr>
+        <p:cNvPr id="1" name=""/>
+        <p:cNvGrpSpPr/>
+        <p:nvPr/>
+      </p:nvGrpSpPr>
+      <p:grpSpPr>
+        <a:xfrm>
+          <a:off x="0" y="0"/>
+          <a:ext cx="0" cy="0"/>
+          <a:chOff x="0" y="0"/>
+          <a:chExt cx="0" cy="0"/>
+        </a:xfrm>
+      </p:grpSpPr>
+      <p:sp>
+        <p:nvSpPr>
+          <p:cNvPr id="2" name="Espaço Reservado para Imagem de Slide 1"/>
+          <p:cNvSpPr>
+            <a:spLocks noGrp="1" noRot="1" noChangeAspect="1"/>
+          </p:cNvSpPr>
+          <p:nvPr>
+            <p:ph type="sldImg"/>
+          </p:nvPr>
+        </p:nvSpPr>
+        <p:spPr/>
+      </p:sp>
+      <p:sp>
+        <p:nvSpPr>
+          <p:cNvPr id="3" name="Espaço Reservado para Anotações 2"/>
+          <p:cNvSpPr>
+            <a:spLocks noGrp="1"/>
+          </p:cNvSpPr>
+          <p:nvPr>
+            <p:ph type="body" idx="1"/>
+          </p:nvPr>
+        </p:nvSpPr>
+        <p:spPr/>
+        <p:txBody>
+          <a:bodyPr>
+            <a:normAutofit/>
+          </a:bodyPr>
+          <a:lstStyle/>
+          <a:p>
+            <a:endParaRPr lang="pt-BR"/>
+          </a:p>
+        </p:txBody>
+      </p:sp>
+      <p:sp>
+        <p:nvSpPr>
+          <p:cNvPr id="4" name="Espaço Reservado para Número de Slide 3"/>
+          <p:cNvSpPr>
+            <a:spLocks noGrp="1"/>
+          </p:cNvSpPr>
+          <p:nvPr>
+            <p:ph type="sldNum" sz="quarter" idx="10"/>
+          </p:nvPr>
+        </p:nvSpPr>
+        <p:spPr/>
+        <p:txBody>
+          <a:bodyPr/>
+          <a:lstStyle/>
+          <a:p>
+            <a:pPr>
+              <a:defRPr/>
+            </a:pPr>
+            <a:fld id="{1935B8E8-55BE-43E9-B7F8-2CD1361E8ED0}" type="slidenum">
+              <a:rPr lang="pt-BR" smtClean="0"/>
+              <a:pPr>
+                <a:defRPr/>
+              </a:pPr>
+              <a:t>20</a:t>
             </a:fld>
             <a:endParaRPr lang="pt-BR"/>
           </a:p>
@@ -2686,7 +2862,7 @@
               <a:pPr>
                 <a:defRPr/>
               </a:pPr>
-              <a:t>‹nº›</a:t>
+              <a:t>‹#›</a:t>
             </a:fld>
             <a:endParaRPr lang="pt-BR"/>
           </a:p>
@@ -2878,7 +3054,7 @@
               <a:pPr>
                 <a:defRPr/>
               </a:pPr>
-              <a:t>‹nº›</a:t>
+              <a:t>‹#›</a:t>
             </a:fld>
             <a:endParaRPr lang="pt-BR"/>
           </a:p>
@@ -3080,7 +3256,7 @@
               <a:pPr>
                 <a:defRPr/>
               </a:pPr>
-              <a:t>‹nº›</a:t>
+              <a:t>‹#›</a:t>
             </a:fld>
             <a:endParaRPr lang="pt-BR"/>
           </a:p>
@@ -3276,7 +3452,7 @@
               <a:pPr>
                 <a:defRPr/>
               </a:pPr>
-              <a:t>‹nº›</a:t>
+              <a:t>‹#›</a:t>
             </a:fld>
             <a:endParaRPr lang="pt-BR"/>
           </a:p>
@@ -3782,7 +3958,7 @@
               <a:pPr>
                 <a:defRPr/>
               </a:pPr>
-              <a:t>‹nº›</a:t>
+              <a:t>‹#›</a:t>
             </a:fld>
             <a:endParaRPr lang="pt-BR"/>
           </a:p>
@@ -4073,7 +4249,7 @@
               <a:pPr>
                 <a:defRPr/>
               </a:pPr>
-              <a:t>‹nº›</a:t>
+              <a:t>‹#›</a:t>
             </a:fld>
             <a:endParaRPr lang="pt-BR"/>
           </a:p>
@@ -4474,7 +4650,7 @@
               <a:pPr>
                 <a:defRPr/>
               </a:pPr>
-              <a:t>‹nº›</a:t>
+              <a:t>‹#›</a:t>
             </a:fld>
             <a:endParaRPr lang="pt-BR"/>
           </a:p>
@@ -4623,7 +4799,7 @@
               <a:pPr>
                 <a:defRPr/>
               </a:pPr>
-              <a:t>‹nº›</a:t>
+              <a:t>‹#›</a:t>
             </a:fld>
             <a:endParaRPr lang="pt-BR"/>
           </a:p>
@@ -4740,7 +4916,7 @@
               <a:pPr>
                 <a:defRPr/>
               </a:pPr>
-              <a:t>‹nº›</a:t>
+              <a:t>‹#›</a:t>
             </a:fld>
             <a:endParaRPr lang="pt-BR"/>
           </a:p>
@@ -5021,7 +5197,7 @@
               <a:pPr>
                 <a:defRPr/>
               </a:pPr>
-              <a:t>‹nº›</a:t>
+              <a:t>‹#›</a:t>
             </a:fld>
             <a:endParaRPr lang="pt-BR"/>
           </a:p>
@@ -5300,7 +5476,7 @@
               <a:pPr>
                 <a:defRPr/>
               </a:pPr>
-              <a:t>‹nº›</a:t>
+              <a:t>‹#›</a:t>
             </a:fld>
             <a:endParaRPr lang="pt-BR"/>
           </a:p>
@@ -5822,7 +5998,7 @@
               <a:pPr>
                 <a:defRPr/>
               </a:pPr>
-              <a:t>‹nº›</a:t>
+              <a:t>‹#›</a:t>
             </a:fld>
             <a:endParaRPr lang="pt-BR"/>
           </a:p>
@@ -7117,15 +7293,15 @@
               </a:spcBef>
             </a:pPr>
             <a:r>
-              <a:rPr lang="pt-BR" dirty="0" smtClean="0"/>
+              <a:rPr lang="pt-BR" sz="2400" dirty="0" smtClean="0"/>
               <a:t>Um objeto é considerado um candidato para coleta – ou </a:t>
             </a:r>
             <a:r>
-              <a:rPr lang="pt-BR" i="1" dirty="0" smtClean="0"/>
+              <a:rPr lang="pt-BR" sz="2400" i="1" dirty="0" smtClean="0"/>
               <a:t>coletável</a:t>
             </a:r>
             <a:r>
-              <a:rPr lang="pt-BR" dirty="0" smtClean="0"/>
+              <a:rPr lang="pt-BR" sz="2400" dirty="0" smtClean="0"/>
               <a:t> – quando não possui mais nenhuma referência na aplicação apontando para ele.</a:t>
             </a:r>
           </a:p>
@@ -7136,10 +7312,59 @@
               </a:spcBef>
             </a:pPr>
             <a:r>
-              <a:rPr lang="pt-BR" dirty="0" smtClean="0"/>
-              <a:t>Existem tipicamente três situações em que o objeto é preparado para coleta tornando-se coletável.</a:t>
-            </a:r>
-            <a:endParaRPr lang="pt-BR" dirty="0"/>
+              <a:rPr lang="pt-BR" sz="2400" dirty="0" smtClean="0"/>
+              <a:t>Existem tipicamente três situações em que o objeto é preparado para coleta tornando-se coletável</a:t>
+            </a:r>
+            <a:r>
+              <a:rPr lang="pt-BR" sz="2400" dirty="0" smtClean="0"/>
+              <a:t>.</a:t>
+            </a:r>
+          </a:p>
+          <a:p>
+            <a:pPr lvl="1">
+              <a:spcBef>
+                <a:spcPts val="600"/>
+              </a:spcBef>
+            </a:pPr>
+            <a:endParaRPr lang="pt-BR" sz="2000" dirty="0" smtClean="0"/>
+          </a:p>
+          <a:p>
+            <a:pPr lvl="1">
+              <a:spcBef>
+                <a:spcPts val="600"/>
+              </a:spcBef>
+            </a:pPr>
+            <a:r>
+              <a:rPr lang="pt-BR" sz="2000" dirty="0" smtClean="0"/>
+              <a:t>Exclusão </a:t>
+            </a:r>
+            <a:r>
+              <a:rPr lang="pt-BR" sz="2000" dirty="0" smtClean="0"/>
+              <a:t>de referência</a:t>
+            </a:r>
+          </a:p>
+          <a:p>
+            <a:pPr lvl="1">
+              <a:spcBef>
+                <a:spcPts val="600"/>
+              </a:spcBef>
+            </a:pPr>
+            <a:r>
+              <a:rPr lang="pt-BR" sz="2000" dirty="0" smtClean="0"/>
+              <a:t>Alteração de referência</a:t>
+            </a:r>
+          </a:p>
+          <a:p>
+            <a:pPr lvl="1">
+              <a:spcBef>
+                <a:spcPts val="600"/>
+              </a:spcBef>
+            </a:pPr>
+            <a:r>
+              <a:rPr lang="pt-BR" sz="2000" dirty="0" smtClean="0"/>
+              <a:t>Isolamento de referência</a:t>
+            </a:r>
+            <a:endParaRPr lang="pt-BR" sz="2000" dirty="0"/>
           </a:p>
         </p:txBody>
       </p:sp>
@@ -7255,28 +7480,86 @@
             </a:pPr>
             <a:r>
               <a:rPr lang="pt-BR" dirty="0" smtClean="0"/>
-              <a:t>Um objeto é considerado um candidato para coleta – ou </a:t>
-            </a:r>
-            <a:r>
-              <a:rPr lang="pt-BR" i="1" dirty="0" smtClean="0"/>
-              <a:t>coletável</a:t>
-            </a:r>
-            <a:r>
-              <a:rPr lang="pt-BR" dirty="0" smtClean="0"/>
-              <a:t> – quando não possui mais nenhuma referência na aplicação apontando para ele.</a:t>
-            </a:r>
-          </a:p>
-          <a:p>
-            <a:pPr>
+              <a:t>Exclusão de referência</a:t>
+            </a:r>
+          </a:p>
+          <a:p>
+            <a:pPr lvl="1">
               <a:spcBef>
                 <a:spcPts val="3000"/>
               </a:spcBef>
             </a:pPr>
             <a:r>
               <a:rPr lang="pt-BR" dirty="0" smtClean="0"/>
-              <a:t>Existem tipicamente três situações em que o objeto é preparado para coleta tornando-se coletável.</a:t>
-            </a:r>
-            <a:endParaRPr lang="pt-BR" dirty="0"/>
+              <a:t>Ocorre quando a variável que aponta para aquele objeto perde o seu escopo ou é anulada</a:t>
+            </a:r>
+          </a:p>
+          <a:p>
+            <a:pPr lvl="1" indent="-1588">
+              <a:spcBef>
+                <a:spcPts val="0"/>
+              </a:spcBef>
+              <a:buNone/>
+            </a:pPr>
+            <a:endParaRPr lang="pt-BR" dirty="0" smtClean="0"/>
+          </a:p>
+          <a:p>
+            <a:pPr lvl="1" indent="-1588">
+              <a:spcBef>
+                <a:spcPts val="0"/>
+              </a:spcBef>
+              <a:buNone/>
+            </a:pPr>
+            <a:r>
+              <a:rPr lang="pt-BR" dirty="0" smtClean="0"/>
+              <a:t>c = new Object();</a:t>
+            </a:r>
+          </a:p>
+          <a:p>
+            <a:pPr lvl="1" indent="-1588">
+              <a:spcBef>
+                <a:spcPts val="0"/>
+              </a:spcBef>
+              <a:buNone/>
+            </a:pPr>
+            <a:r>
+              <a:rPr lang="pt-BR" dirty="0" smtClean="0"/>
+              <a:t>....</a:t>
+            </a:r>
+          </a:p>
+          <a:p>
+            <a:pPr lvl="1" indent="-1588">
+              <a:spcBef>
+                <a:spcPts val="0"/>
+              </a:spcBef>
+              <a:buNone/>
+            </a:pPr>
+            <a:r>
+              <a:rPr lang="pt-BR" dirty="0" smtClean="0"/>
+              <a:t>....</a:t>
+            </a:r>
+          </a:p>
+          <a:p>
+            <a:pPr lvl="1" indent="-1588">
+              <a:spcBef>
+                <a:spcPts val="0"/>
+              </a:spcBef>
+              <a:buNone/>
+            </a:pPr>
+            <a:r>
+              <a:rPr lang="pt-BR" dirty="0" smtClean="0"/>
+              <a:t>c = null;</a:t>
+            </a:r>
+            <a:endParaRPr lang="pt-BR" dirty="0" smtClean="0"/>
+          </a:p>
+          <a:p>
+            <a:pPr lvl="1" indent="-1588">
+              <a:spcBef>
+                <a:spcPts val="0"/>
+              </a:spcBef>
+              <a:buNone/>
+            </a:pPr>
+            <a:endParaRPr lang="pt-BR" dirty="0" smtClean="0"/>
           </a:p>
         </p:txBody>
       </p:sp>
@@ -7309,6 +7592,189 @@
           </a:p>
         </p:txBody>
       </p:sp>
+      <p:sp>
+        <p:nvSpPr>
+          <p:cNvPr id="5" name="Retângulo 5"/>
+          <p:cNvSpPr/>
+          <p:nvPr/>
+        </p:nvSpPr>
+        <p:spPr>
+          <a:xfrm>
+            <a:off x="6929454" y="3929066"/>
+            <a:ext cx="360040" cy="360040"/>
+          </a:xfrm>
+          <a:prstGeom prst="rect">
+            <a:avLst/>
+          </a:prstGeom>
+          <a:noFill/>
+          <a:ln w="28575">
+            <a:solidFill>
+              <a:schemeClr val="tx1"/>
+            </a:solidFill>
+          </a:ln>
+        </p:spPr>
+        <p:style>
+          <a:lnRef idx="2">
+            <a:schemeClr val="accent1">
+              <a:shade val="50000"/>
+            </a:schemeClr>
+          </a:lnRef>
+          <a:fillRef idx="1">
+            <a:schemeClr val="accent1"/>
+          </a:fillRef>
+          <a:effectRef idx="0">
+            <a:schemeClr val="accent1"/>
+          </a:effectRef>
+          <a:fontRef idx="minor">
+            <a:schemeClr val="lt1"/>
+          </a:fontRef>
+        </p:style>
+        <p:txBody>
+          <a:bodyPr rtlCol="0" anchor="ctr"/>
+          <a:lstStyle/>
+          <a:p>
+            <a:pPr algn="ctr"/>
+            <a:r>
+              <a:rPr lang="pt-BR" dirty="0" smtClean="0"/>
+              <a:t>c</a:t>
+            </a:r>
+            <a:endParaRPr lang="pt-BR" dirty="0"/>
+          </a:p>
+        </p:txBody>
+      </p:sp>
+      <p:sp>
+        <p:nvSpPr>
+          <p:cNvPr id="6" name="Retângulo de cantos arredondados 12"/>
+          <p:cNvSpPr/>
+          <p:nvPr/>
+        </p:nvSpPr>
+        <p:spPr>
+          <a:xfrm>
+            <a:off x="5857884" y="4572008"/>
+            <a:ext cx="2500330" cy="1643074"/>
+          </a:xfrm>
+          <a:prstGeom prst="roundRect">
+            <a:avLst/>
+          </a:prstGeom>
+          <a:noFill/>
+          <a:ln w="28575">
+            <a:solidFill>
+              <a:srgbClr val="FFC000"/>
+            </a:solidFill>
+          </a:ln>
+        </p:spPr>
+        <p:style>
+          <a:lnRef idx="2">
+            <a:schemeClr val="accent1">
+              <a:shade val="50000"/>
+            </a:schemeClr>
+          </a:lnRef>
+          <a:fillRef idx="1">
+            <a:schemeClr val="accent1"/>
+          </a:fillRef>
+          <a:effectRef idx="0">
+            <a:schemeClr val="accent1"/>
+          </a:effectRef>
+          <a:fontRef idx="minor">
+            <a:schemeClr val="lt1"/>
+          </a:fontRef>
+        </p:style>
+        <p:txBody>
+          <a:bodyPr rtlCol="0" anchor="ctr"/>
+          <a:lstStyle/>
+          <a:p>
+            <a:pPr algn="ctr"/>
+            <a:endParaRPr lang="pt-BR"/>
+          </a:p>
+        </p:txBody>
+      </p:sp>
+      <p:sp>
+        <p:nvSpPr>
+          <p:cNvPr id="7" name="Retângulo 13"/>
+          <p:cNvSpPr/>
+          <p:nvPr/>
+        </p:nvSpPr>
+        <p:spPr>
+          <a:xfrm>
+            <a:off x="6715140" y="5000636"/>
+            <a:ext cx="792088" cy="648072"/>
+          </a:xfrm>
+          <a:prstGeom prst="rect">
+            <a:avLst/>
+          </a:prstGeom>
+          <a:solidFill>
+            <a:srgbClr val="FFC000"/>
+          </a:solidFill>
+          <a:ln w="28575">
+            <a:solidFill>
+              <a:schemeClr val="tx1"/>
+            </a:solidFill>
+          </a:ln>
+        </p:spPr>
+        <p:style>
+          <a:lnRef idx="2">
+            <a:schemeClr val="accent1">
+              <a:shade val="50000"/>
+            </a:schemeClr>
+          </a:lnRef>
+          <a:fillRef idx="1">
+            <a:schemeClr val="accent1"/>
+          </a:fillRef>
+          <a:effectRef idx="0">
+            <a:schemeClr val="accent1"/>
+          </a:effectRef>
+          <a:fontRef idx="minor">
+            <a:schemeClr val="lt1"/>
+          </a:fontRef>
+        </p:style>
+        <p:txBody>
+          <a:bodyPr rtlCol="0" anchor="ctr"/>
+          <a:lstStyle/>
+          <a:p>
+            <a:pPr algn="ctr"/>
+            <a:endParaRPr lang="pt-BR" dirty="0"/>
+          </a:p>
+        </p:txBody>
+      </p:sp>
+      <p:cxnSp>
+        <p:nvCxnSpPr>
+          <p:cNvPr id="8" name="Conector de seta reta 53"/>
+          <p:cNvCxnSpPr>
+            <a:stCxn id="5" idx="2"/>
+            <a:endCxn id="7" idx="0"/>
+          </p:cNvCxnSpPr>
+          <p:nvPr/>
+        </p:nvCxnSpPr>
+        <p:spPr>
+          <a:xfrm rot="16200000" flipH="1">
+            <a:off x="6754564" y="4644016"/>
+            <a:ext cx="711530" cy="1710"/>
+          </a:xfrm>
+          <a:prstGeom prst="straightConnector1">
+            <a:avLst/>
+          </a:prstGeom>
+          <a:ln>
+            <a:solidFill>
+              <a:schemeClr val="tx1"/>
+            </a:solidFill>
+            <a:tailEnd type="arrow"/>
+          </a:ln>
+        </p:spPr>
+        <p:style>
+          <a:lnRef idx="1">
+            <a:schemeClr val="accent1"/>
+          </a:lnRef>
+          <a:fillRef idx="0">
+            <a:schemeClr val="accent1"/>
+          </a:fillRef>
+          <a:effectRef idx="0">
+            <a:schemeClr val="accent1"/>
+          </a:effectRef>
+          <a:fontRef idx="minor">
+            <a:schemeClr val="tx1"/>
+          </a:fontRef>
+        </p:style>
+      </p:cxnSp>
     </p:spTree>
   </p:cSld>
   <p:clrMapOvr>
@@ -7317,9 +7783,606 @@
   <p:timing>
     <p:tnLst>
       <p:par>
-        <p:cTn id="1" dur="indefinite" restart="never" nodeType="tmRoot"/>
+        <p:cTn id="1" dur="indefinite" restart="never" nodeType="tmRoot">
+          <p:childTnLst>
+            <p:seq concurrent="1" nextAc="seek">
+              <p:cTn id="2" dur="indefinite" nodeType="mainSeq">
+                <p:childTnLst>
+                  <p:par>
+                    <p:cTn id="3" fill="hold">
+                      <p:stCondLst>
+                        <p:cond delay="indefinite"/>
+                      </p:stCondLst>
+                      <p:childTnLst>
+                        <p:par>
+                          <p:cTn id="4" fill="hold">
+                            <p:stCondLst>
+                              <p:cond delay="0"/>
+                            </p:stCondLst>
+                            <p:childTnLst>
+                              <p:par>
+                                <p:cTn id="5" presetID="2" presetClass="entr" presetSubtype="4" fill="hold" nodeType="clickEffect">
+                                  <p:stCondLst>
+                                    <p:cond delay="0"/>
+                                  </p:stCondLst>
+                                  <p:childTnLst>
+                                    <p:set>
+                                      <p:cBhvr>
+                                        <p:cTn id="6" dur="1" fill="hold">
+                                          <p:stCondLst>
+                                            <p:cond delay="0"/>
+                                          </p:stCondLst>
+                                        </p:cTn>
+                                        <p:tgtEl>
+                                          <p:spTgt spid="3">
+                                            <p:txEl>
+                                              <p:pRg st="3" end="3"/>
+                                            </p:txEl>
+                                          </p:spTgt>
+                                        </p:tgtEl>
+                                        <p:attrNameLst>
+                                          <p:attrName>style.visibility</p:attrName>
+                                        </p:attrNameLst>
+                                      </p:cBhvr>
+                                      <p:to>
+                                        <p:strVal val="visible"/>
+                                      </p:to>
+                                    </p:set>
+                                    <p:anim calcmode="lin" valueType="num">
+                                      <p:cBhvr additive="base">
+                                        <p:cTn id="7" dur="500" fill="hold"/>
+                                        <p:tgtEl>
+                                          <p:spTgt spid="3">
+                                            <p:txEl>
+                                              <p:pRg st="3" end="3"/>
+                                            </p:txEl>
+                                          </p:spTgt>
+                                        </p:tgtEl>
+                                        <p:attrNameLst>
+                                          <p:attrName>ppt_x</p:attrName>
+                                        </p:attrNameLst>
+                                      </p:cBhvr>
+                                      <p:tavLst>
+                                        <p:tav tm="0">
+                                          <p:val>
+                                            <p:strVal val="#ppt_x"/>
+                                          </p:val>
+                                        </p:tav>
+                                        <p:tav tm="100000">
+                                          <p:val>
+                                            <p:strVal val="#ppt_x"/>
+                                          </p:val>
+                                        </p:tav>
+                                      </p:tavLst>
+                                    </p:anim>
+                                    <p:anim calcmode="lin" valueType="num">
+                                      <p:cBhvr additive="base">
+                                        <p:cTn id="8" dur="500" fill="hold"/>
+                                        <p:tgtEl>
+                                          <p:spTgt spid="3">
+                                            <p:txEl>
+                                              <p:pRg st="3" end="3"/>
+                                            </p:txEl>
+                                          </p:spTgt>
+                                        </p:tgtEl>
+                                        <p:attrNameLst>
+                                          <p:attrName>ppt_y</p:attrName>
+                                        </p:attrNameLst>
+                                      </p:cBhvr>
+                                      <p:tavLst>
+                                        <p:tav tm="0">
+                                          <p:val>
+                                            <p:strVal val="1+#ppt_h/2"/>
+                                          </p:val>
+                                        </p:tav>
+                                        <p:tav tm="100000">
+                                          <p:val>
+                                            <p:strVal val="#ppt_y"/>
+                                          </p:val>
+                                        </p:tav>
+                                      </p:tavLst>
+                                    </p:anim>
+                                  </p:childTnLst>
+                                </p:cTn>
+                              </p:par>
+                              <p:par>
+                                <p:cTn id="9" presetID="3" presetClass="entr" presetSubtype="10" fill="hold" grpId="0" nodeType="withEffect">
+                                  <p:stCondLst>
+                                    <p:cond delay="0"/>
+                                  </p:stCondLst>
+                                  <p:childTnLst>
+                                    <p:set>
+                                      <p:cBhvr>
+                                        <p:cTn id="10" dur="1" fill="hold">
+                                          <p:stCondLst>
+                                            <p:cond delay="0"/>
+                                          </p:stCondLst>
+                                        </p:cTn>
+                                        <p:tgtEl>
+                                          <p:spTgt spid="6"/>
+                                        </p:tgtEl>
+                                        <p:attrNameLst>
+                                          <p:attrName>style.visibility</p:attrName>
+                                        </p:attrNameLst>
+                                      </p:cBhvr>
+                                      <p:to>
+                                        <p:strVal val="visible"/>
+                                      </p:to>
+                                    </p:set>
+                                    <p:animEffect transition="in" filter="blinds(horizontal)">
+                                      <p:cBhvr>
+                                        <p:cTn id="11" dur="500"/>
+                                        <p:tgtEl>
+                                          <p:spTgt spid="6"/>
+                                        </p:tgtEl>
+                                      </p:cBhvr>
+                                    </p:animEffect>
+                                  </p:childTnLst>
+                                </p:cTn>
+                              </p:par>
+                              <p:par>
+                                <p:cTn id="12" presetID="3" presetClass="entr" presetSubtype="10" fill="hold" grpId="0" nodeType="withEffect">
+                                  <p:stCondLst>
+                                    <p:cond delay="0"/>
+                                  </p:stCondLst>
+                                  <p:childTnLst>
+                                    <p:set>
+                                      <p:cBhvr>
+                                        <p:cTn id="13" dur="1" fill="hold">
+                                          <p:stCondLst>
+                                            <p:cond delay="0"/>
+                                          </p:stCondLst>
+                                        </p:cTn>
+                                        <p:tgtEl>
+                                          <p:spTgt spid="5"/>
+                                        </p:tgtEl>
+                                        <p:attrNameLst>
+                                          <p:attrName>style.visibility</p:attrName>
+                                        </p:attrNameLst>
+                                      </p:cBhvr>
+                                      <p:to>
+                                        <p:strVal val="visible"/>
+                                      </p:to>
+                                    </p:set>
+                                    <p:animEffect transition="in" filter="blinds(horizontal)">
+                                      <p:cBhvr>
+                                        <p:cTn id="14" dur="500"/>
+                                        <p:tgtEl>
+                                          <p:spTgt spid="5"/>
+                                        </p:tgtEl>
+                                      </p:cBhvr>
+                                    </p:animEffect>
+                                  </p:childTnLst>
+                                </p:cTn>
+                              </p:par>
+                              <p:par>
+                                <p:cTn id="15" presetID="3" presetClass="entr" presetSubtype="10" fill="hold" nodeType="withEffect">
+                                  <p:stCondLst>
+                                    <p:cond delay="0"/>
+                                  </p:stCondLst>
+                                  <p:childTnLst>
+                                    <p:set>
+                                      <p:cBhvr>
+                                        <p:cTn id="16" dur="1" fill="hold">
+                                          <p:stCondLst>
+                                            <p:cond delay="0"/>
+                                          </p:stCondLst>
+                                        </p:cTn>
+                                        <p:tgtEl>
+                                          <p:spTgt spid="8"/>
+                                        </p:tgtEl>
+                                        <p:attrNameLst>
+                                          <p:attrName>style.visibility</p:attrName>
+                                        </p:attrNameLst>
+                                      </p:cBhvr>
+                                      <p:to>
+                                        <p:strVal val="visible"/>
+                                      </p:to>
+                                    </p:set>
+                                    <p:animEffect transition="in" filter="blinds(horizontal)">
+                                      <p:cBhvr>
+                                        <p:cTn id="17" dur="500"/>
+                                        <p:tgtEl>
+                                          <p:spTgt spid="8"/>
+                                        </p:tgtEl>
+                                      </p:cBhvr>
+                                    </p:animEffect>
+                                  </p:childTnLst>
+                                </p:cTn>
+                              </p:par>
+                              <p:par>
+                                <p:cTn id="18" presetID="3" presetClass="entr" presetSubtype="10" fill="hold" grpId="0" nodeType="withEffect">
+                                  <p:stCondLst>
+                                    <p:cond delay="0"/>
+                                  </p:stCondLst>
+                                  <p:childTnLst>
+                                    <p:set>
+                                      <p:cBhvr>
+                                        <p:cTn id="19" dur="1" fill="hold">
+                                          <p:stCondLst>
+                                            <p:cond delay="0"/>
+                                          </p:stCondLst>
+                                        </p:cTn>
+                                        <p:tgtEl>
+                                          <p:spTgt spid="7"/>
+                                        </p:tgtEl>
+                                        <p:attrNameLst>
+                                          <p:attrName>style.visibility</p:attrName>
+                                        </p:attrNameLst>
+                                      </p:cBhvr>
+                                      <p:to>
+                                        <p:strVal val="visible"/>
+                                      </p:to>
+                                    </p:set>
+                                    <p:animEffect transition="in" filter="blinds(horizontal)">
+                                      <p:cBhvr>
+                                        <p:cTn id="20" dur="500"/>
+                                        <p:tgtEl>
+                                          <p:spTgt spid="7"/>
+                                        </p:tgtEl>
+                                      </p:cBhvr>
+                                    </p:animEffect>
+                                  </p:childTnLst>
+                                </p:cTn>
+                              </p:par>
+                            </p:childTnLst>
+                          </p:cTn>
+                        </p:par>
+                      </p:childTnLst>
+                    </p:cTn>
+                  </p:par>
+                  <p:par>
+                    <p:cTn id="21" fill="hold">
+                      <p:stCondLst>
+                        <p:cond delay="indefinite"/>
+                      </p:stCondLst>
+                      <p:childTnLst>
+                        <p:par>
+                          <p:cTn id="22" fill="hold">
+                            <p:stCondLst>
+                              <p:cond delay="0"/>
+                            </p:stCondLst>
+                            <p:childTnLst>
+                              <p:par>
+                                <p:cTn id="23" presetID="2" presetClass="entr" presetSubtype="4" fill="hold" nodeType="clickEffect">
+                                  <p:stCondLst>
+                                    <p:cond delay="0"/>
+                                  </p:stCondLst>
+                                  <p:childTnLst>
+                                    <p:set>
+                                      <p:cBhvr>
+                                        <p:cTn id="24" dur="1" fill="hold">
+                                          <p:stCondLst>
+                                            <p:cond delay="0"/>
+                                          </p:stCondLst>
+                                        </p:cTn>
+                                        <p:tgtEl>
+                                          <p:spTgt spid="3">
+                                            <p:txEl>
+                                              <p:pRg st="4" end="4"/>
+                                            </p:txEl>
+                                          </p:spTgt>
+                                        </p:tgtEl>
+                                        <p:attrNameLst>
+                                          <p:attrName>style.visibility</p:attrName>
+                                        </p:attrNameLst>
+                                      </p:cBhvr>
+                                      <p:to>
+                                        <p:strVal val="visible"/>
+                                      </p:to>
+                                    </p:set>
+                                    <p:anim calcmode="lin" valueType="num">
+                                      <p:cBhvr additive="base">
+                                        <p:cTn id="25" dur="500" fill="hold"/>
+                                        <p:tgtEl>
+                                          <p:spTgt spid="3">
+                                            <p:txEl>
+                                              <p:pRg st="4" end="4"/>
+                                            </p:txEl>
+                                          </p:spTgt>
+                                        </p:tgtEl>
+                                        <p:attrNameLst>
+                                          <p:attrName>ppt_x</p:attrName>
+                                        </p:attrNameLst>
+                                      </p:cBhvr>
+                                      <p:tavLst>
+                                        <p:tav tm="0">
+                                          <p:val>
+                                            <p:strVal val="#ppt_x"/>
+                                          </p:val>
+                                        </p:tav>
+                                        <p:tav tm="100000">
+                                          <p:val>
+                                            <p:strVal val="#ppt_x"/>
+                                          </p:val>
+                                        </p:tav>
+                                      </p:tavLst>
+                                    </p:anim>
+                                    <p:anim calcmode="lin" valueType="num">
+                                      <p:cBhvr additive="base">
+                                        <p:cTn id="26" dur="500" fill="hold"/>
+                                        <p:tgtEl>
+                                          <p:spTgt spid="3">
+                                            <p:txEl>
+                                              <p:pRg st="4" end="4"/>
+                                            </p:txEl>
+                                          </p:spTgt>
+                                        </p:tgtEl>
+                                        <p:attrNameLst>
+                                          <p:attrName>ppt_y</p:attrName>
+                                        </p:attrNameLst>
+                                      </p:cBhvr>
+                                      <p:tavLst>
+                                        <p:tav tm="0">
+                                          <p:val>
+                                            <p:strVal val="1+#ppt_h/2"/>
+                                          </p:val>
+                                        </p:tav>
+                                        <p:tav tm="100000">
+                                          <p:val>
+                                            <p:strVal val="#ppt_y"/>
+                                          </p:val>
+                                        </p:tav>
+                                      </p:tavLst>
+                                    </p:anim>
+                                  </p:childTnLst>
+                                </p:cTn>
+                              </p:par>
+                              <p:par>
+                                <p:cTn id="27" presetID="2" presetClass="entr" presetSubtype="4" fill="hold" nodeType="withEffect">
+                                  <p:stCondLst>
+                                    <p:cond delay="0"/>
+                                  </p:stCondLst>
+                                  <p:childTnLst>
+                                    <p:set>
+                                      <p:cBhvr>
+                                        <p:cTn id="28" dur="1" fill="hold">
+                                          <p:stCondLst>
+                                            <p:cond delay="0"/>
+                                          </p:stCondLst>
+                                        </p:cTn>
+                                        <p:tgtEl>
+                                          <p:spTgt spid="3">
+                                            <p:txEl>
+                                              <p:pRg st="5" end="5"/>
+                                            </p:txEl>
+                                          </p:spTgt>
+                                        </p:tgtEl>
+                                        <p:attrNameLst>
+                                          <p:attrName>style.visibility</p:attrName>
+                                        </p:attrNameLst>
+                                      </p:cBhvr>
+                                      <p:to>
+                                        <p:strVal val="visible"/>
+                                      </p:to>
+                                    </p:set>
+                                    <p:anim calcmode="lin" valueType="num">
+                                      <p:cBhvr additive="base">
+                                        <p:cTn id="29" dur="500" fill="hold"/>
+                                        <p:tgtEl>
+                                          <p:spTgt spid="3">
+                                            <p:txEl>
+                                              <p:pRg st="5" end="5"/>
+                                            </p:txEl>
+                                          </p:spTgt>
+                                        </p:tgtEl>
+                                        <p:attrNameLst>
+                                          <p:attrName>ppt_x</p:attrName>
+                                        </p:attrNameLst>
+                                      </p:cBhvr>
+                                      <p:tavLst>
+                                        <p:tav tm="0">
+                                          <p:val>
+                                            <p:strVal val="#ppt_x"/>
+                                          </p:val>
+                                        </p:tav>
+                                        <p:tav tm="100000">
+                                          <p:val>
+                                            <p:strVal val="#ppt_x"/>
+                                          </p:val>
+                                        </p:tav>
+                                      </p:tavLst>
+                                    </p:anim>
+                                    <p:anim calcmode="lin" valueType="num">
+                                      <p:cBhvr additive="base">
+                                        <p:cTn id="30" dur="500" fill="hold"/>
+                                        <p:tgtEl>
+                                          <p:spTgt spid="3">
+                                            <p:txEl>
+                                              <p:pRg st="5" end="5"/>
+                                            </p:txEl>
+                                          </p:spTgt>
+                                        </p:tgtEl>
+                                        <p:attrNameLst>
+                                          <p:attrName>ppt_y</p:attrName>
+                                        </p:attrNameLst>
+                                      </p:cBhvr>
+                                      <p:tavLst>
+                                        <p:tav tm="0">
+                                          <p:val>
+                                            <p:strVal val="1+#ppt_h/2"/>
+                                          </p:val>
+                                        </p:tav>
+                                        <p:tav tm="100000">
+                                          <p:val>
+                                            <p:strVal val="#ppt_y"/>
+                                          </p:val>
+                                        </p:tav>
+                                      </p:tavLst>
+                                    </p:anim>
+                                  </p:childTnLst>
+                                </p:cTn>
+                              </p:par>
+                            </p:childTnLst>
+                          </p:cTn>
+                        </p:par>
+                      </p:childTnLst>
+                    </p:cTn>
+                  </p:par>
+                  <p:par>
+                    <p:cTn id="31" fill="hold">
+                      <p:stCondLst>
+                        <p:cond delay="indefinite"/>
+                      </p:stCondLst>
+                      <p:childTnLst>
+                        <p:par>
+                          <p:cTn id="32" fill="hold">
+                            <p:stCondLst>
+                              <p:cond delay="0"/>
+                            </p:stCondLst>
+                            <p:childTnLst>
+                              <p:par>
+                                <p:cTn id="33" presetID="2" presetClass="entr" presetSubtype="4" fill="hold" nodeType="clickEffect">
+                                  <p:stCondLst>
+                                    <p:cond delay="0"/>
+                                  </p:stCondLst>
+                                  <p:childTnLst>
+                                    <p:set>
+                                      <p:cBhvr>
+                                        <p:cTn id="34" dur="1" fill="hold">
+                                          <p:stCondLst>
+                                            <p:cond delay="0"/>
+                                          </p:stCondLst>
+                                        </p:cTn>
+                                        <p:tgtEl>
+                                          <p:spTgt spid="3">
+                                            <p:txEl>
+                                              <p:pRg st="6" end="6"/>
+                                            </p:txEl>
+                                          </p:spTgt>
+                                        </p:tgtEl>
+                                        <p:attrNameLst>
+                                          <p:attrName>style.visibility</p:attrName>
+                                        </p:attrNameLst>
+                                      </p:cBhvr>
+                                      <p:to>
+                                        <p:strVal val="visible"/>
+                                      </p:to>
+                                    </p:set>
+                                    <p:anim calcmode="lin" valueType="num">
+                                      <p:cBhvr additive="base">
+                                        <p:cTn id="35" dur="500" fill="hold"/>
+                                        <p:tgtEl>
+                                          <p:spTgt spid="3">
+                                            <p:txEl>
+                                              <p:pRg st="6" end="6"/>
+                                            </p:txEl>
+                                          </p:spTgt>
+                                        </p:tgtEl>
+                                        <p:attrNameLst>
+                                          <p:attrName>ppt_x</p:attrName>
+                                        </p:attrNameLst>
+                                      </p:cBhvr>
+                                      <p:tavLst>
+                                        <p:tav tm="0">
+                                          <p:val>
+                                            <p:strVal val="#ppt_x"/>
+                                          </p:val>
+                                        </p:tav>
+                                        <p:tav tm="100000">
+                                          <p:val>
+                                            <p:strVal val="#ppt_x"/>
+                                          </p:val>
+                                        </p:tav>
+                                      </p:tavLst>
+                                    </p:anim>
+                                    <p:anim calcmode="lin" valueType="num">
+                                      <p:cBhvr additive="base">
+                                        <p:cTn id="36" dur="500" fill="hold"/>
+                                        <p:tgtEl>
+                                          <p:spTgt spid="3">
+                                            <p:txEl>
+                                              <p:pRg st="6" end="6"/>
+                                            </p:txEl>
+                                          </p:spTgt>
+                                        </p:tgtEl>
+                                        <p:attrNameLst>
+                                          <p:attrName>ppt_y</p:attrName>
+                                        </p:attrNameLst>
+                                      </p:cBhvr>
+                                      <p:tavLst>
+                                        <p:tav tm="0">
+                                          <p:val>
+                                            <p:strVal val="1+#ppt_h/2"/>
+                                          </p:val>
+                                        </p:tav>
+                                        <p:tav tm="100000">
+                                          <p:val>
+                                            <p:strVal val="#ppt_y"/>
+                                          </p:val>
+                                        </p:tav>
+                                      </p:tavLst>
+                                    </p:anim>
+                                  </p:childTnLst>
+                                </p:cTn>
+                              </p:par>
+                              <p:par>
+                                <p:cTn id="37" presetID="3" presetClass="exit" presetSubtype="10" fill="hold" nodeType="withEffect">
+                                  <p:stCondLst>
+                                    <p:cond delay="0"/>
+                                  </p:stCondLst>
+                                  <p:childTnLst>
+                                    <p:animEffect transition="out" filter="blinds(horizontal)">
+                                      <p:cBhvr>
+                                        <p:cTn id="38" dur="500"/>
+                                        <p:tgtEl>
+                                          <p:spTgt spid="8"/>
+                                        </p:tgtEl>
+                                      </p:cBhvr>
+                                    </p:animEffect>
+                                    <p:set>
+                                      <p:cBhvr>
+                                        <p:cTn id="39" dur="1" fill="hold">
+                                          <p:stCondLst>
+                                            <p:cond delay="499"/>
+                                          </p:stCondLst>
+                                        </p:cTn>
+                                        <p:tgtEl>
+                                          <p:spTgt spid="8"/>
+                                        </p:tgtEl>
+                                        <p:attrNameLst>
+                                          <p:attrName>style.visibility</p:attrName>
+                                        </p:attrNameLst>
+                                      </p:cBhvr>
+                                      <p:to>
+                                        <p:strVal val="hidden"/>
+                                      </p:to>
+                                    </p:set>
+                                  </p:childTnLst>
+                                </p:cTn>
+                              </p:par>
+                            </p:childTnLst>
+                          </p:cTn>
+                        </p:par>
+                      </p:childTnLst>
+                    </p:cTn>
+                  </p:par>
+                </p:childTnLst>
+              </p:cTn>
+              <p:prevCondLst>
+                <p:cond evt="onPrev" delay="0">
+                  <p:tgtEl>
+                    <p:sldTgt/>
+                  </p:tgtEl>
+                </p:cond>
+              </p:prevCondLst>
+              <p:nextCondLst>
+                <p:cond evt="onNext" delay="0">
+                  <p:tgtEl>
+                    <p:sldTgt/>
+                  </p:tgtEl>
+                </p:cond>
+              </p:nextCondLst>
+            </p:seq>
+          </p:childTnLst>
+        </p:cTn>
       </p:par>
     </p:tnLst>
+    <p:bldLst>
+      <p:bldP spid="5" grpId="0" animBg="1"/>
+      <p:bldP spid="6" grpId="0" animBg="1"/>
+      <p:bldP spid="7" grpId="0" animBg="1"/>
+    </p:bldLst>
   </p:timing>
 </p:sld>
 </file>
@@ -7351,7 +8414,12 @@
             <p:ph type="title"/>
           </p:nvPr>
         </p:nvSpPr>
-        <p:spPr/>
+        <p:spPr>
+          <a:xfrm>
+            <a:off x="457200" y="274638"/>
+            <a:ext cx="8075240" cy="1143000"/>
+          </a:xfrm>
+        </p:spPr>
         <p:txBody>
           <a:bodyPr/>
           <a:lstStyle/>
@@ -7359,7 +8427,7 @@
             <a:pPr eaLnBrk="1" hangingPunct="1"/>
             <a:r>
               <a:rPr lang="pt-BR" dirty="0" smtClean="0"/>
-              <a:t>Obtendo dados sobre memória</a:t>
+              <a:t>Preparando o objeto para coleta</a:t>
             </a:r>
             <a:endParaRPr lang="pt-BR" dirty="0"/>
           </a:p>
@@ -7380,7 +8448,99 @@
           <a:bodyPr/>
           <a:lstStyle/>
           <a:p>
-            <a:endParaRPr lang="pt-BR"/>
+            <a:pPr>
+              <a:spcBef>
+                <a:spcPts val="3000"/>
+              </a:spcBef>
+            </a:pPr>
+            <a:r>
+              <a:rPr lang="pt-BR" dirty="0" smtClean="0"/>
+              <a:t>Alteração de referência</a:t>
+            </a:r>
+            <a:endParaRPr lang="pt-BR" dirty="0" smtClean="0"/>
+          </a:p>
+          <a:p>
+            <a:pPr lvl="1">
+              <a:spcBef>
+                <a:spcPts val="3000"/>
+              </a:spcBef>
+            </a:pPr>
+            <a:r>
+              <a:rPr lang="pt-BR" dirty="0" smtClean="0"/>
+              <a:t>Ocorre quando a variável que aponta para aquele </a:t>
+            </a:r>
+            <a:r>
+              <a:rPr lang="pt-BR" smtClean="0"/>
+              <a:t>objeto passa a apontar para um outro objeto</a:t>
+            </a:r>
+            <a:endParaRPr lang="pt-BR" dirty="0" smtClean="0"/>
+          </a:p>
+          <a:p>
+            <a:pPr lvl="1" indent="-1588">
+              <a:spcBef>
+                <a:spcPts val="0"/>
+              </a:spcBef>
+              <a:buNone/>
+            </a:pPr>
+            <a:endParaRPr lang="pt-BR" dirty="0" smtClean="0"/>
+          </a:p>
+          <a:p>
+            <a:pPr lvl="1" indent="-1588">
+              <a:spcBef>
+                <a:spcPts val="0"/>
+              </a:spcBef>
+              <a:buNone/>
+            </a:pPr>
+            <a:r>
+              <a:rPr lang="pt-BR" dirty="0" smtClean="0"/>
+              <a:t>c = new Object();</a:t>
+            </a:r>
+          </a:p>
+          <a:p>
+            <a:pPr lvl="1" indent="-1588">
+              <a:spcBef>
+                <a:spcPts val="0"/>
+              </a:spcBef>
+              <a:buNone/>
+            </a:pPr>
+            <a:r>
+              <a:rPr lang="pt-BR" dirty="0" smtClean="0"/>
+              <a:t>....</a:t>
+            </a:r>
+          </a:p>
+          <a:p>
+            <a:pPr lvl="1" indent="-1588">
+              <a:spcBef>
+                <a:spcPts val="0"/>
+              </a:spcBef>
+              <a:buNone/>
+            </a:pPr>
+            <a:r>
+              <a:rPr lang="pt-BR" dirty="0" smtClean="0"/>
+              <a:t>....</a:t>
+            </a:r>
+          </a:p>
+          <a:p>
+            <a:pPr lvl="1" indent="-1588">
+              <a:spcBef>
+                <a:spcPts val="0"/>
+              </a:spcBef>
+              <a:buNone/>
+            </a:pPr>
+            <a:r>
+              <a:rPr lang="pt-BR" dirty="0" smtClean="0"/>
+              <a:t>c = null;</a:t>
+            </a:r>
+            <a:endParaRPr lang="pt-BR" dirty="0" smtClean="0"/>
+          </a:p>
+          <a:p>
+            <a:pPr lvl="1" indent="-1588">
+              <a:spcBef>
+                <a:spcPts val="0"/>
+              </a:spcBef>
+              <a:buNone/>
+            </a:pPr>
+            <a:endParaRPr lang="pt-BR" dirty="0" smtClean="0"/>
           </a:p>
         </p:txBody>
       </p:sp>
@@ -7413,6 +8573,189 @@
           </a:p>
         </p:txBody>
       </p:sp>
+      <p:sp>
+        <p:nvSpPr>
+          <p:cNvPr id="5" name="Retângulo 5"/>
+          <p:cNvSpPr/>
+          <p:nvPr/>
+        </p:nvSpPr>
+        <p:spPr>
+          <a:xfrm>
+            <a:off x="6929454" y="3929066"/>
+            <a:ext cx="360040" cy="360040"/>
+          </a:xfrm>
+          <a:prstGeom prst="rect">
+            <a:avLst/>
+          </a:prstGeom>
+          <a:noFill/>
+          <a:ln w="28575">
+            <a:solidFill>
+              <a:schemeClr val="tx1"/>
+            </a:solidFill>
+          </a:ln>
+        </p:spPr>
+        <p:style>
+          <a:lnRef idx="2">
+            <a:schemeClr val="accent1">
+              <a:shade val="50000"/>
+            </a:schemeClr>
+          </a:lnRef>
+          <a:fillRef idx="1">
+            <a:schemeClr val="accent1"/>
+          </a:fillRef>
+          <a:effectRef idx="0">
+            <a:schemeClr val="accent1"/>
+          </a:effectRef>
+          <a:fontRef idx="minor">
+            <a:schemeClr val="lt1"/>
+          </a:fontRef>
+        </p:style>
+        <p:txBody>
+          <a:bodyPr rtlCol="0" anchor="ctr"/>
+          <a:lstStyle/>
+          <a:p>
+            <a:pPr algn="ctr"/>
+            <a:r>
+              <a:rPr lang="pt-BR" dirty="0" smtClean="0"/>
+              <a:t>c</a:t>
+            </a:r>
+            <a:endParaRPr lang="pt-BR" dirty="0"/>
+          </a:p>
+        </p:txBody>
+      </p:sp>
+      <p:sp>
+        <p:nvSpPr>
+          <p:cNvPr id="6" name="Retângulo de cantos arredondados 12"/>
+          <p:cNvSpPr/>
+          <p:nvPr/>
+        </p:nvSpPr>
+        <p:spPr>
+          <a:xfrm>
+            <a:off x="5857884" y="4572008"/>
+            <a:ext cx="2500330" cy="1643074"/>
+          </a:xfrm>
+          <a:prstGeom prst="roundRect">
+            <a:avLst/>
+          </a:prstGeom>
+          <a:noFill/>
+          <a:ln w="28575">
+            <a:solidFill>
+              <a:srgbClr val="FFC000"/>
+            </a:solidFill>
+          </a:ln>
+        </p:spPr>
+        <p:style>
+          <a:lnRef idx="2">
+            <a:schemeClr val="accent1">
+              <a:shade val="50000"/>
+            </a:schemeClr>
+          </a:lnRef>
+          <a:fillRef idx="1">
+            <a:schemeClr val="accent1"/>
+          </a:fillRef>
+          <a:effectRef idx="0">
+            <a:schemeClr val="accent1"/>
+          </a:effectRef>
+          <a:fontRef idx="minor">
+            <a:schemeClr val="lt1"/>
+          </a:fontRef>
+        </p:style>
+        <p:txBody>
+          <a:bodyPr rtlCol="0" anchor="ctr"/>
+          <a:lstStyle/>
+          <a:p>
+            <a:pPr algn="ctr"/>
+            <a:endParaRPr lang="pt-BR"/>
+          </a:p>
+        </p:txBody>
+      </p:sp>
+      <p:sp>
+        <p:nvSpPr>
+          <p:cNvPr id="7" name="Retângulo 13"/>
+          <p:cNvSpPr/>
+          <p:nvPr/>
+        </p:nvSpPr>
+        <p:spPr>
+          <a:xfrm>
+            <a:off x="6715140" y="5000636"/>
+            <a:ext cx="792088" cy="648072"/>
+          </a:xfrm>
+          <a:prstGeom prst="rect">
+            <a:avLst/>
+          </a:prstGeom>
+          <a:solidFill>
+            <a:srgbClr val="FFC000"/>
+          </a:solidFill>
+          <a:ln w="28575">
+            <a:solidFill>
+              <a:schemeClr val="tx1"/>
+            </a:solidFill>
+          </a:ln>
+        </p:spPr>
+        <p:style>
+          <a:lnRef idx="2">
+            <a:schemeClr val="accent1">
+              <a:shade val="50000"/>
+            </a:schemeClr>
+          </a:lnRef>
+          <a:fillRef idx="1">
+            <a:schemeClr val="accent1"/>
+          </a:fillRef>
+          <a:effectRef idx="0">
+            <a:schemeClr val="accent1"/>
+          </a:effectRef>
+          <a:fontRef idx="minor">
+            <a:schemeClr val="lt1"/>
+          </a:fontRef>
+        </p:style>
+        <p:txBody>
+          <a:bodyPr rtlCol="0" anchor="ctr"/>
+          <a:lstStyle/>
+          <a:p>
+            <a:pPr algn="ctr"/>
+            <a:endParaRPr lang="pt-BR" dirty="0"/>
+          </a:p>
+        </p:txBody>
+      </p:sp>
+      <p:cxnSp>
+        <p:nvCxnSpPr>
+          <p:cNvPr id="8" name="Conector de seta reta 53"/>
+          <p:cNvCxnSpPr>
+            <a:stCxn id="5" idx="2"/>
+            <a:endCxn id="7" idx="0"/>
+          </p:cNvCxnSpPr>
+          <p:nvPr/>
+        </p:nvCxnSpPr>
+        <p:spPr>
+          <a:xfrm rot="16200000" flipH="1">
+            <a:off x="6754564" y="4644016"/>
+            <a:ext cx="711530" cy="1710"/>
+          </a:xfrm>
+          <a:prstGeom prst="straightConnector1">
+            <a:avLst/>
+          </a:prstGeom>
+          <a:ln>
+            <a:solidFill>
+              <a:schemeClr val="tx1"/>
+            </a:solidFill>
+            <a:tailEnd type="arrow"/>
+          </a:ln>
+        </p:spPr>
+        <p:style>
+          <a:lnRef idx="1">
+            <a:schemeClr val="accent1"/>
+          </a:lnRef>
+          <a:fillRef idx="0">
+            <a:schemeClr val="accent1"/>
+          </a:fillRef>
+          <a:effectRef idx="0">
+            <a:schemeClr val="accent1"/>
+          </a:effectRef>
+          <a:fontRef idx="minor">
+            <a:schemeClr val="tx1"/>
+          </a:fontRef>
+        </p:style>
+      </p:cxnSp>
     </p:spTree>
   </p:cSld>
   <p:clrMapOvr>
@@ -7421,9 +8764,606 @@
   <p:timing>
     <p:tnLst>
       <p:par>
-        <p:cTn id="1" dur="indefinite" restart="never" nodeType="tmRoot"/>
+        <p:cTn id="1" dur="indefinite" restart="never" nodeType="tmRoot">
+          <p:childTnLst>
+            <p:seq concurrent="1" nextAc="seek">
+              <p:cTn id="2" dur="indefinite" nodeType="mainSeq">
+                <p:childTnLst>
+                  <p:par>
+                    <p:cTn id="3" fill="hold">
+                      <p:stCondLst>
+                        <p:cond delay="indefinite"/>
+                      </p:stCondLst>
+                      <p:childTnLst>
+                        <p:par>
+                          <p:cTn id="4" fill="hold">
+                            <p:stCondLst>
+                              <p:cond delay="0"/>
+                            </p:stCondLst>
+                            <p:childTnLst>
+                              <p:par>
+                                <p:cTn id="5" presetID="2" presetClass="entr" presetSubtype="4" fill="hold" nodeType="clickEffect">
+                                  <p:stCondLst>
+                                    <p:cond delay="0"/>
+                                  </p:stCondLst>
+                                  <p:childTnLst>
+                                    <p:set>
+                                      <p:cBhvr>
+                                        <p:cTn id="6" dur="1" fill="hold">
+                                          <p:stCondLst>
+                                            <p:cond delay="0"/>
+                                          </p:stCondLst>
+                                        </p:cTn>
+                                        <p:tgtEl>
+                                          <p:spTgt spid="3">
+                                            <p:txEl>
+                                              <p:pRg st="3" end="3"/>
+                                            </p:txEl>
+                                          </p:spTgt>
+                                        </p:tgtEl>
+                                        <p:attrNameLst>
+                                          <p:attrName>style.visibility</p:attrName>
+                                        </p:attrNameLst>
+                                      </p:cBhvr>
+                                      <p:to>
+                                        <p:strVal val="visible"/>
+                                      </p:to>
+                                    </p:set>
+                                    <p:anim calcmode="lin" valueType="num">
+                                      <p:cBhvr additive="base">
+                                        <p:cTn id="7" dur="500" fill="hold"/>
+                                        <p:tgtEl>
+                                          <p:spTgt spid="3">
+                                            <p:txEl>
+                                              <p:pRg st="3" end="3"/>
+                                            </p:txEl>
+                                          </p:spTgt>
+                                        </p:tgtEl>
+                                        <p:attrNameLst>
+                                          <p:attrName>ppt_x</p:attrName>
+                                        </p:attrNameLst>
+                                      </p:cBhvr>
+                                      <p:tavLst>
+                                        <p:tav tm="0">
+                                          <p:val>
+                                            <p:strVal val="#ppt_x"/>
+                                          </p:val>
+                                        </p:tav>
+                                        <p:tav tm="100000">
+                                          <p:val>
+                                            <p:strVal val="#ppt_x"/>
+                                          </p:val>
+                                        </p:tav>
+                                      </p:tavLst>
+                                    </p:anim>
+                                    <p:anim calcmode="lin" valueType="num">
+                                      <p:cBhvr additive="base">
+                                        <p:cTn id="8" dur="500" fill="hold"/>
+                                        <p:tgtEl>
+                                          <p:spTgt spid="3">
+                                            <p:txEl>
+                                              <p:pRg st="3" end="3"/>
+                                            </p:txEl>
+                                          </p:spTgt>
+                                        </p:tgtEl>
+                                        <p:attrNameLst>
+                                          <p:attrName>ppt_y</p:attrName>
+                                        </p:attrNameLst>
+                                      </p:cBhvr>
+                                      <p:tavLst>
+                                        <p:tav tm="0">
+                                          <p:val>
+                                            <p:strVal val="1+#ppt_h/2"/>
+                                          </p:val>
+                                        </p:tav>
+                                        <p:tav tm="100000">
+                                          <p:val>
+                                            <p:strVal val="#ppt_y"/>
+                                          </p:val>
+                                        </p:tav>
+                                      </p:tavLst>
+                                    </p:anim>
+                                  </p:childTnLst>
+                                </p:cTn>
+                              </p:par>
+                              <p:par>
+                                <p:cTn id="9" presetID="3" presetClass="entr" presetSubtype="10" fill="hold" grpId="0" nodeType="withEffect">
+                                  <p:stCondLst>
+                                    <p:cond delay="0"/>
+                                  </p:stCondLst>
+                                  <p:childTnLst>
+                                    <p:set>
+                                      <p:cBhvr>
+                                        <p:cTn id="10" dur="1" fill="hold">
+                                          <p:stCondLst>
+                                            <p:cond delay="0"/>
+                                          </p:stCondLst>
+                                        </p:cTn>
+                                        <p:tgtEl>
+                                          <p:spTgt spid="6"/>
+                                        </p:tgtEl>
+                                        <p:attrNameLst>
+                                          <p:attrName>style.visibility</p:attrName>
+                                        </p:attrNameLst>
+                                      </p:cBhvr>
+                                      <p:to>
+                                        <p:strVal val="visible"/>
+                                      </p:to>
+                                    </p:set>
+                                    <p:animEffect transition="in" filter="blinds(horizontal)">
+                                      <p:cBhvr>
+                                        <p:cTn id="11" dur="500"/>
+                                        <p:tgtEl>
+                                          <p:spTgt spid="6"/>
+                                        </p:tgtEl>
+                                      </p:cBhvr>
+                                    </p:animEffect>
+                                  </p:childTnLst>
+                                </p:cTn>
+                              </p:par>
+                              <p:par>
+                                <p:cTn id="12" presetID="3" presetClass="entr" presetSubtype="10" fill="hold" grpId="0" nodeType="withEffect">
+                                  <p:stCondLst>
+                                    <p:cond delay="0"/>
+                                  </p:stCondLst>
+                                  <p:childTnLst>
+                                    <p:set>
+                                      <p:cBhvr>
+                                        <p:cTn id="13" dur="1" fill="hold">
+                                          <p:stCondLst>
+                                            <p:cond delay="0"/>
+                                          </p:stCondLst>
+                                        </p:cTn>
+                                        <p:tgtEl>
+                                          <p:spTgt spid="5"/>
+                                        </p:tgtEl>
+                                        <p:attrNameLst>
+                                          <p:attrName>style.visibility</p:attrName>
+                                        </p:attrNameLst>
+                                      </p:cBhvr>
+                                      <p:to>
+                                        <p:strVal val="visible"/>
+                                      </p:to>
+                                    </p:set>
+                                    <p:animEffect transition="in" filter="blinds(horizontal)">
+                                      <p:cBhvr>
+                                        <p:cTn id="14" dur="500"/>
+                                        <p:tgtEl>
+                                          <p:spTgt spid="5"/>
+                                        </p:tgtEl>
+                                      </p:cBhvr>
+                                    </p:animEffect>
+                                  </p:childTnLst>
+                                </p:cTn>
+                              </p:par>
+                              <p:par>
+                                <p:cTn id="15" presetID="3" presetClass="entr" presetSubtype="10" fill="hold" nodeType="withEffect">
+                                  <p:stCondLst>
+                                    <p:cond delay="0"/>
+                                  </p:stCondLst>
+                                  <p:childTnLst>
+                                    <p:set>
+                                      <p:cBhvr>
+                                        <p:cTn id="16" dur="1" fill="hold">
+                                          <p:stCondLst>
+                                            <p:cond delay="0"/>
+                                          </p:stCondLst>
+                                        </p:cTn>
+                                        <p:tgtEl>
+                                          <p:spTgt spid="8"/>
+                                        </p:tgtEl>
+                                        <p:attrNameLst>
+                                          <p:attrName>style.visibility</p:attrName>
+                                        </p:attrNameLst>
+                                      </p:cBhvr>
+                                      <p:to>
+                                        <p:strVal val="visible"/>
+                                      </p:to>
+                                    </p:set>
+                                    <p:animEffect transition="in" filter="blinds(horizontal)">
+                                      <p:cBhvr>
+                                        <p:cTn id="17" dur="500"/>
+                                        <p:tgtEl>
+                                          <p:spTgt spid="8"/>
+                                        </p:tgtEl>
+                                      </p:cBhvr>
+                                    </p:animEffect>
+                                  </p:childTnLst>
+                                </p:cTn>
+                              </p:par>
+                              <p:par>
+                                <p:cTn id="18" presetID="3" presetClass="entr" presetSubtype="10" fill="hold" grpId="0" nodeType="withEffect">
+                                  <p:stCondLst>
+                                    <p:cond delay="0"/>
+                                  </p:stCondLst>
+                                  <p:childTnLst>
+                                    <p:set>
+                                      <p:cBhvr>
+                                        <p:cTn id="19" dur="1" fill="hold">
+                                          <p:stCondLst>
+                                            <p:cond delay="0"/>
+                                          </p:stCondLst>
+                                        </p:cTn>
+                                        <p:tgtEl>
+                                          <p:spTgt spid="7"/>
+                                        </p:tgtEl>
+                                        <p:attrNameLst>
+                                          <p:attrName>style.visibility</p:attrName>
+                                        </p:attrNameLst>
+                                      </p:cBhvr>
+                                      <p:to>
+                                        <p:strVal val="visible"/>
+                                      </p:to>
+                                    </p:set>
+                                    <p:animEffect transition="in" filter="blinds(horizontal)">
+                                      <p:cBhvr>
+                                        <p:cTn id="20" dur="500"/>
+                                        <p:tgtEl>
+                                          <p:spTgt spid="7"/>
+                                        </p:tgtEl>
+                                      </p:cBhvr>
+                                    </p:animEffect>
+                                  </p:childTnLst>
+                                </p:cTn>
+                              </p:par>
+                            </p:childTnLst>
+                          </p:cTn>
+                        </p:par>
+                      </p:childTnLst>
+                    </p:cTn>
+                  </p:par>
+                  <p:par>
+                    <p:cTn id="21" fill="hold">
+                      <p:stCondLst>
+                        <p:cond delay="indefinite"/>
+                      </p:stCondLst>
+                      <p:childTnLst>
+                        <p:par>
+                          <p:cTn id="22" fill="hold">
+                            <p:stCondLst>
+                              <p:cond delay="0"/>
+                            </p:stCondLst>
+                            <p:childTnLst>
+                              <p:par>
+                                <p:cTn id="23" presetID="2" presetClass="entr" presetSubtype="4" fill="hold" nodeType="clickEffect">
+                                  <p:stCondLst>
+                                    <p:cond delay="0"/>
+                                  </p:stCondLst>
+                                  <p:childTnLst>
+                                    <p:set>
+                                      <p:cBhvr>
+                                        <p:cTn id="24" dur="1" fill="hold">
+                                          <p:stCondLst>
+                                            <p:cond delay="0"/>
+                                          </p:stCondLst>
+                                        </p:cTn>
+                                        <p:tgtEl>
+                                          <p:spTgt spid="3">
+                                            <p:txEl>
+                                              <p:pRg st="4" end="4"/>
+                                            </p:txEl>
+                                          </p:spTgt>
+                                        </p:tgtEl>
+                                        <p:attrNameLst>
+                                          <p:attrName>style.visibility</p:attrName>
+                                        </p:attrNameLst>
+                                      </p:cBhvr>
+                                      <p:to>
+                                        <p:strVal val="visible"/>
+                                      </p:to>
+                                    </p:set>
+                                    <p:anim calcmode="lin" valueType="num">
+                                      <p:cBhvr additive="base">
+                                        <p:cTn id="25" dur="500" fill="hold"/>
+                                        <p:tgtEl>
+                                          <p:spTgt spid="3">
+                                            <p:txEl>
+                                              <p:pRg st="4" end="4"/>
+                                            </p:txEl>
+                                          </p:spTgt>
+                                        </p:tgtEl>
+                                        <p:attrNameLst>
+                                          <p:attrName>ppt_x</p:attrName>
+                                        </p:attrNameLst>
+                                      </p:cBhvr>
+                                      <p:tavLst>
+                                        <p:tav tm="0">
+                                          <p:val>
+                                            <p:strVal val="#ppt_x"/>
+                                          </p:val>
+                                        </p:tav>
+                                        <p:tav tm="100000">
+                                          <p:val>
+                                            <p:strVal val="#ppt_x"/>
+                                          </p:val>
+                                        </p:tav>
+                                      </p:tavLst>
+                                    </p:anim>
+                                    <p:anim calcmode="lin" valueType="num">
+                                      <p:cBhvr additive="base">
+                                        <p:cTn id="26" dur="500" fill="hold"/>
+                                        <p:tgtEl>
+                                          <p:spTgt spid="3">
+                                            <p:txEl>
+                                              <p:pRg st="4" end="4"/>
+                                            </p:txEl>
+                                          </p:spTgt>
+                                        </p:tgtEl>
+                                        <p:attrNameLst>
+                                          <p:attrName>ppt_y</p:attrName>
+                                        </p:attrNameLst>
+                                      </p:cBhvr>
+                                      <p:tavLst>
+                                        <p:tav tm="0">
+                                          <p:val>
+                                            <p:strVal val="1+#ppt_h/2"/>
+                                          </p:val>
+                                        </p:tav>
+                                        <p:tav tm="100000">
+                                          <p:val>
+                                            <p:strVal val="#ppt_y"/>
+                                          </p:val>
+                                        </p:tav>
+                                      </p:tavLst>
+                                    </p:anim>
+                                  </p:childTnLst>
+                                </p:cTn>
+                              </p:par>
+                              <p:par>
+                                <p:cTn id="27" presetID="2" presetClass="entr" presetSubtype="4" fill="hold" nodeType="withEffect">
+                                  <p:stCondLst>
+                                    <p:cond delay="0"/>
+                                  </p:stCondLst>
+                                  <p:childTnLst>
+                                    <p:set>
+                                      <p:cBhvr>
+                                        <p:cTn id="28" dur="1" fill="hold">
+                                          <p:stCondLst>
+                                            <p:cond delay="0"/>
+                                          </p:stCondLst>
+                                        </p:cTn>
+                                        <p:tgtEl>
+                                          <p:spTgt spid="3">
+                                            <p:txEl>
+                                              <p:pRg st="5" end="5"/>
+                                            </p:txEl>
+                                          </p:spTgt>
+                                        </p:tgtEl>
+                                        <p:attrNameLst>
+                                          <p:attrName>style.visibility</p:attrName>
+                                        </p:attrNameLst>
+                                      </p:cBhvr>
+                                      <p:to>
+                                        <p:strVal val="visible"/>
+                                      </p:to>
+                                    </p:set>
+                                    <p:anim calcmode="lin" valueType="num">
+                                      <p:cBhvr additive="base">
+                                        <p:cTn id="29" dur="500" fill="hold"/>
+                                        <p:tgtEl>
+                                          <p:spTgt spid="3">
+                                            <p:txEl>
+                                              <p:pRg st="5" end="5"/>
+                                            </p:txEl>
+                                          </p:spTgt>
+                                        </p:tgtEl>
+                                        <p:attrNameLst>
+                                          <p:attrName>ppt_x</p:attrName>
+                                        </p:attrNameLst>
+                                      </p:cBhvr>
+                                      <p:tavLst>
+                                        <p:tav tm="0">
+                                          <p:val>
+                                            <p:strVal val="#ppt_x"/>
+                                          </p:val>
+                                        </p:tav>
+                                        <p:tav tm="100000">
+                                          <p:val>
+                                            <p:strVal val="#ppt_x"/>
+                                          </p:val>
+                                        </p:tav>
+                                      </p:tavLst>
+                                    </p:anim>
+                                    <p:anim calcmode="lin" valueType="num">
+                                      <p:cBhvr additive="base">
+                                        <p:cTn id="30" dur="500" fill="hold"/>
+                                        <p:tgtEl>
+                                          <p:spTgt spid="3">
+                                            <p:txEl>
+                                              <p:pRg st="5" end="5"/>
+                                            </p:txEl>
+                                          </p:spTgt>
+                                        </p:tgtEl>
+                                        <p:attrNameLst>
+                                          <p:attrName>ppt_y</p:attrName>
+                                        </p:attrNameLst>
+                                      </p:cBhvr>
+                                      <p:tavLst>
+                                        <p:tav tm="0">
+                                          <p:val>
+                                            <p:strVal val="1+#ppt_h/2"/>
+                                          </p:val>
+                                        </p:tav>
+                                        <p:tav tm="100000">
+                                          <p:val>
+                                            <p:strVal val="#ppt_y"/>
+                                          </p:val>
+                                        </p:tav>
+                                      </p:tavLst>
+                                    </p:anim>
+                                  </p:childTnLst>
+                                </p:cTn>
+                              </p:par>
+                            </p:childTnLst>
+                          </p:cTn>
+                        </p:par>
+                      </p:childTnLst>
+                    </p:cTn>
+                  </p:par>
+                  <p:par>
+                    <p:cTn id="31" fill="hold">
+                      <p:stCondLst>
+                        <p:cond delay="indefinite"/>
+                      </p:stCondLst>
+                      <p:childTnLst>
+                        <p:par>
+                          <p:cTn id="32" fill="hold">
+                            <p:stCondLst>
+                              <p:cond delay="0"/>
+                            </p:stCondLst>
+                            <p:childTnLst>
+                              <p:par>
+                                <p:cTn id="33" presetID="2" presetClass="entr" presetSubtype="4" fill="hold" nodeType="clickEffect">
+                                  <p:stCondLst>
+                                    <p:cond delay="0"/>
+                                  </p:stCondLst>
+                                  <p:childTnLst>
+                                    <p:set>
+                                      <p:cBhvr>
+                                        <p:cTn id="34" dur="1" fill="hold">
+                                          <p:stCondLst>
+                                            <p:cond delay="0"/>
+                                          </p:stCondLst>
+                                        </p:cTn>
+                                        <p:tgtEl>
+                                          <p:spTgt spid="3">
+                                            <p:txEl>
+                                              <p:pRg st="6" end="6"/>
+                                            </p:txEl>
+                                          </p:spTgt>
+                                        </p:tgtEl>
+                                        <p:attrNameLst>
+                                          <p:attrName>style.visibility</p:attrName>
+                                        </p:attrNameLst>
+                                      </p:cBhvr>
+                                      <p:to>
+                                        <p:strVal val="visible"/>
+                                      </p:to>
+                                    </p:set>
+                                    <p:anim calcmode="lin" valueType="num">
+                                      <p:cBhvr additive="base">
+                                        <p:cTn id="35" dur="500" fill="hold"/>
+                                        <p:tgtEl>
+                                          <p:spTgt spid="3">
+                                            <p:txEl>
+                                              <p:pRg st="6" end="6"/>
+                                            </p:txEl>
+                                          </p:spTgt>
+                                        </p:tgtEl>
+                                        <p:attrNameLst>
+                                          <p:attrName>ppt_x</p:attrName>
+                                        </p:attrNameLst>
+                                      </p:cBhvr>
+                                      <p:tavLst>
+                                        <p:tav tm="0">
+                                          <p:val>
+                                            <p:strVal val="#ppt_x"/>
+                                          </p:val>
+                                        </p:tav>
+                                        <p:tav tm="100000">
+                                          <p:val>
+                                            <p:strVal val="#ppt_x"/>
+                                          </p:val>
+                                        </p:tav>
+                                      </p:tavLst>
+                                    </p:anim>
+                                    <p:anim calcmode="lin" valueType="num">
+                                      <p:cBhvr additive="base">
+                                        <p:cTn id="36" dur="500" fill="hold"/>
+                                        <p:tgtEl>
+                                          <p:spTgt spid="3">
+                                            <p:txEl>
+                                              <p:pRg st="6" end="6"/>
+                                            </p:txEl>
+                                          </p:spTgt>
+                                        </p:tgtEl>
+                                        <p:attrNameLst>
+                                          <p:attrName>ppt_y</p:attrName>
+                                        </p:attrNameLst>
+                                      </p:cBhvr>
+                                      <p:tavLst>
+                                        <p:tav tm="0">
+                                          <p:val>
+                                            <p:strVal val="1+#ppt_h/2"/>
+                                          </p:val>
+                                        </p:tav>
+                                        <p:tav tm="100000">
+                                          <p:val>
+                                            <p:strVal val="#ppt_y"/>
+                                          </p:val>
+                                        </p:tav>
+                                      </p:tavLst>
+                                    </p:anim>
+                                  </p:childTnLst>
+                                </p:cTn>
+                              </p:par>
+                              <p:par>
+                                <p:cTn id="37" presetID="3" presetClass="exit" presetSubtype="10" fill="hold" nodeType="withEffect">
+                                  <p:stCondLst>
+                                    <p:cond delay="0"/>
+                                  </p:stCondLst>
+                                  <p:childTnLst>
+                                    <p:animEffect transition="out" filter="blinds(horizontal)">
+                                      <p:cBhvr>
+                                        <p:cTn id="38" dur="500"/>
+                                        <p:tgtEl>
+                                          <p:spTgt spid="8"/>
+                                        </p:tgtEl>
+                                      </p:cBhvr>
+                                    </p:animEffect>
+                                    <p:set>
+                                      <p:cBhvr>
+                                        <p:cTn id="39" dur="1" fill="hold">
+                                          <p:stCondLst>
+                                            <p:cond delay="499"/>
+                                          </p:stCondLst>
+                                        </p:cTn>
+                                        <p:tgtEl>
+                                          <p:spTgt spid="8"/>
+                                        </p:tgtEl>
+                                        <p:attrNameLst>
+                                          <p:attrName>style.visibility</p:attrName>
+                                        </p:attrNameLst>
+                                      </p:cBhvr>
+                                      <p:to>
+                                        <p:strVal val="hidden"/>
+                                      </p:to>
+                                    </p:set>
+                                  </p:childTnLst>
+                                </p:cTn>
+                              </p:par>
+                            </p:childTnLst>
+                          </p:cTn>
+                        </p:par>
+                      </p:childTnLst>
+                    </p:cTn>
+                  </p:par>
+                </p:childTnLst>
+              </p:cTn>
+              <p:prevCondLst>
+                <p:cond evt="onPrev" delay="0">
+                  <p:tgtEl>
+                    <p:sldTgt/>
+                  </p:tgtEl>
+                </p:cond>
+              </p:prevCondLst>
+              <p:nextCondLst>
+                <p:cond evt="onNext" delay="0">
+                  <p:tgtEl>
+                    <p:sldTgt/>
+                  </p:tgtEl>
+                </p:cond>
+              </p:nextCondLst>
+            </p:seq>
+          </p:childTnLst>
+        </p:cTn>
       </p:par>
     </p:tnLst>
+    <p:bldLst>
+      <p:bldP spid="5" grpId="0" animBg="1"/>
+      <p:bldP spid="6" grpId="0" animBg="1"/>
+      <p:bldP spid="7" grpId="0" animBg="1"/>
+    </p:bldLst>
   </p:timing>
 </p:sld>
 </file>
@@ -7455,7 +9395,12 @@
             <p:ph type="title"/>
           </p:nvPr>
         </p:nvSpPr>
-        <p:spPr/>
+        <p:spPr>
+          <a:xfrm>
+            <a:off x="457200" y="274638"/>
+            <a:ext cx="8075240" cy="1143000"/>
+          </a:xfrm>
+        </p:spPr>
         <p:txBody>
           <a:bodyPr/>
           <a:lstStyle/>
@@ -7463,19 +9408,7 @@
             <a:pPr eaLnBrk="1" hangingPunct="1"/>
             <a:r>
               <a:rPr lang="pt-BR" dirty="0" smtClean="0"/>
-              <a:t>Desabilitando o </a:t>
-            </a:r>
-            <a:r>
-              <a:rPr lang="pt-BR" dirty="0" err="1" smtClean="0"/>
-              <a:t>Garbage</a:t>
-            </a:r>
-            <a:r>
-              <a:rPr lang="pt-BR" dirty="0" smtClean="0"/>
-              <a:t> </a:t>
-            </a:r>
-            <a:r>
-              <a:rPr lang="pt-BR" dirty="0" err="1" smtClean="0"/>
-              <a:t>Collector</a:t>
+              <a:t>Preparando o objeto para coleta</a:t>
             </a:r>
             <a:endParaRPr lang="pt-BR" dirty="0"/>
           </a:p>
@@ -7496,7 +9429,16 @@
           <a:bodyPr/>
           <a:lstStyle/>
           <a:p>
-            <a:endParaRPr lang="pt-BR"/>
+            <a:pPr>
+              <a:spcBef>
+                <a:spcPts val="3000"/>
+              </a:spcBef>
+            </a:pPr>
+            <a:r>
+              <a:rPr lang="pt-BR" dirty="0" smtClean="0"/>
+              <a:t>Isolamento de referência</a:t>
+            </a:r>
+            <a:endParaRPr lang="pt-BR" dirty="0"/>
           </a:p>
         </p:txBody>
       </p:sp>
@@ -7579,7 +9521,7 @@
             <a:pPr eaLnBrk="1" hangingPunct="1"/>
             <a:r>
               <a:rPr lang="pt-BR" dirty="0" smtClean="0"/>
-              <a:t>Ciclo de vida dos objetos</a:t>
+              <a:t>Obtendo dados sobre memória</a:t>
             </a:r>
             <a:endParaRPr lang="pt-BR" dirty="0"/>
           </a:p>
@@ -7683,7 +9625,19 @@
             <a:pPr eaLnBrk="1" hangingPunct="1"/>
             <a:r>
               <a:rPr lang="pt-BR" dirty="0" smtClean="0"/>
-              <a:t>Objetos de referência</a:t>
+              <a:t>Desabilitando o </a:t>
+            </a:r>
+            <a:r>
+              <a:rPr lang="pt-BR" dirty="0" err="1" smtClean="0"/>
+              <a:t>Garbage</a:t>
+            </a:r>
+            <a:r>
+              <a:rPr lang="pt-BR" dirty="0" smtClean="0"/>
+              <a:t> </a:t>
+            </a:r>
+            <a:r>
+              <a:rPr lang="pt-BR" dirty="0" err="1" smtClean="0"/>
+              <a:t>Collector</a:t>
             </a:r>
             <a:endParaRPr lang="pt-BR" dirty="0"/>
           </a:p>
@@ -7732,6 +9686,110 @@
                 <a:defRPr/>
               </a:pPr>
               <a:t>18</a:t>
+            </a:fld>
+            <a:endParaRPr lang="pt-BR"/>
+          </a:p>
+        </p:txBody>
+      </p:sp>
+    </p:spTree>
+  </p:cSld>
+  <p:clrMapOvr>
+    <a:masterClrMapping/>
+  </p:clrMapOvr>
+  <p:timing>
+    <p:tnLst>
+      <p:par>
+        <p:cTn id="1" dur="indefinite" restart="never" nodeType="tmRoot"/>
+      </p:par>
+    </p:tnLst>
+  </p:timing>
+</p:sld>
+</file>
+
+<file path=ppt/slides/slide19.xml><?xml version="1.0" encoding="utf-8"?>
+<p:sld xmlns:a="http://schemas.openxmlformats.org/drawingml/2006/main" xmlns:r="http://schemas.openxmlformats.org/officeDocument/2006/relationships" xmlns:p="http://schemas.openxmlformats.org/presentationml/2006/main">
+  <p:cSld>
+    <p:spTree>
+      <p:nvGrpSpPr>
+        <p:cNvPr id="1" name=""/>
+        <p:cNvGrpSpPr/>
+        <p:nvPr/>
+      </p:nvGrpSpPr>
+      <p:grpSpPr>
+        <a:xfrm>
+          <a:off x="0" y="0"/>
+          <a:ext cx="0" cy="0"/>
+          <a:chOff x="0" y="0"/>
+          <a:chExt cx="0" cy="0"/>
+        </a:xfrm>
+      </p:grpSpPr>
+      <p:sp>
+        <p:nvSpPr>
+          <p:cNvPr id="2" name="Título 1"/>
+          <p:cNvSpPr>
+            <a:spLocks noGrp="1"/>
+          </p:cNvSpPr>
+          <p:nvPr>
+            <p:ph type="title"/>
+          </p:nvPr>
+        </p:nvSpPr>
+        <p:spPr/>
+        <p:txBody>
+          <a:bodyPr/>
+          <a:lstStyle/>
+          <a:p>
+            <a:pPr eaLnBrk="1" hangingPunct="1"/>
+            <a:r>
+              <a:rPr lang="pt-BR" dirty="0" smtClean="0"/>
+              <a:t>Ciclo de vida dos objetos</a:t>
+            </a:r>
+            <a:endParaRPr lang="pt-BR" dirty="0"/>
+          </a:p>
+        </p:txBody>
+      </p:sp>
+      <p:sp>
+        <p:nvSpPr>
+          <p:cNvPr id="3" name="Espaço Reservado para Conteúdo 2"/>
+          <p:cNvSpPr>
+            <a:spLocks noGrp="1"/>
+          </p:cNvSpPr>
+          <p:nvPr>
+            <p:ph idx="1"/>
+          </p:nvPr>
+        </p:nvSpPr>
+        <p:spPr/>
+        <p:txBody>
+          <a:bodyPr/>
+          <a:lstStyle/>
+          <a:p>
+            <a:endParaRPr lang="pt-BR"/>
+          </a:p>
+        </p:txBody>
+      </p:sp>
+      <p:sp>
+        <p:nvSpPr>
+          <p:cNvPr id="4" name="Espaço Reservado para Número de Slide 3"/>
+          <p:cNvSpPr>
+            <a:spLocks noGrp="1"/>
+          </p:cNvSpPr>
+          <p:nvPr>
+            <p:ph type="sldNum" sz="quarter" idx="12"/>
+          </p:nvPr>
+        </p:nvSpPr>
+        <p:spPr/>
+        <p:txBody>
+          <a:bodyPr/>
+          <a:lstStyle/>
+          <a:p>
+            <a:pPr>
+              <a:defRPr/>
+            </a:pPr>
+            <a:fld id="{21B5E3EF-F5EF-4A0A-A70F-386D7016207D}" type="slidenum">
+              <a:rPr lang="pt-BR" smtClean="0"/>
+              <a:pPr>
+                <a:defRPr/>
+              </a:pPr>
+              <a:t>19</a:t>
             </a:fld>
             <a:endParaRPr lang="pt-BR"/>
           </a:p>
@@ -7951,6 +10009,110 @@
                 <a:defRPr/>
               </a:pPr>
               <a:t>2</a:t>
+            </a:fld>
+            <a:endParaRPr lang="pt-BR"/>
+          </a:p>
+        </p:txBody>
+      </p:sp>
+    </p:spTree>
+  </p:cSld>
+  <p:clrMapOvr>
+    <a:masterClrMapping/>
+  </p:clrMapOvr>
+  <p:timing>
+    <p:tnLst>
+      <p:par>
+        <p:cTn id="1" dur="indefinite" restart="never" nodeType="tmRoot"/>
+      </p:par>
+    </p:tnLst>
+  </p:timing>
+</p:sld>
+</file>
+
+<file path=ppt/slides/slide20.xml><?xml version="1.0" encoding="utf-8"?>
+<p:sld xmlns:a="http://schemas.openxmlformats.org/drawingml/2006/main" xmlns:r="http://schemas.openxmlformats.org/officeDocument/2006/relationships" xmlns:p="http://schemas.openxmlformats.org/presentationml/2006/main">
+  <p:cSld>
+    <p:spTree>
+      <p:nvGrpSpPr>
+        <p:cNvPr id="1" name=""/>
+        <p:cNvGrpSpPr/>
+        <p:nvPr/>
+      </p:nvGrpSpPr>
+      <p:grpSpPr>
+        <a:xfrm>
+          <a:off x="0" y="0"/>
+          <a:ext cx="0" cy="0"/>
+          <a:chOff x="0" y="0"/>
+          <a:chExt cx="0" cy="0"/>
+        </a:xfrm>
+      </p:grpSpPr>
+      <p:sp>
+        <p:nvSpPr>
+          <p:cNvPr id="2" name="Título 1"/>
+          <p:cNvSpPr>
+            <a:spLocks noGrp="1"/>
+          </p:cNvSpPr>
+          <p:nvPr>
+            <p:ph type="title"/>
+          </p:nvPr>
+        </p:nvSpPr>
+        <p:spPr/>
+        <p:txBody>
+          <a:bodyPr/>
+          <a:lstStyle/>
+          <a:p>
+            <a:pPr eaLnBrk="1" hangingPunct="1"/>
+            <a:r>
+              <a:rPr lang="pt-BR" dirty="0" smtClean="0"/>
+              <a:t>Objetos de referência</a:t>
+            </a:r>
+            <a:endParaRPr lang="pt-BR" dirty="0"/>
+          </a:p>
+        </p:txBody>
+      </p:sp>
+      <p:sp>
+        <p:nvSpPr>
+          <p:cNvPr id="3" name="Espaço Reservado para Conteúdo 2"/>
+          <p:cNvSpPr>
+            <a:spLocks noGrp="1"/>
+          </p:cNvSpPr>
+          <p:nvPr>
+            <p:ph idx="1"/>
+          </p:nvPr>
+        </p:nvSpPr>
+        <p:spPr/>
+        <p:txBody>
+          <a:bodyPr/>
+          <a:lstStyle/>
+          <a:p>
+            <a:endParaRPr lang="pt-BR"/>
+          </a:p>
+        </p:txBody>
+      </p:sp>
+      <p:sp>
+        <p:nvSpPr>
+          <p:cNvPr id="4" name="Espaço Reservado para Número de Slide 3"/>
+          <p:cNvSpPr>
+            <a:spLocks noGrp="1"/>
+          </p:cNvSpPr>
+          <p:nvPr>
+            <p:ph type="sldNum" sz="quarter" idx="12"/>
+          </p:nvPr>
+        </p:nvSpPr>
+        <p:spPr/>
+        <p:txBody>
+          <a:bodyPr/>
+          <a:lstStyle/>
+          <a:p>
+            <a:pPr>
+              <a:defRPr/>
+            </a:pPr>
+            <a:fld id="{21B5E3EF-F5EF-4A0A-A70F-386D7016207D}" type="slidenum">
+              <a:rPr lang="pt-BR" smtClean="0"/>
+              <a:pPr>
+                <a:defRPr/>
+              </a:pPr>
+              <a:t>20</a:t>
             </a:fld>
             <a:endParaRPr lang="pt-BR"/>
           </a:p>

</xml_diff>

<commit_message>
Novos slides sobre o Garbage Collector
</commit_message>
<xml_diff>
--- a/2-Java-Programmer-Modulo-II/11.Capitulo05.pptx
+++ b/2-Java-Programmer-Modulo-II/11.Capitulo05.pptx
@@ -5,7 +5,7 @@
     <p:sldMasterId id="2147483660" r:id="rId1"/>
   </p:sldMasterIdLst>
   <p:notesMasterIdLst>
-    <p:notesMasterId r:id="rId22"/>
+    <p:notesMasterId r:id="rId23"/>
   </p:notesMasterIdLst>
   <p:sldIdLst>
     <p:sldId id="256" r:id="rId2"/>
@@ -23,11 +23,12 @@
     <p:sldId id="302" r:id="rId14"/>
     <p:sldId id="315" r:id="rId15"/>
     <p:sldId id="318" r:id="rId16"/>
-    <p:sldId id="317" r:id="rId17"/>
+    <p:sldId id="319" r:id="rId17"/>
     <p:sldId id="303" r:id="rId18"/>
-    <p:sldId id="304" r:id="rId19"/>
-    <p:sldId id="305" r:id="rId20"/>
-    <p:sldId id="306" r:id="rId21"/>
+    <p:sldId id="320" r:id="rId19"/>
+    <p:sldId id="321" r:id="rId20"/>
+    <p:sldId id="305" r:id="rId21"/>
+    <p:sldId id="306" r:id="rId22"/>
   </p:sldIdLst>
   <p:sldSz cx="9144000" cy="6858000" type="screen4x3"/>
   <p:notesSz cx="6858000" cy="9144000"/>
@@ -268,7 +269,7 @@
               <a:pPr>
                 <a:defRPr/>
               </a:pPr>
-              <a:t>30/03/2012</a:t>
+              <a:t>02/04/2012</a:t>
             </a:fld>
             <a:endParaRPr lang="pt-BR"/>
           </a:p>
@@ -456,7 +457,7 @@
               <a:pPr>
                 <a:defRPr/>
               </a:pPr>
-              <a:t>‹#›</a:t>
+              <a:t>‹nº›</a:t>
             </a:fld>
             <a:endParaRPr lang="pt-BR"/>
           </a:p>
@@ -1762,6 +1763,93 @@
 </p:notes>
 </file>
 
+<file path=ppt/notesSlides/notesSlide21.xml><?xml version="1.0" encoding="utf-8"?>
+<p:notes xmlns:a="http://schemas.openxmlformats.org/drawingml/2006/main" xmlns:r="http://schemas.openxmlformats.org/officeDocument/2006/relationships" xmlns:p="http://schemas.openxmlformats.org/presentationml/2006/main">
+  <p:cSld>
+    <p:spTree>
+      <p:nvGrpSpPr>
+        <p:cNvPr id="1" name=""/>
+        <p:cNvGrpSpPr/>
+        <p:nvPr/>
+      </p:nvGrpSpPr>
+      <p:grpSpPr>
+        <a:xfrm>
+          <a:off x="0" y="0"/>
+          <a:ext cx="0" cy="0"/>
+          <a:chOff x="0" y="0"/>
+          <a:chExt cx="0" cy="0"/>
+        </a:xfrm>
+      </p:grpSpPr>
+      <p:sp>
+        <p:nvSpPr>
+          <p:cNvPr id="2" name="Espaço Reservado para Imagem de Slide 1"/>
+          <p:cNvSpPr>
+            <a:spLocks noGrp="1" noRot="1" noChangeAspect="1"/>
+          </p:cNvSpPr>
+          <p:nvPr>
+            <p:ph type="sldImg"/>
+          </p:nvPr>
+        </p:nvSpPr>
+        <p:spPr/>
+      </p:sp>
+      <p:sp>
+        <p:nvSpPr>
+          <p:cNvPr id="3" name="Espaço Reservado para Anotações 2"/>
+          <p:cNvSpPr>
+            <a:spLocks noGrp="1"/>
+          </p:cNvSpPr>
+          <p:nvPr>
+            <p:ph type="body" idx="1"/>
+          </p:nvPr>
+        </p:nvSpPr>
+        <p:spPr/>
+        <p:txBody>
+          <a:bodyPr>
+            <a:normAutofit/>
+          </a:bodyPr>
+          <a:lstStyle/>
+          <a:p>
+            <a:endParaRPr lang="pt-BR"/>
+          </a:p>
+        </p:txBody>
+      </p:sp>
+      <p:sp>
+        <p:nvSpPr>
+          <p:cNvPr id="4" name="Espaço Reservado para Número de Slide 3"/>
+          <p:cNvSpPr>
+            <a:spLocks noGrp="1"/>
+          </p:cNvSpPr>
+          <p:nvPr>
+            <p:ph type="sldNum" sz="quarter" idx="10"/>
+          </p:nvPr>
+        </p:nvSpPr>
+        <p:spPr/>
+        <p:txBody>
+          <a:bodyPr/>
+          <a:lstStyle/>
+          <a:p>
+            <a:pPr>
+              <a:defRPr/>
+            </a:pPr>
+            <a:fld id="{1935B8E8-55BE-43E9-B7F8-2CD1361E8ED0}" type="slidenum">
+              <a:rPr lang="pt-BR" smtClean="0"/>
+              <a:pPr>
+                <a:defRPr/>
+              </a:pPr>
+              <a:t>21</a:t>
+            </a:fld>
+            <a:endParaRPr lang="pt-BR"/>
+          </a:p>
+        </p:txBody>
+      </p:sp>
+    </p:spTree>
+  </p:cSld>
+  <p:clrMapOvr>
+    <a:masterClrMapping/>
+  </p:clrMapOvr>
+</p:notes>
+</file>
+
 <file path=ppt/notesSlides/notesSlide3.xml><?xml version="1.0" encoding="utf-8"?>
 <p:notes xmlns:a="http://schemas.openxmlformats.org/drawingml/2006/main" xmlns:r="http://schemas.openxmlformats.org/officeDocument/2006/relationships" xmlns:p="http://schemas.openxmlformats.org/presentationml/2006/main">
   <p:cSld>
@@ -2803,7 +2891,7 @@
               <a:pPr>
                 <a:defRPr/>
               </a:pPr>
-              <a:t>30/03/2012</a:t>
+              <a:t>02/04/2012</a:t>
             </a:fld>
             <a:endParaRPr lang="pt-BR"/>
           </a:p>
@@ -2862,7 +2950,7 @@
               <a:pPr>
                 <a:defRPr/>
               </a:pPr>
-              <a:t>‹#›</a:t>
+              <a:t>‹nº›</a:t>
             </a:fld>
             <a:endParaRPr lang="pt-BR"/>
           </a:p>
@@ -2995,7 +3083,7 @@
               <a:pPr>
                 <a:defRPr/>
               </a:pPr>
-              <a:t>30/03/2012</a:t>
+              <a:t>02/04/2012</a:t>
             </a:fld>
             <a:endParaRPr lang="pt-BR"/>
           </a:p>
@@ -3054,7 +3142,7 @@
               <a:pPr>
                 <a:defRPr/>
               </a:pPr>
-              <a:t>‹#›</a:t>
+              <a:t>‹nº›</a:t>
             </a:fld>
             <a:endParaRPr lang="pt-BR"/>
           </a:p>
@@ -3197,7 +3285,7 @@
               <a:pPr>
                 <a:defRPr/>
               </a:pPr>
-              <a:t>30/03/2012</a:t>
+              <a:t>02/04/2012</a:t>
             </a:fld>
             <a:endParaRPr lang="pt-BR"/>
           </a:p>
@@ -3256,7 +3344,7 @@
               <a:pPr>
                 <a:defRPr/>
               </a:pPr>
-              <a:t>‹#›</a:t>
+              <a:t>‹nº›</a:t>
             </a:fld>
             <a:endParaRPr lang="pt-BR"/>
           </a:p>
@@ -3393,7 +3481,7 @@
               <a:pPr>
                 <a:defRPr/>
               </a:pPr>
-              <a:t>30/03/2012</a:t>
+              <a:t>02/04/2012</a:t>
             </a:fld>
             <a:endParaRPr lang="pt-BR"/>
           </a:p>
@@ -3452,7 +3540,7 @@
               <a:pPr>
                 <a:defRPr/>
               </a:pPr>
-              <a:t>‹#›</a:t>
+              <a:t>‹nº›</a:t>
             </a:fld>
             <a:endParaRPr lang="pt-BR"/>
           </a:p>
@@ -3899,7 +3987,7 @@
               <a:pPr>
                 <a:defRPr/>
               </a:pPr>
-              <a:t>30/03/2012</a:t>
+              <a:t>02/04/2012</a:t>
             </a:fld>
             <a:endParaRPr lang="pt-BR"/>
           </a:p>
@@ -3958,7 +4046,7 @@
               <a:pPr>
                 <a:defRPr/>
               </a:pPr>
-              <a:t>‹#›</a:t>
+              <a:t>‹nº›</a:t>
             </a:fld>
             <a:endParaRPr lang="pt-BR"/>
           </a:p>
@@ -4190,7 +4278,7 @@
               <a:pPr>
                 <a:defRPr/>
               </a:pPr>
-              <a:t>30/03/2012</a:t>
+              <a:t>02/04/2012</a:t>
             </a:fld>
             <a:endParaRPr lang="pt-BR"/>
           </a:p>
@@ -4249,7 +4337,7 @@
               <a:pPr>
                 <a:defRPr/>
               </a:pPr>
-              <a:t>‹#›</a:t>
+              <a:t>‹nº›</a:t>
             </a:fld>
             <a:endParaRPr lang="pt-BR"/>
           </a:p>
@@ -4591,7 +4679,7 @@
               <a:pPr>
                 <a:defRPr/>
               </a:pPr>
-              <a:t>30/03/2012</a:t>
+              <a:t>02/04/2012</a:t>
             </a:fld>
             <a:endParaRPr lang="pt-BR"/>
           </a:p>
@@ -4650,7 +4738,7 @@
               <a:pPr>
                 <a:defRPr/>
               </a:pPr>
-              <a:t>‹#›</a:t>
+              <a:t>‹nº›</a:t>
             </a:fld>
             <a:endParaRPr lang="pt-BR"/>
           </a:p>
@@ -4740,7 +4828,7 @@
               <a:pPr>
                 <a:defRPr/>
               </a:pPr>
-              <a:t>30/03/2012</a:t>
+              <a:t>02/04/2012</a:t>
             </a:fld>
             <a:endParaRPr lang="pt-BR"/>
           </a:p>
@@ -4799,7 +4887,7 @@
               <a:pPr>
                 <a:defRPr/>
               </a:pPr>
-              <a:t>‹#›</a:t>
+              <a:t>‹nº›</a:t>
             </a:fld>
             <a:endParaRPr lang="pt-BR"/>
           </a:p>
@@ -4857,7 +4945,7 @@
               <a:pPr>
                 <a:defRPr/>
               </a:pPr>
-              <a:t>30/03/2012</a:t>
+              <a:t>02/04/2012</a:t>
             </a:fld>
             <a:endParaRPr lang="pt-BR"/>
           </a:p>
@@ -4916,7 +5004,7 @@
               <a:pPr>
                 <a:defRPr/>
               </a:pPr>
-              <a:t>‹#›</a:t>
+              <a:t>‹nº›</a:t>
             </a:fld>
             <a:endParaRPr lang="pt-BR"/>
           </a:p>
@@ -5133,7 +5221,7 @@
               <a:pPr>
                 <a:defRPr/>
               </a:pPr>
-              <a:t>30/03/2012</a:t>
+              <a:t>02/04/2012</a:t>
             </a:fld>
             <a:endParaRPr lang="pt-BR"/>
           </a:p>
@@ -5197,7 +5285,7 @@
               <a:pPr>
                 <a:defRPr/>
               </a:pPr>
-              <a:t>‹#›</a:t>
+              <a:t>‹nº›</a:t>
             </a:fld>
             <a:endParaRPr lang="pt-BR"/>
           </a:p>
@@ -5417,7 +5505,7 @@
               <a:pPr>
                 <a:defRPr/>
               </a:pPr>
-              <a:t>30/03/2012</a:t>
+              <a:t>02/04/2012</a:t>
             </a:fld>
             <a:endParaRPr lang="pt-BR"/>
           </a:p>
@@ -5476,7 +5564,7 @@
               <a:pPr>
                 <a:defRPr/>
               </a:pPr>
-              <a:t>‹#›</a:t>
+              <a:t>‹nº›</a:t>
             </a:fld>
             <a:endParaRPr lang="pt-BR"/>
           </a:p>
@@ -5895,7 +5983,7 @@
               <a:pPr>
                 <a:defRPr/>
               </a:pPr>
-              <a:t>30/03/2012</a:t>
+              <a:t>02/04/2012</a:t>
             </a:fld>
             <a:endParaRPr lang="pt-BR"/>
           </a:p>
@@ -5998,7 +6086,7 @@
               <a:pPr>
                 <a:defRPr/>
               </a:pPr>
-              <a:t>‹#›</a:t>
+              <a:t>‹nº›</a:t>
             </a:fld>
             <a:endParaRPr lang="pt-BR"/>
           </a:p>
@@ -7313,11 +7401,7 @@
             </a:pPr>
             <a:r>
               <a:rPr lang="pt-BR" sz="2400" dirty="0" smtClean="0"/>
-              <a:t>Existem tipicamente três situações em que o objeto é preparado para coleta tornando-se coletável</a:t>
-            </a:r>
-            <a:r>
-              <a:rPr lang="pt-BR" sz="2400" dirty="0" smtClean="0"/>
-              <a:t>.</a:t>
+              <a:t>Existem tipicamente três situações em que o objeto é preparado para coleta tornando-se coletável.</a:t>
             </a:r>
           </a:p>
           <a:p>
@@ -7336,11 +7420,7 @@
             </a:pPr>
             <a:r>
               <a:rPr lang="pt-BR" sz="2000" dirty="0" smtClean="0"/>
-              <a:t>Exclusão </a:t>
-            </a:r>
-            <a:r>
-              <a:rPr lang="pt-BR" sz="2000" dirty="0" smtClean="0"/>
-              <a:t>de referência</a:t>
+              <a:t>Exclusão de referência</a:t>
             </a:r>
           </a:p>
           <a:p>
@@ -7511,7 +7591,11 @@
               <a:buNone/>
             </a:pPr>
             <a:r>
-              <a:rPr lang="pt-BR" dirty="0" smtClean="0"/>
+              <a:rPr lang="pt-BR" dirty="0" smtClean="0">
+                <a:solidFill>
+                  <a:srgbClr val="FFC000"/>
+                </a:solidFill>
+              </a:rPr>
               <a:t>c = new Object();</a:t>
             </a:r>
           </a:p>
@@ -7523,7 +7607,11 @@
               <a:buNone/>
             </a:pPr>
             <a:r>
-              <a:rPr lang="pt-BR" dirty="0" smtClean="0"/>
+              <a:rPr lang="pt-BR" dirty="0" smtClean="0">
+                <a:solidFill>
+                  <a:srgbClr val="FFC000"/>
+                </a:solidFill>
+              </a:rPr>
               <a:t>....</a:t>
             </a:r>
           </a:p>
@@ -7535,7 +7623,11 @@
               <a:buNone/>
             </a:pPr>
             <a:r>
-              <a:rPr lang="pt-BR" dirty="0" smtClean="0"/>
+              <a:rPr lang="pt-BR" dirty="0" smtClean="0">
+                <a:solidFill>
+                  <a:srgbClr val="FFC000"/>
+                </a:solidFill>
+              </a:rPr>
               <a:t>....</a:t>
             </a:r>
           </a:p>
@@ -7547,10 +7639,13 @@
               <a:buNone/>
             </a:pPr>
             <a:r>
-              <a:rPr lang="pt-BR" dirty="0" smtClean="0"/>
+              <a:rPr lang="pt-BR" dirty="0" smtClean="0">
+                <a:solidFill>
+                  <a:srgbClr val="FFC000"/>
+                </a:solidFill>
+              </a:rPr>
               <a:t>c = null;</a:t>
             </a:r>
-            <a:endParaRPr lang="pt-BR" dirty="0" smtClean="0"/>
           </a:p>
           <a:p>
             <a:pPr lvl="1" indent="-1588">
@@ -7600,7 +7695,7 @@
         </p:nvSpPr>
         <p:spPr>
           <a:xfrm>
-            <a:off x="6929454" y="3929066"/>
+            <a:off x="6370490" y="3929066"/>
             <a:ext cx="360040" cy="360040"/>
           </a:xfrm>
           <a:prstGeom prst="rect">
@@ -7696,7 +7791,7 @@
         </p:nvSpPr>
         <p:spPr>
           <a:xfrm>
-            <a:off x="6715140" y="5000636"/>
+            <a:off x="6156176" y="5013176"/>
             <a:ext cx="792088" cy="648072"/>
           </a:xfrm>
           <a:prstGeom prst="rect">
@@ -7746,9 +7841,9 @@
           <p:nvPr/>
         </p:nvCxnSpPr>
         <p:spPr>
-          <a:xfrm rot="16200000" flipH="1">
-            <a:off x="6754564" y="4644016"/>
-            <a:ext cx="711530" cy="1710"/>
+          <a:xfrm>
+            <a:off x="6550510" y="4289106"/>
+            <a:ext cx="1710" cy="724070"/>
           </a:xfrm>
           <a:prstGeom prst="straightConnector1">
             <a:avLst/>
@@ -8457,7 +8552,6 @@
               <a:rPr lang="pt-BR" dirty="0" smtClean="0"/>
               <a:t>Alteração de referência</a:t>
             </a:r>
-            <a:endParaRPr lang="pt-BR" dirty="0" smtClean="0"/>
           </a:p>
           <a:p>
             <a:pPr lvl="1">
@@ -8467,13 +8561,8 @@
             </a:pPr>
             <a:r>
               <a:rPr lang="pt-BR" dirty="0" smtClean="0"/>
-              <a:t>Ocorre quando a variável que aponta para aquele </a:t>
-            </a:r>
-            <a:r>
-              <a:rPr lang="pt-BR" smtClean="0"/>
-              <a:t>objeto passa a apontar para um outro objeto</a:t>
-            </a:r>
-            <a:endParaRPr lang="pt-BR" dirty="0" smtClean="0"/>
+              <a:t>Ocorre quando a variável que apontava para um objeto passa a apontar para um outro objeto.</a:t>
+            </a:r>
           </a:p>
           <a:p>
             <a:pPr lvl="1" indent="-1588">
@@ -8492,7 +8581,11 @@
               <a:buNone/>
             </a:pPr>
             <a:r>
-              <a:rPr lang="pt-BR" dirty="0" smtClean="0"/>
+              <a:rPr lang="pt-BR" dirty="0" smtClean="0">
+                <a:solidFill>
+                  <a:srgbClr val="FFC000"/>
+                </a:solidFill>
+              </a:rPr>
               <a:t>c = new Object();</a:t>
             </a:r>
           </a:p>
@@ -8504,7 +8597,11 @@
               <a:buNone/>
             </a:pPr>
             <a:r>
-              <a:rPr lang="pt-BR" dirty="0" smtClean="0"/>
+              <a:rPr lang="pt-BR" dirty="0" smtClean="0">
+                <a:solidFill>
+                  <a:srgbClr val="FFC000"/>
+                </a:solidFill>
+              </a:rPr>
               <a:t>....</a:t>
             </a:r>
           </a:p>
@@ -8516,7 +8613,11 @@
               <a:buNone/>
             </a:pPr>
             <a:r>
-              <a:rPr lang="pt-BR" dirty="0" smtClean="0"/>
+              <a:rPr lang="pt-BR" dirty="0" smtClean="0">
+                <a:solidFill>
+                  <a:srgbClr val="FFC000"/>
+                </a:solidFill>
+              </a:rPr>
               <a:t>....</a:t>
             </a:r>
           </a:p>
@@ -8528,19 +8629,45 @@
               <a:buNone/>
             </a:pPr>
             <a:r>
-              <a:rPr lang="pt-BR" dirty="0" smtClean="0"/>
-              <a:t>c = null;</a:t>
-            </a:r>
-            <a:endParaRPr lang="pt-BR" dirty="0" smtClean="0"/>
-          </a:p>
-          <a:p>
-            <a:pPr lvl="1" indent="-1588">
-              <a:spcBef>
-                <a:spcPts val="0"/>
-              </a:spcBef>
-              <a:buNone/>
-            </a:pPr>
-            <a:endParaRPr lang="pt-BR" dirty="0" smtClean="0"/>
+              <a:rPr lang="pt-BR" dirty="0" smtClean="0">
+                <a:solidFill>
+                  <a:srgbClr val="FFC000"/>
+                </a:solidFill>
+              </a:rPr>
+              <a:t>c = </a:t>
+            </a:r>
+            <a:r>
+              <a:rPr lang="pt-BR" dirty="0" err="1" smtClean="0">
+                <a:solidFill>
+                  <a:srgbClr val="FFC000"/>
+                </a:solidFill>
+              </a:rPr>
+              <a:t>new</a:t>
+            </a:r>
+            <a:r>
+              <a:rPr lang="pt-BR" dirty="0" smtClean="0">
+                <a:solidFill>
+                  <a:srgbClr val="FFC000"/>
+                </a:solidFill>
+              </a:rPr>
+              <a:t> </a:t>
+            </a:r>
+            <a:r>
+              <a:rPr lang="pt-BR" dirty="0" err="1" smtClean="0">
+                <a:solidFill>
+                  <a:srgbClr val="FFC000"/>
+                </a:solidFill>
+              </a:rPr>
+              <a:t>Object</a:t>
+            </a:r>
+            <a:r>
+              <a:rPr lang="pt-BR" dirty="0" smtClean="0">
+                <a:solidFill>
+                  <a:srgbClr val="FFC000"/>
+                </a:solidFill>
+              </a:rPr>
+              <a:t>();</a:t>
+            </a:r>
           </a:p>
         </p:txBody>
       </p:sp>
@@ -8581,7 +8708,7 @@
         </p:nvSpPr>
         <p:spPr>
           <a:xfrm>
-            <a:off x="6929454" y="3929066"/>
+            <a:off x="6370490" y="3929066"/>
             <a:ext cx="360040" cy="360040"/>
           </a:xfrm>
           <a:prstGeom prst="rect">
@@ -8677,7 +8804,7 @@
         </p:nvSpPr>
         <p:spPr>
           <a:xfrm>
-            <a:off x="6715140" y="5000636"/>
+            <a:off x="6156176" y="5013176"/>
             <a:ext cx="792088" cy="648072"/>
           </a:xfrm>
           <a:prstGeom prst="rect">
@@ -8727,11 +8854,98 @@
           <p:nvPr/>
         </p:nvCxnSpPr>
         <p:spPr>
-          <a:xfrm rot="16200000" flipH="1">
-            <a:off x="6754564" y="4644016"/>
-            <a:ext cx="711530" cy="1710"/>
+          <a:xfrm>
+            <a:off x="6550510" y="4289106"/>
+            <a:ext cx="1710" cy="724070"/>
           </a:xfrm>
           <a:prstGeom prst="straightConnector1">
+            <a:avLst/>
+          </a:prstGeom>
+          <a:ln>
+            <a:solidFill>
+              <a:schemeClr val="tx1"/>
+            </a:solidFill>
+            <a:tailEnd type="arrow"/>
+          </a:ln>
+        </p:spPr>
+        <p:style>
+          <a:lnRef idx="1">
+            <a:schemeClr val="accent1"/>
+          </a:lnRef>
+          <a:fillRef idx="0">
+            <a:schemeClr val="accent1"/>
+          </a:fillRef>
+          <a:effectRef idx="0">
+            <a:schemeClr val="accent1"/>
+          </a:effectRef>
+          <a:fontRef idx="minor">
+            <a:schemeClr val="tx1"/>
+          </a:fontRef>
+        </p:style>
+      </p:cxnSp>
+      <p:sp>
+        <p:nvSpPr>
+          <p:cNvPr id="9" name="Retângulo 13"/>
+          <p:cNvSpPr/>
+          <p:nvPr/>
+        </p:nvSpPr>
+        <p:spPr>
+          <a:xfrm>
+            <a:off x="7236296" y="5013176"/>
+            <a:ext cx="792088" cy="648072"/>
+          </a:xfrm>
+          <a:prstGeom prst="rect">
+            <a:avLst/>
+          </a:prstGeom>
+          <a:solidFill>
+            <a:srgbClr val="FFC000"/>
+          </a:solidFill>
+          <a:ln w="28575">
+            <a:solidFill>
+              <a:schemeClr val="tx1"/>
+            </a:solidFill>
+          </a:ln>
+        </p:spPr>
+        <p:style>
+          <a:lnRef idx="2">
+            <a:schemeClr val="accent1">
+              <a:shade val="50000"/>
+            </a:schemeClr>
+          </a:lnRef>
+          <a:fillRef idx="1">
+            <a:schemeClr val="accent1"/>
+          </a:fillRef>
+          <a:effectRef idx="0">
+            <a:schemeClr val="accent1"/>
+          </a:effectRef>
+          <a:fontRef idx="minor">
+            <a:schemeClr val="lt1"/>
+          </a:fontRef>
+        </p:style>
+        <p:txBody>
+          <a:bodyPr rtlCol="0" anchor="ctr"/>
+          <a:lstStyle/>
+          <a:p>
+            <a:pPr algn="ctr"/>
+            <a:endParaRPr lang="pt-BR" dirty="0"/>
+          </a:p>
+        </p:txBody>
+      </p:sp>
+      <p:cxnSp>
+        <p:nvCxnSpPr>
+          <p:cNvPr id="11" name="Forma 10"/>
+          <p:cNvCxnSpPr>
+            <a:stCxn id="5" idx="3"/>
+            <a:endCxn id="9" idx="0"/>
+          </p:cNvCxnSpPr>
+          <p:nvPr/>
+        </p:nvCxnSpPr>
+        <p:spPr>
+          <a:xfrm>
+            <a:off x="6730530" y="4109086"/>
+            <a:ext cx="901810" cy="904090"/>
+          </a:xfrm>
+          <a:prstGeom prst="bentConnector2">
             <a:avLst/>
           </a:prstGeom>
           <a:ln>
@@ -8761,6 +8975,7 @@
   <p:clrMapOvr>
     <a:masterClrMapping/>
   </p:clrMapOvr>
+  <p:transition/>
   <p:timing>
     <p:tnLst>
       <p:par>
@@ -9332,6 +9547,76 @@
                                   </p:childTnLst>
                                 </p:cTn>
                               </p:par>
+                              <p:par>
+                                <p:cTn id="40" presetID="3" presetClass="entr" presetSubtype="10" fill="hold" grpId="0" nodeType="withEffect">
+                                  <p:stCondLst>
+                                    <p:cond delay="0"/>
+                                  </p:stCondLst>
+                                  <p:childTnLst>
+                                    <p:set>
+                                      <p:cBhvr>
+                                        <p:cTn id="41" dur="1" fill="hold">
+                                          <p:stCondLst>
+                                            <p:cond delay="0"/>
+                                          </p:stCondLst>
+                                        </p:cTn>
+                                        <p:tgtEl>
+                                          <p:spTgt spid="9"/>
+                                        </p:tgtEl>
+                                        <p:attrNameLst>
+                                          <p:attrName>style.visibility</p:attrName>
+                                        </p:attrNameLst>
+                                      </p:cBhvr>
+                                      <p:to>
+                                        <p:strVal val="visible"/>
+                                      </p:to>
+                                    </p:set>
+                                    <p:animEffect transition="in" filter="blinds(horizontal)">
+                                      <p:cBhvr>
+                                        <p:cTn id="42" dur="500"/>
+                                        <p:tgtEl>
+                                          <p:spTgt spid="9"/>
+                                        </p:tgtEl>
+                                      </p:cBhvr>
+                                    </p:animEffect>
+                                  </p:childTnLst>
+                                </p:cTn>
+                              </p:par>
+                              <p:par>
+                                <p:cTn id="43" presetID="3" presetClass="entr" presetSubtype="10" fill="hold" nodeType="withEffect">
+                                  <p:stCondLst>
+                                    <p:cond delay="0"/>
+                                  </p:stCondLst>
+                                  <p:childTnLst>
+                                    <p:set>
+                                      <p:cBhvr>
+                                        <p:cTn id="44" dur="1" fill="hold">
+                                          <p:stCondLst>
+                                            <p:cond delay="0"/>
+                                          </p:stCondLst>
+                                        </p:cTn>
+                                        <p:tgtEl>
+                                          <p:spTgt spid="11"/>
+                                        </p:tgtEl>
+                                        <p:attrNameLst>
+                                          <p:attrName>style.visibility</p:attrName>
+                                        </p:attrNameLst>
+                                      </p:cBhvr>
+                                      <p:to>
+                                        <p:strVal val="visible"/>
+                                      </p:to>
+                                    </p:set>
+                                    <p:animEffect transition="in" filter="blinds(horizontal)">
+                                      <p:cBhvr>
+                                        <p:cTn id="45" dur="500"/>
+                                        <p:tgtEl>
+                                          <p:spTgt spid="11"/>
+                                        </p:tgtEl>
+                                      </p:cBhvr>
+                                    </p:animEffect>
+                                  </p:childTnLst>
+                                </p:cTn>
+                              </p:par>
                             </p:childTnLst>
                           </p:cTn>
                         </p:par>
@@ -9363,6 +9648,7 @@
       <p:bldP spid="5" grpId="0" animBg="1"/>
       <p:bldP spid="6" grpId="0" animBg="1"/>
       <p:bldP spid="7" grpId="0" animBg="1"/>
+      <p:bldP spid="9" grpId="0" animBg="1"/>
     </p:bldLst>
   </p:timing>
 </p:sld>
@@ -9424,7 +9710,12 @@
             <p:ph idx="1"/>
           </p:nvPr>
         </p:nvSpPr>
-        <p:spPr/>
+        <p:spPr>
+          <a:xfrm>
+            <a:off x="457200" y="1600200"/>
+            <a:ext cx="8003232" cy="4525963"/>
+          </a:xfrm>
+        </p:spPr>
         <p:txBody>
           <a:bodyPr/>
           <a:lstStyle/>
@@ -9438,7 +9729,250 @@
               <a:rPr lang="pt-BR" dirty="0" smtClean="0"/>
               <a:t>Isolamento de referência</a:t>
             </a:r>
-            <a:endParaRPr lang="pt-BR" dirty="0"/>
+          </a:p>
+          <a:p>
+            <a:pPr lvl="1">
+              <a:spcBef>
+                <a:spcPts val="3000"/>
+              </a:spcBef>
+            </a:pPr>
+            <a:r>
+              <a:rPr lang="pt-BR" dirty="0" smtClean="0"/>
+              <a:t>O </a:t>
+            </a:r>
+            <a:r>
+              <a:rPr lang="pt-BR" dirty="0" err="1" smtClean="0"/>
+              <a:t>Garbage</a:t>
+            </a:r>
+            <a:r>
+              <a:rPr lang="pt-BR" dirty="0" smtClean="0"/>
+              <a:t> </a:t>
+            </a:r>
+            <a:r>
+              <a:rPr lang="pt-BR" dirty="0" err="1" smtClean="0"/>
+              <a:t>Collector</a:t>
+            </a:r>
+            <a:r>
+              <a:rPr lang="pt-BR" dirty="0" smtClean="0"/>
+              <a:t> consegue identificar também referências circulares em sua aplicação, removendo-as caso seja necessário</a:t>
+            </a:r>
+          </a:p>
+          <a:p>
+            <a:pPr lvl="1" indent="-1588">
+              <a:spcBef>
+                <a:spcPts val="0"/>
+              </a:spcBef>
+              <a:buNone/>
+            </a:pPr>
+            <a:endParaRPr lang="pt-BR" dirty="0" smtClean="0"/>
+          </a:p>
+          <a:p>
+            <a:pPr lvl="1" indent="-1588">
+              <a:spcBef>
+                <a:spcPts val="0"/>
+              </a:spcBef>
+              <a:buNone/>
+            </a:pPr>
+            <a:r>
+              <a:rPr lang="pt-BR" dirty="0" smtClean="0">
+                <a:solidFill>
+                  <a:srgbClr val="FFC000"/>
+                </a:solidFill>
+              </a:rPr>
+              <a:t>x = </a:t>
+            </a:r>
+            <a:r>
+              <a:rPr lang="pt-BR" dirty="0" err="1" smtClean="0">
+                <a:solidFill>
+                  <a:srgbClr val="FFC000"/>
+                </a:solidFill>
+              </a:rPr>
+              <a:t>new</a:t>
+            </a:r>
+            <a:r>
+              <a:rPr lang="pt-BR" dirty="0" smtClean="0">
+                <a:solidFill>
+                  <a:srgbClr val="FFC000"/>
+                </a:solidFill>
+              </a:rPr>
+              <a:t> </a:t>
+            </a:r>
+            <a:r>
+              <a:rPr lang="pt-BR" dirty="0" err="1" smtClean="0">
+                <a:solidFill>
+                  <a:srgbClr val="FFC000"/>
+                </a:solidFill>
+              </a:rPr>
+              <a:t>Funcionario</a:t>
+            </a:r>
+            <a:r>
+              <a:rPr lang="pt-BR" dirty="0" smtClean="0">
+                <a:solidFill>
+                  <a:srgbClr val="FFC000"/>
+                </a:solidFill>
+              </a:rPr>
+              <a:t>();</a:t>
+            </a:r>
+          </a:p>
+          <a:p>
+            <a:pPr lvl="1" indent="-1588">
+              <a:spcBef>
+                <a:spcPts val="0"/>
+              </a:spcBef>
+              <a:buNone/>
+            </a:pPr>
+            <a:r>
+              <a:rPr lang="pt-BR" dirty="0" smtClean="0">
+                <a:solidFill>
+                  <a:srgbClr val="FFC000"/>
+                </a:solidFill>
+              </a:rPr>
+              <a:t>y = </a:t>
+            </a:r>
+            <a:r>
+              <a:rPr lang="pt-BR" dirty="0" err="1" smtClean="0">
+                <a:solidFill>
+                  <a:srgbClr val="FFC000"/>
+                </a:solidFill>
+              </a:rPr>
+              <a:t>new</a:t>
+            </a:r>
+            <a:r>
+              <a:rPr lang="pt-BR" dirty="0" smtClean="0">
+                <a:solidFill>
+                  <a:srgbClr val="FFC000"/>
+                </a:solidFill>
+              </a:rPr>
+              <a:t> </a:t>
+            </a:r>
+            <a:r>
+              <a:rPr lang="pt-BR" dirty="0" err="1" smtClean="0">
+                <a:solidFill>
+                  <a:srgbClr val="FFC000"/>
+                </a:solidFill>
+              </a:rPr>
+              <a:t>Funcionario</a:t>
+            </a:r>
+            <a:r>
+              <a:rPr lang="pt-BR" dirty="0" smtClean="0">
+                <a:solidFill>
+                  <a:srgbClr val="FFC000"/>
+                </a:solidFill>
+              </a:rPr>
+              <a:t>();</a:t>
+            </a:r>
+          </a:p>
+          <a:p>
+            <a:pPr lvl="1" indent="-1588">
+              <a:spcBef>
+                <a:spcPts val="0"/>
+              </a:spcBef>
+              <a:buNone/>
+            </a:pPr>
+            <a:r>
+              <a:rPr lang="pt-BR" dirty="0" err="1" smtClean="0">
+                <a:solidFill>
+                  <a:srgbClr val="FFC000"/>
+                </a:solidFill>
+              </a:rPr>
+              <a:t>x.setEncarregado</a:t>
+            </a:r>
+            <a:r>
+              <a:rPr lang="pt-BR" dirty="0" smtClean="0">
+                <a:solidFill>
+                  <a:srgbClr val="FFC000"/>
+                </a:solidFill>
+              </a:rPr>
+              <a:t>(y);</a:t>
+            </a:r>
+          </a:p>
+          <a:p>
+            <a:pPr lvl="1" indent="-1588">
+              <a:spcBef>
+                <a:spcPts val="0"/>
+              </a:spcBef>
+              <a:buNone/>
+            </a:pPr>
+            <a:r>
+              <a:rPr lang="pt-BR" dirty="0" err="1" smtClean="0">
+                <a:solidFill>
+                  <a:srgbClr val="FFC000"/>
+                </a:solidFill>
+              </a:rPr>
+              <a:t>y.setEncarregado</a:t>
+            </a:r>
+            <a:r>
+              <a:rPr lang="pt-BR" dirty="0" smtClean="0">
+                <a:solidFill>
+                  <a:srgbClr val="FFC000"/>
+                </a:solidFill>
+              </a:rPr>
+              <a:t>(x);</a:t>
+            </a:r>
+          </a:p>
+          <a:p>
+            <a:pPr lvl="1" indent="-1588">
+              <a:spcBef>
+                <a:spcPts val="0"/>
+              </a:spcBef>
+              <a:buNone/>
+            </a:pPr>
+            <a:r>
+              <a:rPr lang="pt-BR" dirty="0" smtClean="0">
+                <a:solidFill>
+                  <a:srgbClr val="FFC000"/>
+                </a:solidFill>
+              </a:rPr>
+              <a:t>y = </a:t>
+            </a:r>
+            <a:r>
+              <a:rPr lang="pt-BR" dirty="0" err="1" smtClean="0">
+                <a:solidFill>
+                  <a:srgbClr val="FFC000"/>
+                </a:solidFill>
+              </a:rPr>
+              <a:t>null</a:t>
+            </a:r>
+            <a:r>
+              <a:rPr lang="pt-BR" dirty="0" smtClean="0">
+                <a:solidFill>
+                  <a:srgbClr val="FFC000"/>
+                </a:solidFill>
+              </a:rPr>
+              <a:t>;</a:t>
+            </a:r>
+          </a:p>
+          <a:p>
+            <a:pPr lvl="1" indent="-1588">
+              <a:spcBef>
+                <a:spcPts val="0"/>
+              </a:spcBef>
+              <a:buNone/>
+            </a:pPr>
+            <a:r>
+              <a:rPr lang="pt-BR" dirty="0" smtClean="0">
+                <a:solidFill>
+                  <a:srgbClr val="FFC000"/>
+                </a:solidFill>
+              </a:rPr>
+              <a:t>x = </a:t>
+            </a:r>
+            <a:r>
+              <a:rPr lang="pt-BR" dirty="0" err="1" smtClean="0">
+                <a:solidFill>
+                  <a:srgbClr val="FFC000"/>
+                </a:solidFill>
+              </a:rPr>
+              <a:t>null</a:t>
+            </a:r>
+            <a:r>
+              <a:rPr lang="pt-BR" dirty="0" smtClean="0">
+                <a:solidFill>
+                  <a:srgbClr val="FFC000"/>
+                </a:solidFill>
+              </a:rPr>
+              <a:t>;</a:t>
+            </a:r>
           </a:p>
         </p:txBody>
       </p:sp>
@@ -9471,17 +10005,2015 @@
           </a:p>
         </p:txBody>
       </p:sp>
+      <p:sp>
+        <p:nvSpPr>
+          <p:cNvPr id="5" name="Retângulo 5"/>
+          <p:cNvSpPr/>
+          <p:nvPr/>
+        </p:nvSpPr>
+        <p:spPr>
+          <a:xfrm>
+            <a:off x="6372200" y="3933056"/>
+            <a:ext cx="360040" cy="360040"/>
+          </a:xfrm>
+          <a:prstGeom prst="rect">
+            <a:avLst/>
+          </a:prstGeom>
+          <a:noFill/>
+          <a:ln w="28575">
+            <a:solidFill>
+              <a:schemeClr val="tx1"/>
+            </a:solidFill>
+          </a:ln>
+        </p:spPr>
+        <p:style>
+          <a:lnRef idx="2">
+            <a:schemeClr val="accent1">
+              <a:shade val="50000"/>
+            </a:schemeClr>
+          </a:lnRef>
+          <a:fillRef idx="1">
+            <a:schemeClr val="accent1"/>
+          </a:fillRef>
+          <a:effectRef idx="0">
+            <a:schemeClr val="accent1"/>
+          </a:effectRef>
+          <a:fontRef idx="minor">
+            <a:schemeClr val="lt1"/>
+          </a:fontRef>
+        </p:style>
+        <p:txBody>
+          <a:bodyPr rtlCol="0" anchor="ctr"/>
+          <a:lstStyle/>
+          <a:p>
+            <a:pPr algn="ctr"/>
+            <a:r>
+              <a:rPr lang="pt-BR" dirty="0" smtClean="0"/>
+              <a:t>x</a:t>
+            </a:r>
+            <a:endParaRPr lang="pt-BR" dirty="0"/>
+          </a:p>
+        </p:txBody>
+      </p:sp>
+      <p:sp>
+        <p:nvSpPr>
+          <p:cNvPr id="6" name="Retângulo de cantos arredondados 12"/>
+          <p:cNvSpPr/>
+          <p:nvPr/>
+        </p:nvSpPr>
+        <p:spPr>
+          <a:xfrm>
+            <a:off x="5857884" y="4572008"/>
+            <a:ext cx="2500330" cy="1643074"/>
+          </a:xfrm>
+          <a:prstGeom prst="roundRect">
+            <a:avLst/>
+          </a:prstGeom>
+          <a:noFill/>
+          <a:ln w="28575">
+            <a:solidFill>
+              <a:srgbClr val="FFC000"/>
+            </a:solidFill>
+          </a:ln>
+        </p:spPr>
+        <p:style>
+          <a:lnRef idx="2">
+            <a:schemeClr val="accent1">
+              <a:shade val="50000"/>
+            </a:schemeClr>
+          </a:lnRef>
+          <a:fillRef idx="1">
+            <a:schemeClr val="accent1"/>
+          </a:fillRef>
+          <a:effectRef idx="0">
+            <a:schemeClr val="accent1"/>
+          </a:effectRef>
+          <a:fontRef idx="minor">
+            <a:schemeClr val="lt1"/>
+          </a:fontRef>
+        </p:style>
+        <p:txBody>
+          <a:bodyPr rtlCol="0" anchor="ctr"/>
+          <a:lstStyle/>
+          <a:p>
+            <a:pPr algn="ctr"/>
+            <a:endParaRPr lang="pt-BR"/>
+          </a:p>
+        </p:txBody>
+      </p:sp>
+      <p:sp>
+        <p:nvSpPr>
+          <p:cNvPr id="7" name="Retângulo 13"/>
+          <p:cNvSpPr/>
+          <p:nvPr/>
+        </p:nvSpPr>
+        <p:spPr>
+          <a:xfrm>
+            <a:off x="6156176" y="5013176"/>
+            <a:ext cx="792088" cy="432048"/>
+          </a:xfrm>
+          <a:prstGeom prst="rect">
+            <a:avLst/>
+          </a:prstGeom>
+          <a:solidFill>
+            <a:srgbClr val="FFC000"/>
+          </a:solidFill>
+          <a:ln w="28575">
+            <a:solidFill>
+              <a:schemeClr val="tx1"/>
+            </a:solidFill>
+          </a:ln>
+        </p:spPr>
+        <p:style>
+          <a:lnRef idx="2">
+            <a:schemeClr val="accent1">
+              <a:shade val="50000"/>
+            </a:schemeClr>
+          </a:lnRef>
+          <a:fillRef idx="1">
+            <a:schemeClr val="accent1"/>
+          </a:fillRef>
+          <a:effectRef idx="0">
+            <a:schemeClr val="accent1"/>
+          </a:effectRef>
+          <a:fontRef idx="minor">
+            <a:schemeClr val="lt1"/>
+          </a:fontRef>
+        </p:style>
+        <p:txBody>
+          <a:bodyPr rtlCol="0" anchor="ctr"/>
+          <a:lstStyle/>
+          <a:p>
+            <a:pPr algn="ctr"/>
+            <a:endParaRPr lang="pt-BR" dirty="0"/>
+          </a:p>
+        </p:txBody>
+      </p:sp>
+      <p:cxnSp>
+        <p:nvCxnSpPr>
+          <p:cNvPr id="8" name="Conector de seta reta 53"/>
+          <p:cNvCxnSpPr>
+            <a:stCxn id="5" idx="2"/>
+            <a:endCxn id="7" idx="0"/>
+          </p:cNvCxnSpPr>
+          <p:nvPr/>
+        </p:nvCxnSpPr>
+        <p:spPr>
+          <a:xfrm>
+            <a:off x="6552220" y="4293096"/>
+            <a:ext cx="0" cy="720080"/>
+          </a:xfrm>
+          <a:prstGeom prst="straightConnector1">
+            <a:avLst/>
+          </a:prstGeom>
+          <a:ln>
+            <a:solidFill>
+              <a:schemeClr val="tx1"/>
+            </a:solidFill>
+            <a:tailEnd type="arrow"/>
+          </a:ln>
+        </p:spPr>
+        <p:style>
+          <a:lnRef idx="1">
+            <a:schemeClr val="accent1"/>
+          </a:lnRef>
+          <a:fillRef idx="0">
+            <a:schemeClr val="accent1"/>
+          </a:fillRef>
+          <a:effectRef idx="0">
+            <a:schemeClr val="accent1"/>
+          </a:effectRef>
+          <a:fontRef idx="minor">
+            <a:schemeClr val="tx1"/>
+          </a:fontRef>
+        </p:style>
+      </p:cxnSp>
+      <p:sp>
+        <p:nvSpPr>
+          <p:cNvPr id="9" name="Retângulo 13"/>
+          <p:cNvSpPr/>
+          <p:nvPr/>
+        </p:nvSpPr>
+        <p:spPr>
+          <a:xfrm>
+            <a:off x="7236296" y="5013176"/>
+            <a:ext cx="792088" cy="432048"/>
+          </a:xfrm>
+          <a:prstGeom prst="rect">
+            <a:avLst/>
+          </a:prstGeom>
+          <a:solidFill>
+            <a:srgbClr val="FFC000"/>
+          </a:solidFill>
+          <a:ln w="28575">
+            <a:solidFill>
+              <a:schemeClr val="tx1"/>
+            </a:solidFill>
+          </a:ln>
+        </p:spPr>
+        <p:style>
+          <a:lnRef idx="2">
+            <a:schemeClr val="accent1">
+              <a:shade val="50000"/>
+            </a:schemeClr>
+          </a:lnRef>
+          <a:fillRef idx="1">
+            <a:schemeClr val="accent1"/>
+          </a:fillRef>
+          <a:effectRef idx="0">
+            <a:schemeClr val="accent1"/>
+          </a:effectRef>
+          <a:fontRef idx="minor">
+            <a:schemeClr val="lt1"/>
+          </a:fontRef>
+        </p:style>
+        <p:txBody>
+          <a:bodyPr rtlCol="0" anchor="ctr"/>
+          <a:lstStyle/>
+          <a:p>
+            <a:pPr algn="ctr"/>
+            <a:endParaRPr lang="pt-BR" dirty="0"/>
+          </a:p>
+        </p:txBody>
+      </p:sp>
+      <p:sp>
+        <p:nvSpPr>
+          <p:cNvPr id="12" name="Retângulo 5"/>
+          <p:cNvSpPr/>
+          <p:nvPr/>
+        </p:nvSpPr>
+        <p:spPr>
+          <a:xfrm>
+            <a:off x="7452320" y="3933056"/>
+            <a:ext cx="360040" cy="360040"/>
+          </a:xfrm>
+          <a:prstGeom prst="rect">
+            <a:avLst/>
+          </a:prstGeom>
+          <a:noFill/>
+          <a:ln w="28575">
+            <a:solidFill>
+              <a:schemeClr val="tx1"/>
+            </a:solidFill>
+          </a:ln>
+        </p:spPr>
+        <p:style>
+          <a:lnRef idx="2">
+            <a:schemeClr val="accent1">
+              <a:shade val="50000"/>
+            </a:schemeClr>
+          </a:lnRef>
+          <a:fillRef idx="1">
+            <a:schemeClr val="accent1"/>
+          </a:fillRef>
+          <a:effectRef idx="0">
+            <a:schemeClr val="accent1"/>
+          </a:effectRef>
+          <a:fontRef idx="minor">
+            <a:schemeClr val="lt1"/>
+          </a:fontRef>
+        </p:style>
+        <p:txBody>
+          <a:bodyPr rtlCol="0" anchor="ctr"/>
+          <a:lstStyle/>
+          <a:p>
+            <a:pPr algn="ctr"/>
+            <a:r>
+              <a:rPr lang="pt-BR" dirty="0" smtClean="0"/>
+              <a:t>y</a:t>
+            </a:r>
+            <a:endParaRPr lang="pt-BR" dirty="0"/>
+          </a:p>
+        </p:txBody>
+      </p:sp>
+      <p:sp>
+        <p:nvSpPr>
+          <p:cNvPr id="13" name="Retângulo 13"/>
+          <p:cNvSpPr/>
+          <p:nvPr/>
+        </p:nvSpPr>
+        <p:spPr>
+          <a:xfrm>
+            <a:off x="6156176" y="5445224"/>
+            <a:ext cx="792088" cy="216024"/>
+          </a:xfrm>
+          <a:prstGeom prst="rect">
+            <a:avLst/>
+          </a:prstGeom>
+          <a:solidFill>
+            <a:srgbClr val="FFC000"/>
+          </a:solidFill>
+          <a:ln w="28575">
+            <a:solidFill>
+              <a:schemeClr val="tx1"/>
+            </a:solidFill>
+          </a:ln>
+        </p:spPr>
+        <p:style>
+          <a:lnRef idx="2">
+            <a:schemeClr val="accent1">
+              <a:shade val="50000"/>
+            </a:schemeClr>
+          </a:lnRef>
+          <a:fillRef idx="1">
+            <a:schemeClr val="accent1"/>
+          </a:fillRef>
+          <a:effectRef idx="0">
+            <a:schemeClr val="accent1"/>
+          </a:effectRef>
+          <a:fontRef idx="minor">
+            <a:schemeClr val="lt1"/>
+          </a:fontRef>
+        </p:style>
+        <p:txBody>
+          <a:bodyPr rtlCol="0" anchor="ctr"/>
+          <a:lstStyle/>
+          <a:p>
+            <a:pPr algn="ctr"/>
+            <a:endParaRPr lang="pt-BR" dirty="0"/>
+          </a:p>
+        </p:txBody>
+      </p:sp>
+      <p:sp>
+        <p:nvSpPr>
+          <p:cNvPr id="16" name="Retângulo 13"/>
+          <p:cNvSpPr/>
+          <p:nvPr/>
+        </p:nvSpPr>
+        <p:spPr>
+          <a:xfrm>
+            <a:off x="7236296" y="5445224"/>
+            <a:ext cx="792088" cy="216024"/>
+          </a:xfrm>
+          <a:prstGeom prst="rect">
+            <a:avLst/>
+          </a:prstGeom>
+          <a:solidFill>
+            <a:srgbClr val="FFC000"/>
+          </a:solidFill>
+          <a:ln w="28575">
+            <a:solidFill>
+              <a:schemeClr val="tx1"/>
+            </a:solidFill>
+          </a:ln>
+        </p:spPr>
+        <p:style>
+          <a:lnRef idx="2">
+            <a:schemeClr val="accent1">
+              <a:shade val="50000"/>
+            </a:schemeClr>
+          </a:lnRef>
+          <a:fillRef idx="1">
+            <a:schemeClr val="accent1"/>
+          </a:fillRef>
+          <a:effectRef idx="0">
+            <a:schemeClr val="accent1"/>
+          </a:effectRef>
+          <a:fontRef idx="minor">
+            <a:schemeClr val="lt1"/>
+          </a:fontRef>
+        </p:style>
+        <p:txBody>
+          <a:bodyPr rtlCol="0" anchor="ctr"/>
+          <a:lstStyle/>
+          <a:p>
+            <a:pPr algn="ctr"/>
+            <a:endParaRPr lang="pt-BR" dirty="0"/>
+          </a:p>
+        </p:txBody>
+      </p:sp>
+      <p:cxnSp>
+        <p:nvCxnSpPr>
+          <p:cNvPr id="17" name="Conector de seta reta 53"/>
+          <p:cNvCxnSpPr>
+            <a:stCxn id="12" idx="2"/>
+            <a:endCxn id="9" idx="0"/>
+          </p:cNvCxnSpPr>
+          <p:nvPr/>
+        </p:nvCxnSpPr>
+        <p:spPr>
+          <a:xfrm>
+            <a:off x="7632340" y="4293096"/>
+            <a:ext cx="0" cy="720080"/>
+          </a:xfrm>
+          <a:prstGeom prst="straightConnector1">
+            <a:avLst/>
+          </a:prstGeom>
+          <a:ln>
+            <a:solidFill>
+              <a:schemeClr val="tx1"/>
+            </a:solidFill>
+            <a:tailEnd type="arrow"/>
+          </a:ln>
+        </p:spPr>
+        <p:style>
+          <a:lnRef idx="1">
+            <a:schemeClr val="accent1"/>
+          </a:lnRef>
+          <a:fillRef idx="0">
+            <a:schemeClr val="accent1"/>
+          </a:fillRef>
+          <a:effectRef idx="0">
+            <a:schemeClr val="accent1"/>
+          </a:effectRef>
+          <a:fontRef idx="minor">
+            <a:schemeClr val="tx1"/>
+          </a:fontRef>
+        </p:style>
+      </p:cxnSp>
+      <p:grpSp>
+        <p:nvGrpSpPr>
+          <p:cNvPr id="37" name="Grupo 36"/>
+          <p:cNvGrpSpPr/>
+          <p:nvPr/>
+        </p:nvGrpSpPr>
+        <p:grpSpPr>
+          <a:xfrm>
+            <a:off x="6497929" y="4797152"/>
+            <a:ext cx="882383" cy="1008112"/>
+            <a:chOff x="4418356" y="5238201"/>
+            <a:chExt cx="1338195" cy="1071119"/>
+          </a:xfrm>
+        </p:grpSpPr>
+        <p:cxnSp>
+          <p:nvCxnSpPr>
+            <p:cNvPr id="21" name="Conector reto 20"/>
+            <p:cNvCxnSpPr/>
+            <p:nvPr/>
+          </p:nvCxnSpPr>
+          <p:spPr>
+            <a:xfrm flipV="1">
+              <a:off x="4499992" y="6021288"/>
+              <a:ext cx="0" cy="288032"/>
+            </a:xfrm>
+            <a:prstGeom prst="line">
+              <a:avLst/>
+            </a:prstGeom>
+            <a:ln>
+              <a:solidFill>
+                <a:schemeClr val="tx1"/>
+              </a:solidFill>
+            </a:ln>
+          </p:spPr>
+          <p:style>
+            <a:lnRef idx="1">
+              <a:schemeClr val="accent1"/>
+            </a:lnRef>
+            <a:fillRef idx="0">
+              <a:schemeClr val="accent1"/>
+            </a:fillRef>
+            <a:effectRef idx="0">
+              <a:schemeClr val="accent1"/>
+            </a:effectRef>
+            <a:fontRef idx="minor">
+              <a:schemeClr val="tx1"/>
+            </a:fontRef>
+          </p:style>
+        </p:cxnSp>
+        <p:cxnSp>
+          <p:nvCxnSpPr>
+            <p:cNvPr id="22" name="Conector reto 21"/>
+            <p:cNvCxnSpPr/>
+            <p:nvPr/>
+          </p:nvCxnSpPr>
+          <p:spPr>
+            <a:xfrm>
+              <a:off x="4499992" y="6309320"/>
+              <a:ext cx="792088" cy="0"/>
+            </a:xfrm>
+            <a:prstGeom prst="line">
+              <a:avLst/>
+            </a:prstGeom>
+            <a:ln>
+              <a:solidFill>
+                <a:schemeClr val="tx1"/>
+              </a:solidFill>
+            </a:ln>
+          </p:spPr>
+          <p:style>
+            <a:lnRef idx="1">
+              <a:schemeClr val="accent1"/>
+            </a:lnRef>
+            <a:fillRef idx="0">
+              <a:schemeClr val="accent1"/>
+            </a:fillRef>
+            <a:effectRef idx="0">
+              <a:schemeClr val="accent1"/>
+            </a:effectRef>
+            <a:fontRef idx="minor">
+              <a:schemeClr val="tx1"/>
+            </a:fontRef>
+          </p:style>
+        </p:cxnSp>
+        <p:cxnSp>
+          <p:nvCxnSpPr>
+            <p:cNvPr id="27" name="Conector reto 26"/>
+            <p:cNvCxnSpPr/>
+            <p:nvPr/>
+          </p:nvCxnSpPr>
+          <p:spPr>
+            <a:xfrm flipV="1">
+              <a:off x="5292080" y="5238201"/>
+              <a:ext cx="0" cy="1071119"/>
+            </a:xfrm>
+            <a:prstGeom prst="line">
+              <a:avLst/>
+            </a:prstGeom>
+            <a:ln>
+              <a:solidFill>
+                <a:schemeClr val="tx1"/>
+              </a:solidFill>
+            </a:ln>
+          </p:spPr>
+          <p:style>
+            <a:lnRef idx="1">
+              <a:schemeClr val="accent1"/>
+            </a:lnRef>
+            <a:fillRef idx="0">
+              <a:schemeClr val="accent1"/>
+            </a:fillRef>
+            <a:effectRef idx="0">
+              <a:schemeClr val="accent1"/>
+            </a:effectRef>
+            <a:fontRef idx="minor">
+              <a:schemeClr val="tx1"/>
+            </a:fontRef>
+          </p:style>
+        </p:cxnSp>
+        <p:cxnSp>
+          <p:nvCxnSpPr>
+            <p:cNvPr id="29" name="Conector reto 28"/>
+            <p:cNvCxnSpPr/>
+            <p:nvPr/>
+          </p:nvCxnSpPr>
+          <p:spPr>
+            <a:xfrm>
+              <a:off x="5292080" y="5238201"/>
+              <a:ext cx="464471" cy="0"/>
+            </a:xfrm>
+            <a:prstGeom prst="line">
+              <a:avLst/>
+            </a:prstGeom>
+            <a:ln>
+              <a:solidFill>
+                <a:schemeClr val="tx1"/>
+              </a:solidFill>
+            </a:ln>
+          </p:spPr>
+          <p:style>
+            <a:lnRef idx="1">
+              <a:schemeClr val="accent1"/>
+            </a:lnRef>
+            <a:fillRef idx="0">
+              <a:schemeClr val="accent1"/>
+            </a:fillRef>
+            <a:effectRef idx="0">
+              <a:schemeClr val="accent1"/>
+            </a:effectRef>
+            <a:fontRef idx="minor">
+              <a:schemeClr val="tx1"/>
+            </a:fontRef>
+          </p:style>
+        </p:cxnSp>
+        <p:cxnSp>
+          <p:nvCxnSpPr>
+            <p:cNvPr id="33" name="Conector reto 32"/>
+            <p:cNvCxnSpPr/>
+            <p:nvPr/>
+          </p:nvCxnSpPr>
+          <p:spPr>
+            <a:xfrm flipV="1">
+              <a:off x="5756551" y="5238201"/>
+              <a:ext cx="0" cy="229526"/>
+            </a:xfrm>
+            <a:prstGeom prst="line">
+              <a:avLst/>
+            </a:prstGeom>
+            <a:ln>
+              <a:solidFill>
+                <a:schemeClr val="tx1"/>
+              </a:solidFill>
+              <a:headEnd type="arrow"/>
+              <a:tailEnd type="none"/>
+            </a:ln>
+          </p:spPr>
+          <p:style>
+            <a:lnRef idx="1">
+              <a:schemeClr val="accent1"/>
+            </a:lnRef>
+            <a:fillRef idx="0">
+              <a:schemeClr val="accent1"/>
+            </a:fillRef>
+            <a:effectRef idx="0">
+              <a:schemeClr val="accent1"/>
+            </a:effectRef>
+            <a:fontRef idx="minor">
+              <a:schemeClr val="tx1"/>
+            </a:fontRef>
+          </p:style>
+        </p:cxnSp>
+        <p:sp>
+          <p:nvSpPr>
+            <p:cNvPr id="35" name="Elipse 34"/>
+            <p:cNvSpPr/>
+            <p:nvPr/>
+          </p:nvSpPr>
+          <p:spPr>
+            <a:xfrm>
+              <a:off x="4418356" y="5963175"/>
+              <a:ext cx="163271" cy="116228"/>
+            </a:xfrm>
+            <a:prstGeom prst="ellipse">
+              <a:avLst/>
+            </a:prstGeom>
+            <a:solidFill>
+              <a:schemeClr val="tx1"/>
+            </a:solidFill>
+            <a:ln>
+              <a:noFill/>
+            </a:ln>
+          </p:spPr>
+          <p:style>
+            <a:lnRef idx="2">
+              <a:schemeClr val="accent1">
+                <a:shade val="50000"/>
+              </a:schemeClr>
+            </a:lnRef>
+            <a:fillRef idx="1">
+              <a:schemeClr val="accent1"/>
+            </a:fillRef>
+            <a:effectRef idx="0">
+              <a:schemeClr val="accent1"/>
+            </a:effectRef>
+            <a:fontRef idx="minor">
+              <a:schemeClr val="lt1"/>
+            </a:fontRef>
+          </p:style>
+          <p:txBody>
+            <a:bodyPr rtlCol="0" anchor="ctr"/>
+            <a:lstStyle/>
+            <a:p>
+              <a:pPr algn="ctr"/>
+              <a:endParaRPr lang="pt-BR"/>
+            </a:p>
+          </p:txBody>
+        </p:sp>
+      </p:grpSp>
+      <p:grpSp>
+        <p:nvGrpSpPr>
+          <p:cNvPr id="43" name="Grupo 42"/>
+          <p:cNvGrpSpPr/>
+          <p:nvPr/>
+        </p:nvGrpSpPr>
+        <p:grpSpPr>
+          <a:xfrm>
+            <a:off x="5993928" y="4797150"/>
+            <a:ext cx="1691775" cy="1224140"/>
+            <a:chOff x="2015926" y="5238206"/>
+            <a:chExt cx="2565701" cy="1300651"/>
+          </a:xfrm>
+        </p:grpSpPr>
+        <p:cxnSp>
+          <p:nvCxnSpPr>
+            <p:cNvPr id="44" name="Conector reto 43"/>
+            <p:cNvCxnSpPr/>
+            <p:nvPr/>
+          </p:nvCxnSpPr>
+          <p:spPr>
+            <a:xfrm flipV="1">
+              <a:off x="4499991" y="6021294"/>
+              <a:ext cx="0" cy="517557"/>
+            </a:xfrm>
+            <a:prstGeom prst="line">
+              <a:avLst/>
+            </a:prstGeom>
+            <a:ln>
+              <a:solidFill>
+                <a:schemeClr val="tx1"/>
+              </a:solidFill>
+            </a:ln>
+          </p:spPr>
+          <p:style>
+            <a:lnRef idx="1">
+              <a:schemeClr val="accent1"/>
+            </a:lnRef>
+            <a:fillRef idx="0">
+              <a:schemeClr val="accent1"/>
+            </a:fillRef>
+            <a:effectRef idx="0">
+              <a:schemeClr val="accent1"/>
+            </a:effectRef>
+            <a:fontRef idx="minor">
+              <a:schemeClr val="tx1"/>
+            </a:fontRef>
+          </p:style>
+        </p:cxnSp>
+        <p:cxnSp>
+          <p:nvCxnSpPr>
+            <p:cNvPr id="45" name="Conector reto 44"/>
+            <p:cNvCxnSpPr/>
+            <p:nvPr/>
+          </p:nvCxnSpPr>
+          <p:spPr>
+            <a:xfrm>
+              <a:off x="2017236" y="6538857"/>
+              <a:ext cx="2482526" cy="0"/>
+            </a:xfrm>
+            <a:prstGeom prst="line">
+              <a:avLst/>
+            </a:prstGeom>
+            <a:ln>
+              <a:solidFill>
+                <a:schemeClr val="tx1"/>
+              </a:solidFill>
+            </a:ln>
+          </p:spPr>
+          <p:style>
+            <a:lnRef idx="1">
+              <a:schemeClr val="accent1"/>
+            </a:lnRef>
+            <a:fillRef idx="0">
+              <a:schemeClr val="accent1"/>
+            </a:fillRef>
+            <a:effectRef idx="0">
+              <a:schemeClr val="accent1"/>
+            </a:effectRef>
+            <a:fontRef idx="minor">
+              <a:schemeClr val="tx1"/>
+            </a:fontRef>
+          </p:style>
+        </p:cxnSp>
+        <p:cxnSp>
+          <p:nvCxnSpPr>
+            <p:cNvPr id="46" name="Conector reto 45"/>
+            <p:cNvCxnSpPr/>
+            <p:nvPr/>
+          </p:nvCxnSpPr>
+          <p:spPr>
+            <a:xfrm flipV="1">
+              <a:off x="2015926" y="5238206"/>
+              <a:ext cx="0" cy="1300646"/>
+            </a:xfrm>
+            <a:prstGeom prst="line">
+              <a:avLst/>
+            </a:prstGeom>
+            <a:ln>
+              <a:solidFill>
+                <a:schemeClr val="tx1"/>
+              </a:solidFill>
+            </a:ln>
+          </p:spPr>
+          <p:style>
+            <a:lnRef idx="1">
+              <a:schemeClr val="accent1"/>
+            </a:lnRef>
+            <a:fillRef idx="0">
+              <a:schemeClr val="accent1"/>
+            </a:fillRef>
+            <a:effectRef idx="0">
+              <a:schemeClr val="accent1"/>
+            </a:effectRef>
+            <a:fontRef idx="minor">
+              <a:schemeClr val="tx1"/>
+            </a:fontRef>
+          </p:style>
+        </p:cxnSp>
+        <p:cxnSp>
+          <p:nvCxnSpPr>
+            <p:cNvPr id="47" name="Conector reto 46"/>
+            <p:cNvCxnSpPr/>
+            <p:nvPr/>
+          </p:nvCxnSpPr>
+          <p:spPr>
+            <a:xfrm>
+              <a:off x="2015926" y="5238206"/>
+              <a:ext cx="464472" cy="0"/>
+            </a:xfrm>
+            <a:prstGeom prst="line">
+              <a:avLst/>
+            </a:prstGeom>
+            <a:ln>
+              <a:solidFill>
+                <a:schemeClr val="tx1"/>
+              </a:solidFill>
+            </a:ln>
+          </p:spPr>
+          <p:style>
+            <a:lnRef idx="1">
+              <a:schemeClr val="accent1"/>
+            </a:lnRef>
+            <a:fillRef idx="0">
+              <a:schemeClr val="accent1"/>
+            </a:fillRef>
+            <a:effectRef idx="0">
+              <a:schemeClr val="accent1"/>
+            </a:effectRef>
+            <a:fontRef idx="minor">
+              <a:schemeClr val="tx1"/>
+            </a:fontRef>
+          </p:style>
+        </p:cxnSp>
+        <p:cxnSp>
+          <p:nvCxnSpPr>
+            <p:cNvPr id="48" name="Conector reto 47"/>
+            <p:cNvCxnSpPr/>
+            <p:nvPr/>
+          </p:nvCxnSpPr>
+          <p:spPr>
+            <a:xfrm flipV="1">
+              <a:off x="2480398" y="5238206"/>
+              <a:ext cx="0" cy="229526"/>
+            </a:xfrm>
+            <a:prstGeom prst="line">
+              <a:avLst/>
+            </a:prstGeom>
+            <a:ln>
+              <a:solidFill>
+                <a:schemeClr val="tx1"/>
+              </a:solidFill>
+              <a:headEnd type="arrow"/>
+              <a:tailEnd type="none"/>
+            </a:ln>
+          </p:spPr>
+          <p:style>
+            <a:lnRef idx="1">
+              <a:schemeClr val="accent1"/>
+            </a:lnRef>
+            <a:fillRef idx="0">
+              <a:schemeClr val="accent1"/>
+            </a:fillRef>
+            <a:effectRef idx="0">
+              <a:schemeClr val="accent1"/>
+            </a:effectRef>
+            <a:fontRef idx="minor">
+              <a:schemeClr val="tx1"/>
+            </a:fontRef>
+          </p:style>
+        </p:cxnSp>
+        <p:sp>
+          <p:nvSpPr>
+            <p:cNvPr id="49" name="Elipse 48"/>
+            <p:cNvSpPr/>
+            <p:nvPr/>
+          </p:nvSpPr>
+          <p:spPr>
+            <a:xfrm>
+              <a:off x="4418356" y="5963175"/>
+              <a:ext cx="163271" cy="116228"/>
+            </a:xfrm>
+            <a:prstGeom prst="ellipse">
+              <a:avLst/>
+            </a:prstGeom>
+            <a:solidFill>
+              <a:schemeClr val="tx1"/>
+            </a:solidFill>
+            <a:ln>
+              <a:noFill/>
+            </a:ln>
+          </p:spPr>
+          <p:style>
+            <a:lnRef idx="2">
+              <a:schemeClr val="accent1">
+                <a:shade val="50000"/>
+              </a:schemeClr>
+            </a:lnRef>
+            <a:fillRef idx="1">
+              <a:schemeClr val="accent1"/>
+            </a:fillRef>
+            <a:effectRef idx="0">
+              <a:schemeClr val="accent1"/>
+            </a:effectRef>
+            <a:fontRef idx="minor">
+              <a:schemeClr val="lt1"/>
+            </a:fontRef>
+          </p:style>
+          <p:txBody>
+            <a:bodyPr rtlCol="0" anchor="ctr"/>
+            <a:lstStyle/>
+            <a:p>
+              <a:pPr algn="ctr"/>
+              <a:endParaRPr lang="pt-BR"/>
+            </a:p>
+          </p:txBody>
+        </p:sp>
+      </p:grpSp>
     </p:spTree>
   </p:cSld>
   <p:clrMapOvr>
     <a:masterClrMapping/>
   </p:clrMapOvr>
+  <p:transition/>
   <p:timing>
     <p:tnLst>
       <p:par>
-        <p:cTn id="1" dur="indefinite" restart="never" nodeType="tmRoot"/>
+        <p:cTn id="1" dur="indefinite" restart="never" nodeType="tmRoot">
+          <p:childTnLst>
+            <p:seq concurrent="1" nextAc="seek">
+              <p:cTn id="2" dur="indefinite" nodeType="mainSeq">
+                <p:childTnLst>
+                  <p:par>
+                    <p:cTn id="3" fill="hold">
+                      <p:stCondLst>
+                        <p:cond delay="indefinite"/>
+                      </p:stCondLst>
+                      <p:childTnLst>
+                        <p:par>
+                          <p:cTn id="4" fill="hold">
+                            <p:stCondLst>
+                              <p:cond delay="0"/>
+                            </p:stCondLst>
+                            <p:childTnLst>
+                              <p:par>
+                                <p:cTn id="5" presetID="2" presetClass="entr" presetSubtype="4" fill="hold" nodeType="clickEffect">
+                                  <p:stCondLst>
+                                    <p:cond delay="0"/>
+                                  </p:stCondLst>
+                                  <p:childTnLst>
+                                    <p:set>
+                                      <p:cBhvr>
+                                        <p:cTn id="6" dur="1" fill="hold">
+                                          <p:stCondLst>
+                                            <p:cond delay="0"/>
+                                          </p:stCondLst>
+                                        </p:cTn>
+                                        <p:tgtEl>
+                                          <p:spTgt spid="3">
+                                            <p:txEl>
+                                              <p:pRg st="3" end="3"/>
+                                            </p:txEl>
+                                          </p:spTgt>
+                                        </p:tgtEl>
+                                        <p:attrNameLst>
+                                          <p:attrName>style.visibility</p:attrName>
+                                        </p:attrNameLst>
+                                      </p:cBhvr>
+                                      <p:to>
+                                        <p:strVal val="visible"/>
+                                      </p:to>
+                                    </p:set>
+                                    <p:anim calcmode="lin" valueType="num">
+                                      <p:cBhvr additive="base">
+                                        <p:cTn id="7" dur="500" fill="hold"/>
+                                        <p:tgtEl>
+                                          <p:spTgt spid="3">
+                                            <p:txEl>
+                                              <p:pRg st="3" end="3"/>
+                                            </p:txEl>
+                                          </p:spTgt>
+                                        </p:tgtEl>
+                                        <p:attrNameLst>
+                                          <p:attrName>ppt_x</p:attrName>
+                                        </p:attrNameLst>
+                                      </p:cBhvr>
+                                      <p:tavLst>
+                                        <p:tav tm="0">
+                                          <p:val>
+                                            <p:strVal val="#ppt_x"/>
+                                          </p:val>
+                                        </p:tav>
+                                        <p:tav tm="100000">
+                                          <p:val>
+                                            <p:strVal val="#ppt_x"/>
+                                          </p:val>
+                                        </p:tav>
+                                      </p:tavLst>
+                                    </p:anim>
+                                    <p:anim calcmode="lin" valueType="num">
+                                      <p:cBhvr additive="base">
+                                        <p:cTn id="8" dur="500" fill="hold"/>
+                                        <p:tgtEl>
+                                          <p:spTgt spid="3">
+                                            <p:txEl>
+                                              <p:pRg st="3" end="3"/>
+                                            </p:txEl>
+                                          </p:spTgt>
+                                        </p:tgtEl>
+                                        <p:attrNameLst>
+                                          <p:attrName>ppt_y</p:attrName>
+                                        </p:attrNameLst>
+                                      </p:cBhvr>
+                                      <p:tavLst>
+                                        <p:tav tm="0">
+                                          <p:val>
+                                            <p:strVal val="1+#ppt_h/2"/>
+                                          </p:val>
+                                        </p:tav>
+                                        <p:tav tm="100000">
+                                          <p:val>
+                                            <p:strVal val="#ppt_y"/>
+                                          </p:val>
+                                        </p:tav>
+                                      </p:tavLst>
+                                    </p:anim>
+                                  </p:childTnLst>
+                                </p:cTn>
+                              </p:par>
+                              <p:par>
+                                <p:cTn id="9" presetID="3" presetClass="entr" presetSubtype="10" fill="hold" grpId="0" nodeType="withEffect">
+                                  <p:stCondLst>
+                                    <p:cond delay="0"/>
+                                  </p:stCondLst>
+                                  <p:childTnLst>
+                                    <p:set>
+                                      <p:cBhvr>
+                                        <p:cTn id="10" dur="1" fill="hold">
+                                          <p:stCondLst>
+                                            <p:cond delay="0"/>
+                                          </p:stCondLst>
+                                        </p:cTn>
+                                        <p:tgtEl>
+                                          <p:spTgt spid="6"/>
+                                        </p:tgtEl>
+                                        <p:attrNameLst>
+                                          <p:attrName>style.visibility</p:attrName>
+                                        </p:attrNameLst>
+                                      </p:cBhvr>
+                                      <p:to>
+                                        <p:strVal val="visible"/>
+                                      </p:to>
+                                    </p:set>
+                                    <p:animEffect transition="in" filter="blinds(horizontal)">
+                                      <p:cBhvr>
+                                        <p:cTn id="11" dur="500"/>
+                                        <p:tgtEl>
+                                          <p:spTgt spid="6"/>
+                                        </p:tgtEl>
+                                      </p:cBhvr>
+                                    </p:animEffect>
+                                  </p:childTnLst>
+                                </p:cTn>
+                              </p:par>
+                              <p:par>
+                                <p:cTn id="12" presetID="3" presetClass="entr" presetSubtype="10" fill="hold" grpId="0" nodeType="withEffect">
+                                  <p:stCondLst>
+                                    <p:cond delay="0"/>
+                                  </p:stCondLst>
+                                  <p:childTnLst>
+                                    <p:set>
+                                      <p:cBhvr>
+                                        <p:cTn id="13" dur="1" fill="hold">
+                                          <p:stCondLst>
+                                            <p:cond delay="0"/>
+                                          </p:stCondLst>
+                                        </p:cTn>
+                                        <p:tgtEl>
+                                          <p:spTgt spid="5"/>
+                                        </p:tgtEl>
+                                        <p:attrNameLst>
+                                          <p:attrName>style.visibility</p:attrName>
+                                        </p:attrNameLst>
+                                      </p:cBhvr>
+                                      <p:to>
+                                        <p:strVal val="visible"/>
+                                      </p:to>
+                                    </p:set>
+                                    <p:animEffect transition="in" filter="blinds(horizontal)">
+                                      <p:cBhvr>
+                                        <p:cTn id="14" dur="500"/>
+                                        <p:tgtEl>
+                                          <p:spTgt spid="5"/>
+                                        </p:tgtEl>
+                                      </p:cBhvr>
+                                    </p:animEffect>
+                                  </p:childTnLst>
+                                </p:cTn>
+                              </p:par>
+                              <p:par>
+                                <p:cTn id="15" presetID="3" presetClass="entr" presetSubtype="10" fill="hold" nodeType="withEffect">
+                                  <p:stCondLst>
+                                    <p:cond delay="0"/>
+                                  </p:stCondLst>
+                                  <p:childTnLst>
+                                    <p:set>
+                                      <p:cBhvr>
+                                        <p:cTn id="16" dur="1" fill="hold">
+                                          <p:stCondLst>
+                                            <p:cond delay="0"/>
+                                          </p:stCondLst>
+                                        </p:cTn>
+                                        <p:tgtEl>
+                                          <p:spTgt spid="8"/>
+                                        </p:tgtEl>
+                                        <p:attrNameLst>
+                                          <p:attrName>style.visibility</p:attrName>
+                                        </p:attrNameLst>
+                                      </p:cBhvr>
+                                      <p:to>
+                                        <p:strVal val="visible"/>
+                                      </p:to>
+                                    </p:set>
+                                    <p:animEffect transition="in" filter="blinds(horizontal)">
+                                      <p:cBhvr>
+                                        <p:cTn id="17" dur="500"/>
+                                        <p:tgtEl>
+                                          <p:spTgt spid="8"/>
+                                        </p:tgtEl>
+                                      </p:cBhvr>
+                                    </p:animEffect>
+                                  </p:childTnLst>
+                                </p:cTn>
+                              </p:par>
+                              <p:par>
+                                <p:cTn id="18" presetID="3" presetClass="entr" presetSubtype="10" fill="hold" grpId="0" nodeType="withEffect">
+                                  <p:stCondLst>
+                                    <p:cond delay="0"/>
+                                  </p:stCondLst>
+                                  <p:childTnLst>
+                                    <p:set>
+                                      <p:cBhvr>
+                                        <p:cTn id="19" dur="1" fill="hold">
+                                          <p:stCondLst>
+                                            <p:cond delay="0"/>
+                                          </p:stCondLst>
+                                        </p:cTn>
+                                        <p:tgtEl>
+                                          <p:spTgt spid="7"/>
+                                        </p:tgtEl>
+                                        <p:attrNameLst>
+                                          <p:attrName>style.visibility</p:attrName>
+                                        </p:attrNameLst>
+                                      </p:cBhvr>
+                                      <p:to>
+                                        <p:strVal val="visible"/>
+                                      </p:to>
+                                    </p:set>
+                                    <p:animEffect transition="in" filter="blinds(horizontal)">
+                                      <p:cBhvr>
+                                        <p:cTn id="20" dur="500"/>
+                                        <p:tgtEl>
+                                          <p:spTgt spid="7"/>
+                                        </p:tgtEl>
+                                      </p:cBhvr>
+                                    </p:animEffect>
+                                  </p:childTnLst>
+                                </p:cTn>
+                              </p:par>
+                              <p:par>
+                                <p:cTn id="21" presetID="3" presetClass="entr" presetSubtype="10" fill="hold" grpId="1" nodeType="withEffect">
+                                  <p:stCondLst>
+                                    <p:cond delay="0"/>
+                                  </p:stCondLst>
+                                  <p:childTnLst>
+                                    <p:set>
+                                      <p:cBhvr>
+                                        <p:cTn id="22" dur="1" fill="hold">
+                                          <p:stCondLst>
+                                            <p:cond delay="0"/>
+                                          </p:stCondLst>
+                                        </p:cTn>
+                                        <p:tgtEl>
+                                          <p:spTgt spid="13"/>
+                                        </p:tgtEl>
+                                        <p:attrNameLst>
+                                          <p:attrName>style.visibility</p:attrName>
+                                        </p:attrNameLst>
+                                      </p:cBhvr>
+                                      <p:to>
+                                        <p:strVal val="visible"/>
+                                      </p:to>
+                                    </p:set>
+                                    <p:animEffect transition="in" filter="blinds(horizontal)">
+                                      <p:cBhvr>
+                                        <p:cTn id="23" dur="500"/>
+                                        <p:tgtEl>
+                                          <p:spTgt spid="13"/>
+                                        </p:tgtEl>
+                                      </p:cBhvr>
+                                    </p:animEffect>
+                                  </p:childTnLst>
+                                </p:cTn>
+                              </p:par>
+                            </p:childTnLst>
+                          </p:cTn>
+                        </p:par>
+                      </p:childTnLst>
+                    </p:cTn>
+                  </p:par>
+                  <p:par>
+                    <p:cTn id="24" fill="hold">
+                      <p:stCondLst>
+                        <p:cond delay="indefinite"/>
+                      </p:stCondLst>
+                      <p:childTnLst>
+                        <p:par>
+                          <p:cTn id="25" fill="hold">
+                            <p:stCondLst>
+                              <p:cond delay="0"/>
+                            </p:stCondLst>
+                            <p:childTnLst>
+                              <p:par>
+                                <p:cTn id="26" presetID="2" presetClass="entr" presetSubtype="4" fill="hold" nodeType="clickEffect">
+                                  <p:stCondLst>
+                                    <p:cond delay="0"/>
+                                  </p:stCondLst>
+                                  <p:childTnLst>
+                                    <p:set>
+                                      <p:cBhvr>
+                                        <p:cTn id="27" dur="1" fill="hold">
+                                          <p:stCondLst>
+                                            <p:cond delay="0"/>
+                                          </p:stCondLst>
+                                        </p:cTn>
+                                        <p:tgtEl>
+                                          <p:spTgt spid="3">
+                                            <p:txEl>
+                                              <p:pRg st="4" end="4"/>
+                                            </p:txEl>
+                                          </p:spTgt>
+                                        </p:tgtEl>
+                                        <p:attrNameLst>
+                                          <p:attrName>style.visibility</p:attrName>
+                                        </p:attrNameLst>
+                                      </p:cBhvr>
+                                      <p:to>
+                                        <p:strVal val="visible"/>
+                                      </p:to>
+                                    </p:set>
+                                    <p:anim calcmode="lin" valueType="num">
+                                      <p:cBhvr additive="base">
+                                        <p:cTn id="28" dur="500" fill="hold"/>
+                                        <p:tgtEl>
+                                          <p:spTgt spid="3">
+                                            <p:txEl>
+                                              <p:pRg st="4" end="4"/>
+                                            </p:txEl>
+                                          </p:spTgt>
+                                        </p:tgtEl>
+                                        <p:attrNameLst>
+                                          <p:attrName>ppt_x</p:attrName>
+                                        </p:attrNameLst>
+                                      </p:cBhvr>
+                                      <p:tavLst>
+                                        <p:tav tm="0">
+                                          <p:val>
+                                            <p:strVal val="#ppt_x"/>
+                                          </p:val>
+                                        </p:tav>
+                                        <p:tav tm="100000">
+                                          <p:val>
+                                            <p:strVal val="#ppt_x"/>
+                                          </p:val>
+                                        </p:tav>
+                                      </p:tavLst>
+                                    </p:anim>
+                                    <p:anim calcmode="lin" valueType="num">
+                                      <p:cBhvr additive="base">
+                                        <p:cTn id="29" dur="500" fill="hold"/>
+                                        <p:tgtEl>
+                                          <p:spTgt spid="3">
+                                            <p:txEl>
+                                              <p:pRg st="4" end="4"/>
+                                            </p:txEl>
+                                          </p:spTgt>
+                                        </p:tgtEl>
+                                        <p:attrNameLst>
+                                          <p:attrName>ppt_y</p:attrName>
+                                        </p:attrNameLst>
+                                      </p:cBhvr>
+                                      <p:tavLst>
+                                        <p:tav tm="0">
+                                          <p:val>
+                                            <p:strVal val="1+#ppt_h/2"/>
+                                          </p:val>
+                                        </p:tav>
+                                        <p:tav tm="100000">
+                                          <p:val>
+                                            <p:strVal val="#ppt_y"/>
+                                          </p:val>
+                                        </p:tav>
+                                      </p:tavLst>
+                                    </p:anim>
+                                  </p:childTnLst>
+                                </p:cTn>
+                              </p:par>
+                              <p:par>
+                                <p:cTn id="30" presetID="3" presetClass="entr" presetSubtype="10" fill="hold" grpId="1" nodeType="withEffect">
+                                  <p:stCondLst>
+                                    <p:cond delay="0"/>
+                                  </p:stCondLst>
+                                  <p:childTnLst>
+                                    <p:set>
+                                      <p:cBhvr>
+                                        <p:cTn id="31" dur="1" fill="hold">
+                                          <p:stCondLst>
+                                            <p:cond delay="0"/>
+                                          </p:stCondLst>
+                                        </p:cTn>
+                                        <p:tgtEl>
+                                          <p:spTgt spid="12"/>
+                                        </p:tgtEl>
+                                        <p:attrNameLst>
+                                          <p:attrName>style.visibility</p:attrName>
+                                        </p:attrNameLst>
+                                      </p:cBhvr>
+                                      <p:to>
+                                        <p:strVal val="visible"/>
+                                      </p:to>
+                                    </p:set>
+                                    <p:animEffect transition="in" filter="blinds(horizontal)">
+                                      <p:cBhvr>
+                                        <p:cTn id="32" dur="500"/>
+                                        <p:tgtEl>
+                                          <p:spTgt spid="12"/>
+                                        </p:tgtEl>
+                                      </p:cBhvr>
+                                    </p:animEffect>
+                                  </p:childTnLst>
+                                </p:cTn>
+                              </p:par>
+                              <p:par>
+                                <p:cTn id="33" presetID="3" presetClass="entr" presetSubtype="10" fill="hold" nodeType="withEffect">
+                                  <p:stCondLst>
+                                    <p:cond delay="0"/>
+                                  </p:stCondLst>
+                                  <p:childTnLst>
+                                    <p:set>
+                                      <p:cBhvr>
+                                        <p:cTn id="34" dur="1" fill="hold">
+                                          <p:stCondLst>
+                                            <p:cond delay="0"/>
+                                          </p:stCondLst>
+                                        </p:cTn>
+                                        <p:tgtEl>
+                                          <p:spTgt spid="17"/>
+                                        </p:tgtEl>
+                                        <p:attrNameLst>
+                                          <p:attrName>style.visibility</p:attrName>
+                                        </p:attrNameLst>
+                                      </p:cBhvr>
+                                      <p:to>
+                                        <p:strVal val="visible"/>
+                                      </p:to>
+                                    </p:set>
+                                    <p:animEffect transition="in" filter="blinds(horizontal)">
+                                      <p:cBhvr>
+                                        <p:cTn id="35" dur="500"/>
+                                        <p:tgtEl>
+                                          <p:spTgt spid="17"/>
+                                        </p:tgtEl>
+                                      </p:cBhvr>
+                                    </p:animEffect>
+                                  </p:childTnLst>
+                                </p:cTn>
+                              </p:par>
+                              <p:par>
+                                <p:cTn id="36" presetID="3" presetClass="entr" presetSubtype="10" fill="hold" grpId="1" nodeType="withEffect">
+                                  <p:stCondLst>
+                                    <p:cond delay="0"/>
+                                  </p:stCondLst>
+                                  <p:childTnLst>
+                                    <p:set>
+                                      <p:cBhvr>
+                                        <p:cTn id="37" dur="1" fill="hold">
+                                          <p:stCondLst>
+                                            <p:cond delay="0"/>
+                                          </p:stCondLst>
+                                        </p:cTn>
+                                        <p:tgtEl>
+                                          <p:spTgt spid="9"/>
+                                        </p:tgtEl>
+                                        <p:attrNameLst>
+                                          <p:attrName>style.visibility</p:attrName>
+                                        </p:attrNameLst>
+                                      </p:cBhvr>
+                                      <p:to>
+                                        <p:strVal val="visible"/>
+                                      </p:to>
+                                    </p:set>
+                                    <p:animEffect transition="in" filter="blinds(horizontal)">
+                                      <p:cBhvr>
+                                        <p:cTn id="38" dur="500"/>
+                                        <p:tgtEl>
+                                          <p:spTgt spid="9"/>
+                                        </p:tgtEl>
+                                      </p:cBhvr>
+                                    </p:animEffect>
+                                  </p:childTnLst>
+                                </p:cTn>
+                              </p:par>
+                              <p:par>
+                                <p:cTn id="39" presetID="3" presetClass="entr" presetSubtype="10" fill="hold" grpId="1" nodeType="withEffect">
+                                  <p:stCondLst>
+                                    <p:cond delay="0"/>
+                                  </p:stCondLst>
+                                  <p:childTnLst>
+                                    <p:set>
+                                      <p:cBhvr>
+                                        <p:cTn id="40" dur="1" fill="hold">
+                                          <p:stCondLst>
+                                            <p:cond delay="0"/>
+                                          </p:stCondLst>
+                                        </p:cTn>
+                                        <p:tgtEl>
+                                          <p:spTgt spid="16"/>
+                                        </p:tgtEl>
+                                        <p:attrNameLst>
+                                          <p:attrName>style.visibility</p:attrName>
+                                        </p:attrNameLst>
+                                      </p:cBhvr>
+                                      <p:to>
+                                        <p:strVal val="visible"/>
+                                      </p:to>
+                                    </p:set>
+                                    <p:animEffect transition="in" filter="blinds(horizontal)">
+                                      <p:cBhvr>
+                                        <p:cTn id="41" dur="500"/>
+                                        <p:tgtEl>
+                                          <p:spTgt spid="16"/>
+                                        </p:tgtEl>
+                                      </p:cBhvr>
+                                    </p:animEffect>
+                                  </p:childTnLst>
+                                </p:cTn>
+                              </p:par>
+                            </p:childTnLst>
+                          </p:cTn>
+                        </p:par>
+                      </p:childTnLst>
+                    </p:cTn>
+                  </p:par>
+                  <p:par>
+                    <p:cTn id="42" fill="hold">
+                      <p:stCondLst>
+                        <p:cond delay="indefinite"/>
+                      </p:stCondLst>
+                      <p:childTnLst>
+                        <p:par>
+                          <p:cTn id="43" fill="hold">
+                            <p:stCondLst>
+                              <p:cond delay="0"/>
+                            </p:stCondLst>
+                            <p:childTnLst>
+                              <p:par>
+                                <p:cTn id="44" presetID="2" presetClass="entr" presetSubtype="4" fill="hold" nodeType="clickEffect">
+                                  <p:stCondLst>
+                                    <p:cond delay="0"/>
+                                  </p:stCondLst>
+                                  <p:childTnLst>
+                                    <p:set>
+                                      <p:cBhvr>
+                                        <p:cTn id="45" dur="1" fill="hold">
+                                          <p:stCondLst>
+                                            <p:cond delay="0"/>
+                                          </p:stCondLst>
+                                        </p:cTn>
+                                        <p:tgtEl>
+                                          <p:spTgt spid="3">
+                                            <p:txEl>
+                                              <p:pRg st="5" end="5"/>
+                                            </p:txEl>
+                                          </p:spTgt>
+                                        </p:tgtEl>
+                                        <p:attrNameLst>
+                                          <p:attrName>style.visibility</p:attrName>
+                                        </p:attrNameLst>
+                                      </p:cBhvr>
+                                      <p:to>
+                                        <p:strVal val="visible"/>
+                                      </p:to>
+                                    </p:set>
+                                    <p:anim calcmode="lin" valueType="num">
+                                      <p:cBhvr additive="base">
+                                        <p:cTn id="46" dur="500" fill="hold"/>
+                                        <p:tgtEl>
+                                          <p:spTgt spid="3">
+                                            <p:txEl>
+                                              <p:pRg st="5" end="5"/>
+                                            </p:txEl>
+                                          </p:spTgt>
+                                        </p:tgtEl>
+                                        <p:attrNameLst>
+                                          <p:attrName>ppt_x</p:attrName>
+                                        </p:attrNameLst>
+                                      </p:cBhvr>
+                                      <p:tavLst>
+                                        <p:tav tm="0">
+                                          <p:val>
+                                            <p:strVal val="#ppt_x"/>
+                                          </p:val>
+                                        </p:tav>
+                                        <p:tav tm="100000">
+                                          <p:val>
+                                            <p:strVal val="#ppt_x"/>
+                                          </p:val>
+                                        </p:tav>
+                                      </p:tavLst>
+                                    </p:anim>
+                                    <p:anim calcmode="lin" valueType="num">
+                                      <p:cBhvr additive="base">
+                                        <p:cTn id="47" dur="500" fill="hold"/>
+                                        <p:tgtEl>
+                                          <p:spTgt spid="3">
+                                            <p:txEl>
+                                              <p:pRg st="5" end="5"/>
+                                            </p:txEl>
+                                          </p:spTgt>
+                                        </p:tgtEl>
+                                        <p:attrNameLst>
+                                          <p:attrName>ppt_y</p:attrName>
+                                        </p:attrNameLst>
+                                      </p:cBhvr>
+                                      <p:tavLst>
+                                        <p:tav tm="0">
+                                          <p:val>
+                                            <p:strVal val="1+#ppt_h/2"/>
+                                          </p:val>
+                                        </p:tav>
+                                        <p:tav tm="100000">
+                                          <p:val>
+                                            <p:strVal val="#ppt_y"/>
+                                          </p:val>
+                                        </p:tav>
+                                      </p:tavLst>
+                                    </p:anim>
+                                  </p:childTnLst>
+                                </p:cTn>
+                              </p:par>
+                              <p:par>
+                                <p:cTn id="48" presetID="3" presetClass="entr" presetSubtype="10" fill="hold" nodeType="withEffect">
+                                  <p:stCondLst>
+                                    <p:cond delay="0"/>
+                                  </p:stCondLst>
+                                  <p:childTnLst>
+                                    <p:set>
+                                      <p:cBhvr>
+                                        <p:cTn id="49" dur="1" fill="hold">
+                                          <p:stCondLst>
+                                            <p:cond delay="0"/>
+                                          </p:stCondLst>
+                                        </p:cTn>
+                                        <p:tgtEl>
+                                          <p:spTgt spid="37"/>
+                                        </p:tgtEl>
+                                        <p:attrNameLst>
+                                          <p:attrName>style.visibility</p:attrName>
+                                        </p:attrNameLst>
+                                      </p:cBhvr>
+                                      <p:to>
+                                        <p:strVal val="visible"/>
+                                      </p:to>
+                                    </p:set>
+                                    <p:animEffect transition="in" filter="blinds(horizontal)">
+                                      <p:cBhvr>
+                                        <p:cTn id="50" dur="500"/>
+                                        <p:tgtEl>
+                                          <p:spTgt spid="37"/>
+                                        </p:tgtEl>
+                                      </p:cBhvr>
+                                    </p:animEffect>
+                                  </p:childTnLst>
+                                </p:cTn>
+                              </p:par>
+                            </p:childTnLst>
+                          </p:cTn>
+                        </p:par>
+                      </p:childTnLst>
+                    </p:cTn>
+                  </p:par>
+                  <p:par>
+                    <p:cTn id="51" fill="hold">
+                      <p:stCondLst>
+                        <p:cond delay="indefinite"/>
+                      </p:stCondLst>
+                      <p:childTnLst>
+                        <p:par>
+                          <p:cTn id="52" fill="hold">
+                            <p:stCondLst>
+                              <p:cond delay="0"/>
+                            </p:stCondLst>
+                            <p:childTnLst>
+                              <p:par>
+                                <p:cTn id="53" presetID="2" presetClass="entr" presetSubtype="4" fill="hold" nodeType="clickEffect">
+                                  <p:stCondLst>
+                                    <p:cond delay="0"/>
+                                  </p:stCondLst>
+                                  <p:childTnLst>
+                                    <p:set>
+                                      <p:cBhvr>
+                                        <p:cTn id="54" dur="1" fill="hold">
+                                          <p:stCondLst>
+                                            <p:cond delay="0"/>
+                                          </p:stCondLst>
+                                        </p:cTn>
+                                        <p:tgtEl>
+                                          <p:spTgt spid="3">
+                                            <p:txEl>
+                                              <p:pRg st="6" end="6"/>
+                                            </p:txEl>
+                                          </p:spTgt>
+                                        </p:tgtEl>
+                                        <p:attrNameLst>
+                                          <p:attrName>style.visibility</p:attrName>
+                                        </p:attrNameLst>
+                                      </p:cBhvr>
+                                      <p:to>
+                                        <p:strVal val="visible"/>
+                                      </p:to>
+                                    </p:set>
+                                    <p:anim calcmode="lin" valueType="num">
+                                      <p:cBhvr additive="base">
+                                        <p:cTn id="55" dur="500" fill="hold"/>
+                                        <p:tgtEl>
+                                          <p:spTgt spid="3">
+                                            <p:txEl>
+                                              <p:pRg st="6" end="6"/>
+                                            </p:txEl>
+                                          </p:spTgt>
+                                        </p:tgtEl>
+                                        <p:attrNameLst>
+                                          <p:attrName>ppt_x</p:attrName>
+                                        </p:attrNameLst>
+                                      </p:cBhvr>
+                                      <p:tavLst>
+                                        <p:tav tm="0">
+                                          <p:val>
+                                            <p:strVal val="#ppt_x"/>
+                                          </p:val>
+                                        </p:tav>
+                                        <p:tav tm="100000">
+                                          <p:val>
+                                            <p:strVal val="#ppt_x"/>
+                                          </p:val>
+                                        </p:tav>
+                                      </p:tavLst>
+                                    </p:anim>
+                                    <p:anim calcmode="lin" valueType="num">
+                                      <p:cBhvr additive="base">
+                                        <p:cTn id="56" dur="500" fill="hold"/>
+                                        <p:tgtEl>
+                                          <p:spTgt spid="3">
+                                            <p:txEl>
+                                              <p:pRg st="6" end="6"/>
+                                            </p:txEl>
+                                          </p:spTgt>
+                                        </p:tgtEl>
+                                        <p:attrNameLst>
+                                          <p:attrName>ppt_y</p:attrName>
+                                        </p:attrNameLst>
+                                      </p:cBhvr>
+                                      <p:tavLst>
+                                        <p:tav tm="0">
+                                          <p:val>
+                                            <p:strVal val="1+#ppt_h/2"/>
+                                          </p:val>
+                                        </p:tav>
+                                        <p:tav tm="100000">
+                                          <p:val>
+                                            <p:strVal val="#ppt_y"/>
+                                          </p:val>
+                                        </p:tav>
+                                      </p:tavLst>
+                                    </p:anim>
+                                  </p:childTnLst>
+                                </p:cTn>
+                              </p:par>
+                              <p:par>
+                                <p:cTn id="57" presetID="3" presetClass="entr" presetSubtype="10" fill="hold" nodeType="withEffect">
+                                  <p:stCondLst>
+                                    <p:cond delay="0"/>
+                                  </p:stCondLst>
+                                  <p:childTnLst>
+                                    <p:set>
+                                      <p:cBhvr>
+                                        <p:cTn id="58" dur="1" fill="hold">
+                                          <p:stCondLst>
+                                            <p:cond delay="0"/>
+                                          </p:stCondLst>
+                                        </p:cTn>
+                                        <p:tgtEl>
+                                          <p:spTgt spid="43"/>
+                                        </p:tgtEl>
+                                        <p:attrNameLst>
+                                          <p:attrName>style.visibility</p:attrName>
+                                        </p:attrNameLst>
+                                      </p:cBhvr>
+                                      <p:to>
+                                        <p:strVal val="visible"/>
+                                      </p:to>
+                                    </p:set>
+                                    <p:animEffect transition="in" filter="blinds(horizontal)">
+                                      <p:cBhvr>
+                                        <p:cTn id="59" dur="500"/>
+                                        <p:tgtEl>
+                                          <p:spTgt spid="43"/>
+                                        </p:tgtEl>
+                                      </p:cBhvr>
+                                    </p:animEffect>
+                                  </p:childTnLst>
+                                </p:cTn>
+                              </p:par>
+                            </p:childTnLst>
+                          </p:cTn>
+                        </p:par>
+                      </p:childTnLst>
+                    </p:cTn>
+                  </p:par>
+                  <p:par>
+                    <p:cTn id="60" fill="hold">
+                      <p:stCondLst>
+                        <p:cond delay="indefinite"/>
+                      </p:stCondLst>
+                      <p:childTnLst>
+                        <p:par>
+                          <p:cTn id="61" fill="hold">
+                            <p:stCondLst>
+                              <p:cond delay="0"/>
+                            </p:stCondLst>
+                            <p:childTnLst>
+                              <p:par>
+                                <p:cTn id="62" presetID="2" presetClass="entr" presetSubtype="4" fill="hold" nodeType="clickEffect">
+                                  <p:stCondLst>
+                                    <p:cond delay="0"/>
+                                  </p:stCondLst>
+                                  <p:childTnLst>
+                                    <p:set>
+                                      <p:cBhvr>
+                                        <p:cTn id="63" dur="1" fill="hold">
+                                          <p:stCondLst>
+                                            <p:cond delay="0"/>
+                                          </p:stCondLst>
+                                        </p:cTn>
+                                        <p:tgtEl>
+                                          <p:spTgt spid="3">
+                                            <p:txEl>
+                                              <p:pRg st="7" end="7"/>
+                                            </p:txEl>
+                                          </p:spTgt>
+                                        </p:tgtEl>
+                                        <p:attrNameLst>
+                                          <p:attrName>style.visibility</p:attrName>
+                                        </p:attrNameLst>
+                                      </p:cBhvr>
+                                      <p:to>
+                                        <p:strVal val="visible"/>
+                                      </p:to>
+                                    </p:set>
+                                    <p:anim calcmode="lin" valueType="num">
+                                      <p:cBhvr additive="base">
+                                        <p:cTn id="64" dur="500" fill="hold"/>
+                                        <p:tgtEl>
+                                          <p:spTgt spid="3">
+                                            <p:txEl>
+                                              <p:pRg st="7" end="7"/>
+                                            </p:txEl>
+                                          </p:spTgt>
+                                        </p:tgtEl>
+                                        <p:attrNameLst>
+                                          <p:attrName>ppt_x</p:attrName>
+                                        </p:attrNameLst>
+                                      </p:cBhvr>
+                                      <p:tavLst>
+                                        <p:tav tm="0">
+                                          <p:val>
+                                            <p:strVal val="#ppt_x"/>
+                                          </p:val>
+                                        </p:tav>
+                                        <p:tav tm="100000">
+                                          <p:val>
+                                            <p:strVal val="#ppt_x"/>
+                                          </p:val>
+                                        </p:tav>
+                                      </p:tavLst>
+                                    </p:anim>
+                                    <p:anim calcmode="lin" valueType="num">
+                                      <p:cBhvr additive="base">
+                                        <p:cTn id="65" dur="500" fill="hold"/>
+                                        <p:tgtEl>
+                                          <p:spTgt spid="3">
+                                            <p:txEl>
+                                              <p:pRg st="7" end="7"/>
+                                            </p:txEl>
+                                          </p:spTgt>
+                                        </p:tgtEl>
+                                        <p:attrNameLst>
+                                          <p:attrName>ppt_y</p:attrName>
+                                        </p:attrNameLst>
+                                      </p:cBhvr>
+                                      <p:tavLst>
+                                        <p:tav tm="0">
+                                          <p:val>
+                                            <p:strVal val="1+#ppt_h/2"/>
+                                          </p:val>
+                                        </p:tav>
+                                        <p:tav tm="100000">
+                                          <p:val>
+                                            <p:strVal val="#ppt_y"/>
+                                          </p:val>
+                                        </p:tav>
+                                      </p:tavLst>
+                                    </p:anim>
+                                  </p:childTnLst>
+                                </p:cTn>
+                              </p:par>
+                              <p:par>
+                                <p:cTn id="66" presetID="3" presetClass="exit" presetSubtype="10" fill="hold" nodeType="withEffect">
+                                  <p:stCondLst>
+                                    <p:cond delay="0"/>
+                                  </p:stCondLst>
+                                  <p:childTnLst>
+                                    <p:animEffect transition="out" filter="blinds(horizontal)">
+                                      <p:cBhvr>
+                                        <p:cTn id="67" dur="500"/>
+                                        <p:tgtEl>
+                                          <p:spTgt spid="17"/>
+                                        </p:tgtEl>
+                                      </p:cBhvr>
+                                    </p:animEffect>
+                                    <p:set>
+                                      <p:cBhvr>
+                                        <p:cTn id="68" dur="1" fill="hold">
+                                          <p:stCondLst>
+                                            <p:cond delay="499"/>
+                                          </p:stCondLst>
+                                        </p:cTn>
+                                        <p:tgtEl>
+                                          <p:spTgt spid="17"/>
+                                        </p:tgtEl>
+                                        <p:attrNameLst>
+                                          <p:attrName>style.visibility</p:attrName>
+                                        </p:attrNameLst>
+                                      </p:cBhvr>
+                                      <p:to>
+                                        <p:strVal val="hidden"/>
+                                      </p:to>
+                                    </p:set>
+                                  </p:childTnLst>
+                                </p:cTn>
+                              </p:par>
+                            </p:childTnLst>
+                          </p:cTn>
+                        </p:par>
+                      </p:childTnLst>
+                    </p:cTn>
+                  </p:par>
+                  <p:par>
+                    <p:cTn id="69" fill="hold">
+                      <p:stCondLst>
+                        <p:cond delay="indefinite"/>
+                      </p:stCondLst>
+                      <p:childTnLst>
+                        <p:par>
+                          <p:cTn id="70" fill="hold">
+                            <p:stCondLst>
+                              <p:cond delay="0"/>
+                            </p:stCondLst>
+                            <p:childTnLst>
+                              <p:par>
+                                <p:cTn id="71" presetID="2" presetClass="entr" presetSubtype="4" fill="hold" nodeType="clickEffect">
+                                  <p:stCondLst>
+                                    <p:cond delay="0"/>
+                                  </p:stCondLst>
+                                  <p:childTnLst>
+                                    <p:set>
+                                      <p:cBhvr>
+                                        <p:cTn id="72" dur="1" fill="hold">
+                                          <p:stCondLst>
+                                            <p:cond delay="0"/>
+                                          </p:stCondLst>
+                                        </p:cTn>
+                                        <p:tgtEl>
+                                          <p:spTgt spid="3">
+                                            <p:txEl>
+                                              <p:pRg st="8" end="8"/>
+                                            </p:txEl>
+                                          </p:spTgt>
+                                        </p:tgtEl>
+                                        <p:attrNameLst>
+                                          <p:attrName>style.visibility</p:attrName>
+                                        </p:attrNameLst>
+                                      </p:cBhvr>
+                                      <p:to>
+                                        <p:strVal val="visible"/>
+                                      </p:to>
+                                    </p:set>
+                                    <p:anim calcmode="lin" valueType="num">
+                                      <p:cBhvr additive="base">
+                                        <p:cTn id="73" dur="500" fill="hold"/>
+                                        <p:tgtEl>
+                                          <p:spTgt spid="3">
+                                            <p:txEl>
+                                              <p:pRg st="8" end="8"/>
+                                            </p:txEl>
+                                          </p:spTgt>
+                                        </p:tgtEl>
+                                        <p:attrNameLst>
+                                          <p:attrName>ppt_x</p:attrName>
+                                        </p:attrNameLst>
+                                      </p:cBhvr>
+                                      <p:tavLst>
+                                        <p:tav tm="0">
+                                          <p:val>
+                                            <p:strVal val="#ppt_x"/>
+                                          </p:val>
+                                        </p:tav>
+                                        <p:tav tm="100000">
+                                          <p:val>
+                                            <p:strVal val="#ppt_x"/>
+                                          </p:val>
+                                        </p:tav>
+                                      </p:tavLst>
+                                    </p:anim>
+                                    <p:anim calcmode="lin" valueType="num">
+                                      <p:cBhvr additive="base">
+                                        <p:cTn id="74" dur="500" fill="hold"/>
+                                        <p:tgtEl>
+                                          <p:spTgt spid="3">
+                                            <p:txEl>
+                                              <p:pRg st="8" end="8"/>
+                                            </p:txEl>
+                                          </p:spTgt>
+                                        </p:tgtEl>
+                                        <p:attrNameLst>
+                                          <p:attrName>ppt_y</p:attrName>
+                                        </p:attrNameLst>
+                                      </p:cBhvr>
+                                      <p:tavLst>
+                                        <p:tav tm="0">
+                                          <p:val>
+                                            <p:strVal val="1+#ppt_h/2"/>
+                                          </p:val>
+                                        </p:tav>
+                                        <p:tav tm="100000">
+                                          <p:val>
+                                            <p:strVal val="#ppt_y"/>
+                                          </p:val>
+                                        </p:tav>
+                                      </p:tavLst>
+                                    </p:anim>
+                                  </p:childTnLst>
+                                </p:cTn>
+                              </p:par>
+                              <p:par>
+                                <p:cTn id="75" presetID="3" presetClass="exit" presetSubtype="10" fill="hold" nodeType="withEffect">
+                                  <p:stCondLst>
+                                    <p:cond delay="0"/>
+                                  </p:stCondLst>
+                                  <p:childTnLst>
+                                    <p:animEffect transition="out" filter="blinds(horizontal)">
+                                      <p:cBhvr>
+                                        <p:cTn id="76" dur="500"/>
+                                        <p:tgtEl>
+                                          <p:spTgt spid="8"/>
+                                        </p:tgtEl>
+                                      </p:cBhvr>
+                                    </p:animEffect>
+                                    <p:set>
+                                      <p:cBhvr>
+                                        <p:cTn id="77" dur="1" fill="hold">
+                                          <p:stCondLst>
+                                            <p:cond delay="499"/>
+                                          </p:stCondLst>
+                                        </p:cTn>
+                                        <p:tgtEl>
+                                          <p:spTgt spid="8"/>
+                                        </p:tgtEl>
+                                        <p:attrNameLst>
+                                          <p:attrName>style.visibility</p:attrName>
+                                        </p:attrNameLst>
+                                      </p:cBhvr>
+                                      <p:to>
+                                        <p:strVal val="hidden"/>
+                                      </p:to>
+                                    </p:set>
+                                  </p:childTnLst>
+                                </p:cTn>
+                              </p:par>
+                            </p:childTnLst>
+                          </p:cTn>
+                        </p:par>
+                      </p:childTnLst>
+                    </p:cTn>
+                  </p:par>
+                </p:childTnLst>
+              </p:cTn>
+              <p:prevCondLst>
+                <p:cond evt="onPrev" delay="0">
+                  <p:tgtEl>
+                    <p:sldTgt/>
+                  </p:tgtEl>
+                </p:cond>
+              </p:prevCondLst>
+              <p:nextCondLst>
+                <p:cond evt="onNext" delay="0">
+                  <p:tgtEl>
+                    <p:sldTgt/>
+                  </p:tgtEl>
+                </p:cond>
+              </p:nextCondLst>
+            </p:seq>
+          </p:childTnLst>
+        </p:cTn>
       </p:par>
     </p:tnLst>
+    <p:bldLst>
+      <p:bldP spid="5" grpId="0" animBg="1"/>
+      <p:bldP spid="6" grpId="0" animBg="1"/>
+      <p:bldP spid="7" grpId="0" animBg="1"/>
+      <p:bldP spid="9" grpId="1" animBg="1"/>
+      <p:bldP spid="12" grpId="1" animBg="1"/>
+      <p:bldP spid="13" grpId="1" animBg="1"/>
+      <p:bldP spid="16" grpId="1" animBg="1"/>
+    </p:bldLst>
   </p:timing>
 </p:sld>
 </file>
@@ -9513,7 +12045,12 @@
             <p:ph type="title"/>
           </p:nvPr>
         </p:nvSpPr>
-        <p:spPr/>
+        <p:spPr>
+          <a:xfrm>
+            <a:off x="457200" y="274638"/>
+            <a:ext cx="8291264" cy="1143000"/>
+          </a:xfrm>
+        </p:spPr>
         <p:txBody>
           <a:bodyPr/>
           <a:lstStyle/>
@@ -9521,7 +12058,7 @@
             <a:pPr eaLnBrk="1" hangingPunct="1"/>
             <a:r>
               <a:rPr lang="pt-BR" dirty="0" smtClean="0"/>
-              <a:t>Obtendo dados sobre memória</a:t>
+              <a:t>Obtendo dados sobre a memória</a:t>
             </a:r>
             <a:endParaRPr lang="pt-BR" dirty="0"/>
           </a:p>
@@ -9542,7 +12079,359 @@
           <a:bodyPr/>
           <a:lstStyle/>
           <a:p>
-            <a:endParaRPr lang="pt-BR"/>
+            <a:r>
+              <a:rPr lang="pt-BR" sz="2800" dirty="0" smtClean="0"/>
+              <a:t>Durante a execução de uma aplicação, podemos obter informações de memória através da classe </a:t>
+            </a:r>
+            <a:r>
+              <a:rPr lang="pt-BR" sz="2800" b="1" dirty="0" err="1" smtClean="0"/>
+              <a:t>java</a:t>
+            </a:r>
+            <a:r>
+              <a:rPr lang="pt-BR" sz="2800" b="1" dirty="0" smtClean="0"/>
+              <a:t>.</a:t>
+            </a:r>
+            <a:r>
+              <a:rPr lang="pt-BR" sz="2800" b="1" dirty="0" err="1" smtClean="0"/>
+              <a:t>lang</a:t>
+            </a:r>
+            <a:r>
+              <a:rPr lang="pt-BR" sz="2800" b="1" dirty="0" smtClean="0"/>
+              <a:t>.</a:t>
+            </a:r>
+            <a:r>
+              <a:rPr lang="pt-BR" sz="2800" b="1" dirty="0" err="1" smtClean="0"/>
+              <a:t>Runtime</a:t>
+            </a:r>
+            <a:endParaRPr lang="pt-BR" sz="2800" b="1" dirty="0" smtClean="0"/>
+          </a:p>
+          <a:p>
+            <a:pPr lvl="1" indent="6350">
+              <a:spcBef>
+                <a:spcPts val="0"/>
+              </a:spcBef>
+              <a:buNone/>
+            </a:pPr>
+            <a:endParaRPr lang="pt-BR" sz="2000" dirty="0" smtClean="0"/>
+          </a:p>
+          <a:p>
+            <a:pPr lvl="1" indent="6350">
+              <a:spcBef>
+                <a:spcPts val="0"/>
+              </a:spcBef>
+              <a:buNone/>
+            </a:pPr>
+            <a:r>
+              <a:rPr lang="pt-BR" sz="2000" dirty="0" err="1" smtClean="0">
+                <a:solidFill>
+                  <a:srgbClr val="FFC000"/>
+                </a:solidFill>
+              </a:rPr>
+              <a:t>Runtime</a:t>
+            </a:r>
+            <a:r>
+              <a:rPr lang="pt-BR" sz="2000" dirty="0" smtClean="0"/>
+              <a:t> </a:t>
+            </a:r>
+            <a:r>
+              <a:rPr lang="pt-BR" sz="2000" dirty="0" err="1" smtClean="0"/>
+              <a:t>runtime</a:t>
+            </a:r>
+            <a:r>
+              <a:rPr lang="pt-BR" sz="2000" dirty="0" smtClean="0"/>
+              <a:t> = </a:t>
+            </a:r>
+            <a:r>
+              <a:rPr lang="pt-BR" sz="2000" dirty="0" err="1" smtClean="0">
+                <a:solidFill>
+                  <a:srgbClr val="FFC000"/>
+                </a:solidFill>
+              </a:rPr>
+              <a:t>Runtime</a:t>
+            </a:r>
+            <a:r>
+              <a:rPr lang="pt-BR" sz="2000" dirty="0" smtClean="0">
+                <a:solidFill>
+                  <a:srgbClr val="FFC000"/>
+                </a:solidFill>
+              </a:rPr>
+              <a:t>.</a:t>
+            </a:r>
+            <a:r>
+              <a:rPr lang="pt-BR" sz="2000" dirty="0" err="1" smtClean="0">
+                <a:solidFill>
+                  <a:srgbClr val="FFC000"/>
+                </a:solidFill>
+              </a:rPr>
+              <a:t>getRuntime</a:t>
+            </a:r>
+            <a:r>
+              <a:rPr lang="pt-BR" sz="2000" dirty="0" smtClean="0">
+                <a:solidFill>
+                  <a:srgbClr val="FFC000"/>
+                </a:solidFill>
+              </a:rPr>
+              <a:t>()</a:t>
+            </a:r>
+            <a:r>
+              <a:rPr lang="pt-BR" sz="2000" dirty="0" smtClean="0"/>
+              <a:t>;</a:t>
+            </a:r>
+          </a:p>
+          <a:p>
+            <a:pPr lvl="1" indent="6350">
+              <a:spcBef>
+                <a:spcPts val="0"/>
+              </a:spcBef>
+              <a:buNone/>
+            </a:pPr>
+            <a:endParaRPr lang="pt-BR" sz="2000" dirty="0" smtClean="0"/>
+          </a:p>
+          <a:p>
+            <a:pPr lvl="1" indent="6350">
+              <a:spcBef>
+                <a:spcPts val="0"/>
+              </a:spcBef>
+              <a:buNone/>
+            </a:pPr>
+            <a:r>
+              <a:rPr lang="pt-BR" sz="2000" dirty="0" err="1" smtClean="0">
+                <a:solidFill>
+                  <a:srgbClr val="FFC000"/>
+                </a:solidFill>
+              </a:rPr>
+              <a:t>long</a:t>
+            </a:r>
+            <a:r>
+              <a:rPr lang="pt-BR" sz="2000" dirty="0" smtClean="0"/>
+              <a:t> </a:t>
+            </a:r>
+            <a:r>
+              <a:rPr lang="pt-BR" sz="2000" dirty="0" err="1" smtClean="0"/>
+              <a:t>free</a:t>
+            </a:r>
+            <a:r>
+              <a:rPr lang="pt-BR" sz="2000" dirty="0" smtClean="0"/>
+              <a:t> = </a:t>
+            </a:r>
+            <a:r>
+              <a:rPr lang="pt-BR" sz="2000" dirty="0" err="1" smtClean="0"/>
+              <a:t>runtime</a:t>
+            </a:r>
+            <a:r>
+              <a:rPr lang="pt-BR" sz="2000" dirty="0" smtClean="0"/>
+              <a:t>.</a:t>
+            </a:r>
+            <a:r>
+              <a:rPr lang="pt-BR" sz="2000" dirty="0" err="1" smtClean="0">
+                <a:solidFill>
+                  <a:srgbClr val="FFC000"/>
+                </a:solidFill>
+              </a:rPr>
+              <a:t>freeMemory</a:t>
+            </a:r>
+            <a:r>
+              <a:rPr lang="pt-BR" sz="2000" dirty="0" smtClean="0">
+                <a:solidFill>
+                  <a:srgbClr val="FFC000"/>
+                </a:solidFill>
+              </a:rPr>
+              <a:t>()</a:t>
+            </a:r>
+            <a:r>
+              <a:rPr lang="pt-BR" sz="2000" dirty="0" smtClean="0"/>
+              <a:t>;</a:t>
+            </a:r>
+          </a:p>
+          <a:p>
+            <a:pPr lvl="1" indent="6350">
+              <a:spcBef>
+                <a:spcPts val="0"/>
+              </a:spcBef>
+              <a:buNone/>
+            </a:pPr>
+            <a:r>
+              <a:rPr lang="pt-BR" sz="2000" dirty="0" err="1" smtClean="0">
+                <a:solidFill>
+                  <a:srgbClr val="FFC000"/>
+                </a:solidFill>
+              </a:rPr>
+              <a:t>long</a:t>
+            </a:r>
+            <a:r>
+              <a:rPr lang="pt-BR" sz="2000" dirty="0" smtClean="0"/>
+              <a:t> total = </a:t>
+            </a:r>
+            <a:r>
+              <a:rPr lang="pt-BR" sz="2000" dirty="0" err="1" smtClean="0"/>
+              <a:t>runtime</a:t>
+            </a:r>
+            <a:r>
+              <a:rPr lang="pt-BR" sz="2000" dirty="0" smtClean="0"/>
+              <a:t>.</a:t>
+            </a:r>
+            <a:r>
+              <a:rPr lang="pt-BR" sz="2000" dirty="0" err="1" smtClean="0">
+                <a:solidFill>
+                  <a:srgbClr val="FFC000"/>
+                </a:solidFill>
+              </a:rPr>
+              <a:t>totalMemory</a:t>
+            </a:r>
+            <a:r>
+              <a:rPr lang="pt-BR" sz="2000" dirty="0" smtClean="0">
+                <a:solidFill>
+                  <a:srgbClr val="FFC000"/>
+                </a:solidFill>
+              </a:rPr>
+              <a:t>()</a:t>
+            </a:r>
+            <a:r>
+              <a:rPr lang="pt-BR" sz="2000" dirty="0" smtClean="0"/>
+              <a:t>;</a:t>
+            </a:r>
+          </a:p>
+          <a:p>
+            <a:pPr lvl="1" indent="6350">
+              <a:spcBef>
+                <a:spcPts val="0"/>
+              </a:spcBef>
+              <a:buNone/>
+            </a:pPr>
+            <a:r>
+              <a:rPr lang="pt-BR" sz="2000" dirty="0" err="1" smtClean="0">
+                <a:solidFill>
+                  <a:srgbClr val="FFC000"/>
+                </a:solidFill>
+              </a:rPr>
+              <a:t>long</a:t>
+            </a:r>
+            <a:r>
+              <a:rPr lang="pt-BR" sz="2000" dirty="0" smtClean="0"/>
+              <a:t> </a:t>
+            </a:r>
+            <a:r>
+              <a:rPr lang="pt-BR" sz="2000" dirty="0" err="1" smtClean="0"/>
+              <a:t>max</a:t>
+            </a:r>
+            <a:r>
+              <a:rPr lang="pt-BR" sz="2000" dirty="0" smtClean="0"/>
+              <a:t> = </a:t>
+            </a:r>
+            <a:r>
+              <a:rPr lang="pt-BR" sz="2000" dirty="0" err="1" smtClean="0"/>
+              <a:t>runtime</a:t>
+            </a:r>
+            <a:r>
+              <a:rPr lang="pt-BR" sz="2000" dirty="0" smtClean="0"/>
+              <a:t>.</a:t>
+            </a:r>
+            <a:r>
+              <a:rPr lang="pt-BR" sz="2000" dirty="0" err="1" smtClean="0">
+                <a:solidFill>
+                  <a:srgbClr val="FFC000"/>
+                </a:solidFill>
+              </a:rPr>
+              <a:t>maxMemory</a:t>
+            </a:r>
+            <a:r>
+              <a:rPr lang="pt-BR" sz="2000" dirty="0" smtClean="0">
+                <a:solidFill>
+                  <a:srgbClr val="FFC000"/>
+                </a:solidFill>
+              </a:rPr>
+              <a:t>()</a:t>
+            </a:r>
+            <a:r>
+              <a:rPr lang="pt-BR" sz="2000" dirty="0" smtClean="0"/>
+              <a:t>;</a:t>
+            </a:r>
+          </a:p>
+          <a:p>
+            <a:pPr lvl="1" indent="6350">
+              <a:spcBef>
+                <a:spcPts val="0"/>
+              </a:spcBef>
+              <a:buNone/>
+            </a:pPr>
+            <a:endParaRPr lang="pt-BR" sz="2000" dirty="0" smtClean="0"/>
+          </a:p>
+          <a:p>
+            <a:pPr lvl="1" indent="6350">
+              <a:spcBef>
+                <a:spcPts val="0"/>
+              </a:spcBef>
+              <a:buNone/>
+            </a:pPr>
+            <a:r>
+              <a:rPr lang="pt-BR" sz="2000" dirty="0" smtClean="0"/>
+              <a:t>System.</a:t>
+            </a:r>
+            <a:r>
+              <a:rPr lang="pt-BR" sz="2000" dirty="0" err="1" smtClean="0"/>
+              <a:t>out.printf</a:t>
+            </a:r>
+            <a:r>
+              <a:rPr lang="pt-BR" sz="2000" dirty="0" smtClean="0"/>
+              <a:t>("Memória livre : %,12d%n", </a:t>
+            </a:r>
+            <a:r>
+              <a:rPr lang="pt-BR" sz="2000" dirty="0" err="1" smtClean="0"/>
+              <a:t>free</a:t>
+            </a:r>
+            <a:r>
+              <a:rPr lang="pt-BR" sz="2000" dirty="0" smtClean="0"/>
+              <a:t>);</a:t>
+            </a:r>
+          </a:p>
+          <a:p>
+            <a:pPr lvl="1" indent="6350">
+              <a:spcBef>
+                <a:spcPts val="0"/>
+              </a:spcBef>
+              <a:buNone/>
+            </a:pPr>
+            <a:r>
+              <a:rPr lang="pt-BR" sz="2000" dirty="0" smtClean="0"/>
+              <a:t>System.</a:t>
+            </a:r>
+            <a:r>
+              <a:rPr lang="pt-BR" sz="2000" dirty="0" err="1" smtClean="0"/>
+              <a:t>out.printf</a:t>
+            </a:r>
+            <a:r>
+              <a:rPr lang="pt-BR" sz="2000" dirty="0" smtClean="0"/>
+              <a:t>("Memória total : %,12d%n", total);</a:t>
+            </a:r>
+          </a:p>
+          <a:p>
+            <a:pPr lvl="1" indent="6350">
+              <a:spcBef>
+                <a:spcPts val="0"/>
+              </a:spcBef>
+              <a:buNone/>
+            </a:pPr>
+            <a:r>
+              <a:rPr lang="pt-BR" sz="2000" dirty="0" smtClean="0"/>
+              <a:t>System.</a:t>
+            </a:r>
+            <a:r>
+              <a:rPr lang="pt-BR" sz="2000" dirty="0" err="1" smtClean="0"/>
+              <a:t>out.printf</a:t>
+            </a:r>
+            <a:r>
+              <a:rPr lang="pt-BR" sz="2000" dirty="0" smtClean="0"/>
+              <a:t>("Memória limite: %,12d%n", </a:t>
+            </a:r>
+            <a:r>
+              <a:rPr lang="pt-BR" sz="2000" dirty="0" err="1" smtClean="0"/>
+              <a:t>max</a:t>
+            </a:r>
+            <a:r>
+              <a:rPr lang="pt-BR" sz="2000" dirty="0" smtClean="0"/>
+              <a:t>);</a:t>
+            </a:r>
+            <a:endParaRPr lang="pt-BR" sz="2000" dirty="0"/>
           </a:p>
         </p:txBody>
       </p:sp>
@@ -9622,22 +12511,9 @@
           <a:bodyPr/>
           <a:lstStyle/>
           <a:p>
-            <a:pPr eaLnBrk="1" hangingPunct="1"/>
             <a:r>
               <a:rPr lang="pt-BR" dirty="0" smtClean="0"/>
-              <a:t>Desabilitando o </a:t>
-            </a:r>
-            <a:r>
-              <a:rPr lang="pt-BR" dirty="0" err="1" smtClean="0"/>
-              <a:t>Garbage</a:t>
-            </a:r>
-            <a:r>
-              <a:rPr lang="pt-BR" dirty="0" smtClean="0"/>
-              <a:t> </a:t>
-            </a:r>
-            <a:r>
-              <a:rPr lang="pt-BR" dirty="0" err="1" smtClean="0"/>
-              <a:t>Collector</a:t>
+              <a:t>Configurações de memória</a:t>
             </a:r>
             <a:endParaRPr lang="pt-BR" dirty="0"/>
           </a:p>
@@ -9658,7 +12534,48 @@
           <a:bodyPr/>
           <a:lstStyle/>
           <a:p>
-            <a:endParaRPr lang="pt-BR"/>
+            <a:r>
+              <a:rPr lang="pt-BR" dirty="0" smtClean="0"/>
+              <a:t>Ao executar uma aplicação Java, podemos definir a quantidade de memória que o sistema operacional disponibilizará para o JVM:</a:t>
+            </a:r>
+          </a:p>
+          <a:p>
+            <a:pPr indent="0" algn="ctr">
+              <a:buNone/>
+            </a:pPr>
+            <a:endParaRPr lang="pt-BR" sz="2400" dirty="0" smtClean="0"/>
+          </a:p>
+          <a:p>
+            <a:pPr indent="0" algn="ctr">
+              <a:buNone/>
+            </a:pPr>
+            <a:endParaRPr lang="pt-BR" sz="2400" dirty="0" smtClean="0"/>
+          </a:p>
+          <a:p>
+            <a:pPr indent="0" algn="ctr">
+              <a:buNone/>
+            </a:pPr>
+            <a:r>
+              <a:rPr lang="pt-BR" sz="2400" dirty="0" err="1" smtClean="0"/>
+              <a:t>java</a:t>
+            </a:r>
+            <a:r>
+              <a:rPr lang="pt-BR" sz="2400" dirty="0" smtClean="0"/>
+              <a:t>  </a:t>
+            </a:r>
+            <a:r>
+              <a:rPr lang="pt-BR" sz="2400" dirty="0" smtClean="0">
+                <a:solidFill>
+                  <a:srgbClr val="FFC000"/>
+                </a:solidFill>
+              </a:rPr>
+              <a:t>-Xms128m  -Xmx512m  </a:t>
+            </a:r>
+            <a:r>
+              <a:rPr lang="pt-BR" sz="2400" dirty="0" err="1" smtClean="0"/>
+              <a:t>OlaMundo</a:t>
+            </a:r>
+            <a:endParaRPr lang="pt-BR" sz="2400" dirty="0"/>
           </a:p>
         </p:txBody>
       </p:sp>
@@ -9696,13 +12613,6 @@
   <p:clrMapOvr>
     <a:masterClrMapping/>
   </p:clrMapOvr>
-  <p:timing>
-    <p:tnLst>
-      <p:par>
-        <p:cTn id="1" dur="indefinite" restart="never" nodeType="tmRoot"/>
-      </p:par>
-    </p:tnLst>
-  </p:timing>
 </p:sld>
 </file>
 
@@ -9738,10 +12648,9 @@
           <a:bodyPr/>
           <a:lstStyle/>
           <a:p>
-            <a:pPr eaLnBrk="1" hangingPunct="1"/>
             <a:r>
               <a:rPr lang="pt-BR" dirty="0" smtClean="0"/>
-              <a:t>Ciclo de vida dos objetos</a:t>
+              <a:t>Configurações de memória</a:t>
             </a:r>
             <a:endParaRPr lang="pt-BR" dirty="0"/>
           </a:p>
@@ -9762,7 +12671,45 @@
           <a:bodyPr/>
           <a:lstStyle/>
           <a:p>
-            <a:endParaRPr lang="pt-BR"/>
+            <a:r>
+              <a:rPr lang="pt-BR" dirty="0" smtClean="0"/>
+              <a:t>-</a:t>
+            </a:r>
+            <a:r>
+              <a:rPr lang="pt-BR" dirty="0" err="1" smtClean="0"/>
+              <a:t>Xms</a:t>
+            </a:r>
+            <a:endParaRPr lang="pt-BR" dirty="0" smtClean="0"/>
+          </a:p>
+          <a:p>
+            <a:pPr lvl="1"/>
+            <a:r>
+              <a:rPr lang="pt-BR" dirty="0" smtClean="0"/>
+              <a:t>Define a quantidade inicial de memória a ser utilizada pelo JVM.</a:t>
+            </a:r>
+          </a:p>
+          <a:p>
+            <a:pPr lvl="1"/>
+            <a:endParaRPr lang="pt-BR" dirty="0" smtClean="0"/>
+          </a:p>
+          <a:p>
+            <a:r>
+              <a:rPr lang="pt-BR" dirty="0" smtClean="0"/>
+              <a:t>-</a:t>
+            </a:r>
+            <a:r>
+              <a:rPr lang="pt-BR" dirty="0" err="1" smtClean="0"/>
+              <a:t>Xmx</a:t>
+            </a:r>
+            <a:endParaRPr lang="pt-BR" dirty="0" smtClean="0"/>
+          </a:p>
+          <a:p>
+            <a:pPr lvl="1"/>
+            <a:r>
+              <a:rPr lang="pt-BR" dirty="0" smtClean="0"/>
+              <a:t>Define a quantidade máxima de memória que o sistema operacional alocará para o JVM.</a:t>
+            </a:r>
+            <a:endParaRPr lang="pt-BR" sz="2400" dirty="0"/>
           </a:p>
         </p:txBody>
       </p:sp>
@@ -9800,13 +12747,6 @@
   <p:clrMapOvr>
     <a:masterClrMapping/>
   </p:clrMapOvr>
-  <p:timing>
-    <p:tnLst>
-      <p:par>
-        <p:cTn id="1" dur="indefinite" restart="never" nodeType="tmRoot"/>
-      </p:par>
-    </p:tnLst>
-  </p:timing>
 </p:sld>
 </file>
 
@@ -9927,7 +12867,6 @@
               <a:rPr lang="pt-BR" dirty="0" smtClean="0"/>
               <a:t>Preparando o objeto para a coleta</a:t>
             </a:r>
-            <a:endParaRPr lang="pt-BR" dirty="0"/>
           </a:p>
         </p:txBody>
       </p:sp>
@@ -9954,21 +12893,8 @@
           <a:p>
             <a:r>
               <a:rPr lang="pt-BR" dirty="0" smtClean="0"/>
-              <a:t>Desabilitando o </a:t>
-            </a:r>
-            <a:r>
-              <a:rPr lang="pt-BR" dirty="0" err="1" smtClean="0"/>
-              <a:t>Garbage</a:t>
-            </a:r>
-            <a:r>
-              <a:rPr lang="pt-BR" dirty="0" smtClean="0"/>
-              <a:t> </a:t>
-            </a:r>
-            <a:r>
-              <a:rPr lang="pt-BR" dirty="0" err="1" smtClean="0"/>
-              <a:t>Collector</a:t>
-            </a:r>
-            <a:endParaRPr lang="pt-BR" dirty="0" smtClean="0"/>
+              <a:t>Configurações de memória</a:t>
+            </a:r>
           </a:p>
           <a:p>
             <a:r>
@@ -9979,7 +12905,7 @@
           <a:p>
             <a:r>
               <a:rPr lang="pt-BR" dirty="0" smtClean="0"/>
-              <a:t>Objetos de referência</a:t>
+              <a:t>Tipos de referência</a:t>
             </a:r>
             <a:endParaRPr lang="pt-BR" dirty="0"/>
           </a:p>
@@ -10064,28 +12990,9 @@
             <a:pPr eaLnBrk="1" hangingPunct="1"/>
             <a:r>
               <a:rPr lang="pt-BR" dirty="0" smtClean="0"/>
-              <a:t>Objetos de referência</a:t>
+              <a:t>Ciclo de vida dos objetos</a:t>
             </a:r>
             <a:endParaRPr lang="pt-BR" dirty="0"/>
-          </a:p>
-        </p:txBody>
-      </p:sp>
-      <p:sp>
-        <p:nvSpPr>
-          <p:cNvPr id="3" name="Espaço Reservado para Conteúdo 2"/>
-          <p:cNvSpPr>
-            <a:spLocks noGrp="1"/>
-          </p:cNvSpPr>
-          <p:nvPr>
-            <p:ph idx="1"/>
-          </p:nvPr>
-        </p:nvSpPr>
-        <p:spPr/>
-        <p:txBody>
-          <a:bodyPr/>
-          <a:lstStyle/>
-          <a:p>
-            <a:endParaRPr lang="pt-BR"/>
           </a:p>
         </p:txBody>
       </p:sp>
@@ -10113,6 +13020,460 @@
                 <a:defRPr/>
               </a:pPr>
               <a:t>20</a:t>
+            </a:fld>
+            <a:endParaRPr lang="pt-BR"/>
+          </a:p>
+        </p:txBody>
+      </p:sp>
+      <p:sp>
+        <p:nvSpPr>
+          <p:cNvPr id="7" name="Retângulo de cantos arredondados 6"/>
+          <p:cNvSpPr/>
+          <p:nvPr/>
+        </p:nvSpPr>
+        <p:spPr>
+          <a:xfrm>
+            <a:off x="611560" y="1628800"/>
+            <a:ext cx="2592288" cy="576064"/>
+          </a:xfrm>
+          <a:prstGeom prst="roundRect">
+            <a:avLst/>
+          </a:prstGeom>
+          <a:noFill/>
+          <a:ln w="38100">
+            <a:solidFill>
+              <a:srgbClr val="FFC000"/>
+            </a:solidFill>
+          </a:ln>
+        </p:spPr>
+        <p:style>
+          <a:lnRef idx="2">
+            <a:schemeClr val="accent1">
+              <a:shade val="50000"/>
+            </a:schemeClr>
+          </a:lnRef>
+          <a:fillRef idx="1">
+            <a:schemeClr val="accent1"/>
+          </a:fillRef>
+          <a:effectRef idx="0">
+            <a:schemeClr val="accent1"/>
+          </a:effectRef>
+          <a:fontRef idx="minor">
+            <a:schemeClr val="lt1"/>
+          </a:fontRef>
+        </p:style>
+        <p:txBody>
+          <a:bodyPr rtlCol="0" anchor="ctr"/>
+          <a:lstStyle/>
+          <a:p>
+            <a:pPr algn="ctr"/>
+            <a:r>
+              <a:rPr lang="pt-BR" dirty="0" err="1" smtClean="0"/>
+              <a:t>Created</a:t>
+            </a:r>
+            <a:endParaRPr lang="pt-BR" dirty="0"/>
+          </a:p>
+        </p:txBody>
+      </p:sp>
+      <p:sp>
+        <p:nvSpPr>
+          <p:cNvPr id="8" name="Retângulo de cantos arredondados 7"/>
+          <p:cNvSpPr/>
+          <p:nvPr/>
+        </p:nvSpPr>
+        <p:spPr>
+          <a:xfrm>
+            <a:off x="611560" y="2348880"/>
+            <a:ext cx="2592288" cy="576064"/>
+          </a:xfrm>
+          <a:prstGeom prst="roundRect">
+            <a:avLst/>
+          </a:prstGeom>
+          <a:noFill/>
+          <a:ln w="38100">
+            <a:solidFill>
+              <a:srgbClr val="FFC000"/>
+            </a:solidFill>
+          </a:ln>
+        </p:spPr>
+        <p:style>
+          <a:lnRef idx="2">
+            <a:schemeClr val="accent1">
+              <a:shade val="50000"/>
+            </a:schemeClr>
+          </a:lnRef>
+          <a:fillRef idx="1">
+            <a:schemeClr val="accent1"/>
+          </a:fillRef>
+          <a:effectRef idx="0">
+            <a:schemeClr val="accent1"/>
+          </a:effectRef>
+          <a:fontRef idx="minor">
+            <a:schemeClr val="lt1"/>
+          </a:fontRef>
+        </p:style>
+        <p:txBody>
+          <a:bodyPr rtlCol="0" anchor="ctr"/>
+          <a:lstStyle/>
+          <a:p>
+            <a:pPr algn="ctr"/>
+            <a:r>
+              <a:rPr lang="pt-BR" dirty="0" smtClean="0"/>
+              <a:t>In use</a:t>
+            </a:r>
+            <a:endParaRPr lang="pt-BR" dirty="0"/>
+          </a:p>
+        </p:txBody>
+      </p:sp>
+      <p:sp>
+        <p:nvSpPr>
+          <p:cNvPr id="9" name="Retângulo de cantos arredondados 8"/>
+          <p:cNvSpPr/>
+          <p:nvPr/>
+        </p:nvSpPr>
+        <p:spPr>
+          <a:xfrm>
+            <a:off x="611560" y="3068960"/>
+            <a:ext cx="2592288" cy="576064"/>
+          </a:xfrm>
+          <a:prstGeom prst="roundRect">
+            <a:avLst/>
+          </a:prstGeom>
+          <a:noFill/>
+          <a:ln w="38100">
+            <a:solidFill>
+              <a:srgbClr val="FFC000"/>
+            </a:solidFill>
+          </a:ln>
+        </p:spPr>
+        <p:style>
+          <a:lnRef idx="2">
+            <a:schemeClr val="accent1">
+              <a:shade val="50000"/>
+            </a:schemeClr>
+          </a:lnRef>
+          <a:fillRef idx="1">
+            <a:schemeClr val="accent1"/>
+          </a:fillRef>
+          <a:effectRef idx="0">
+            <a:schemeClr val="accent1"/>
+          </a:effectRef>
+          <a:fontRef idx="minor">
+            <a:schemeClr val="lt1"/>
+          </a:fontRef>
+        </p:style>
+        <p:txBody>
+          <a:bodyPr rtlCol="0" anchor="ctr"/>
+          <a:lstStyle/>
+          <a:p>
+            <a:pPr algn="ctr"/>
+            <a:r>
+              <a:rPr lang="pt-BR" dirty="0" err="1" smtClean="0"/>
+              <a:t>Invisible</a:t>
+            </a:r>
+            <a:endParaRPr lang="pt-BR" dirty="0"/>
+          </a:p>
+        </p:txBody>
+      </p:sp>
+      <p:sp>
+        <p:nvSpPr>
+          <p:cNvPr id="10" name="Retângulo de cantos arredondados 9"/>
+          <p:cNvSpPr/>
+          <p:nvPr/>
+        </p:nvSpPr>
+        <p:spPr>
+          <a:xfrm>
+            <a:off x="611560" y="3789040"/>
+            <a:ext cx="2592288" cy="576064"/>
+          </a:xfrm>
+          <a:prstGeom prst="roundRect">
+            <a:avLst/>
+          </a:prstGeom>
+          <a:noFill/>
+          <a:ln w="38100">
+            <a:solidFill>
+              <a:srgbClr val="FFC000"/>
+            </a:solidFill>
+          </a:ln>
+        </p:spPr>
+        <p:style>
+          <a:lnRef idx="2">
+            <a:schemeClr val="accent1">
+              <a:shade val="50000"/>
+            </a:schemeClr>
+          </a:lnRef>
+          <a:fillRef idx="1">
+            <a:schemeClr val="accent1"/>
+          </a:fillRef>
+          <a:effectRef idx="0">
+            <a:schemeClr val="accent1"/>
+          </a:effectRef>
+          <a:fontRef idx="minor">
+            <a:schemeClr val="lt1"/>
+          </a:fontRef>
+        </p:style>
+        <p:txBody>
+          <a:bodyPr rtlCol="0" anchor="ctr"/>
+          <a:lstStyle/>
+          <a:p>
+            <a:pPr algn="ctr"/>
+            <a:r>
+              <a:rPr lang="pt-BR" dirty="0" err="1" smtClean="0"/>
+              <a:t>Unreachable</a:t>
+            </a:r>
+            <a:endParaRPr lang="pt-BR" dirty="0"/>
+          </a:p>
+        </p:txBody>
+      </p:sp>
+      <p:sp>
+        <p:nvSpPr>
+          <p:cNvPr id="11" name="Retângulo de cantos arredondados 10"/>
+          <p:cNvSpPr/>
+          <p:nvPr/>
+        </p:nvSpPr>
+        <p:spPr>
+          <a:xfrm>
+            <a:off x="611560" y="4509120"/>
+            <a:ext cx="2592288" cy="576064"/>
+          </a:xfrm>
+          <a:prstGeom prst="roundRect">
+            <a:avLst/>
+          </a:prstGeom>
+          <a:noFill/>
+          <a:ln w="38100">
+            <a:solidFill>
+              <a:srgbClr val="FFC000"/>
+            </a:solidFill>
+          </a:ln>
+        </p:spPr>
+        <p:style>
+          <a:lnRef idx="2">
+            <a:schemeClr val="accent1">
+              <a:shade val="50000"/>
+            </a:schemeClr>
+          </a:lnRef>
+          <a:fillRef idx="1">
+            <a:schemeClr val="accent1"/>
+          </a:fillRef>
+          <a:effectRef idx="0">
+            <a:schemeClr val="accent1"/>
+          </a:effectRef>
+          <a:fontRef idx="minor">
+            <a:schemeClr val="lt1"/>
+          </a:fontRef>
+        </p:style>
+        <p:txBody>
+          <a:bodyPr rtlCol="0" anchor="ctr"/>
+          <a:lstStyle/>
+          <a:p>
+            <a:pPr algn="ctr"/>
+            <a:r>
+              <a:rPr lang="pt-BR" dirty="0" err="1" smtClean="0"/>
+              <a:t>Collected</a:t>
+            </a:r>
+            <a:endParaRPr lang="pt-BR" dirty="0"/>
+          </a:p>
+        </p:txBody>
+      </p:sp>
+      <p:sp>
+        <p:nvSpPr>
+          <p:cNvPr id="12" name="Retângulo de cantos arredondados 11"/>
+          <p:cNvSpPr/>
+          <p:nvPr/>
+        </p:nvSpPr>
+        <p:spPr>
+          <a:xfrm>
+            <a:off x="611560" y="5229200"/>
+            <a:ext cx="2592288" cy="576064"/>
+          </a:xfrm>
+          <a:prstGeom prst="roundRect">
+            <a:avLst/>
+          </a:prstGeom>
+          <a:noFill/>
+          <a:ln w="38100">
+            <a:solidFill>
+              <a:srgbClr val="FFC000"/>
+            </a:solidFill>
+          </a:ln>
+        </p:spPr>
+        <p:style>
+          <a:lnRef idx="2">
+            <a:schemeClr val="accent1">
+              <a:shade val="50000"/>
+            </a:schemeClr>
+          </a:lnRef>
+          <a:fillRef idx="1">
+            <a:schemeClr val="accent1"/>
+          </a:fillRef>
+          <a:effectRef idx="0">
+            <a:schemeClr val="accent1"/>
+          </a:effectRef>
+          <a:fontRef idx="minor">
+            <a:schemeClr val="lt1"/>
+          </a:fontRef>
+        </p:style>
+        <p:txBody>
+          <a:bodyPr rtlCol="0" anchor="ctr"/>
+          <a:lstStyle/>
+          <a:p>
+            <a:pPr algn="ctr"/>
+            <a:r>
+              <a:rPr lang="pt-BR" dirty="0" err="1" smtClean="0"/>
+              <a:t>Finalized</a:t>
+            </a:r>
+            <a:endParaRPr lang="pt-BR" dirty="0"/>
+          </a:p>
+        </p:txBody>
+      </p:sp>
+      <p:sp>
+        <p:nvSpPr>
+          <p:cNvPr id="13" name="Retângulo de cantos arredondados 12"/>
+          <p:cNvSpPr/>
+          <p:nvPr/>
+        </p:nvSpPr>
+        <p:spPr>
+          <a:xfrm>
+            <a:off x="611560" y="5949280"/>
+            <a:ext cx="2592288" cy="576064"/>
+          </a:xfrm>
+          <a:prstGeom prst="roundRect">
+            <a:avLst/>
+          </a:prstGeom>
+          <a:noFill/>
+          <a:ln w="38100">
+            <a:solidFill>
+              <a:srgbClr val="FFC000"/>
+            </a:solidFill>
+          </a:ln>
+        </p:spPr>
+        <p:style>
+          <a:lnRef idx="2">
+            <a:schemeClr val="accent1">
+              <a:shade val="50000"/>
+            </a:schemeClr>
+          </a:lnRef>
+          <a:fillRef idx="1">
+            <a:schemeClr val="accent1"/>
+          </a:fillRef>
+          <a:effectRef idx="0">
+            <a:schemeClr val="accent1"/>
+          </a:effectRef>
+          <a:fontRef idx="minor">
+            <a:schemeClr val="lt1"/>
+          </a:fontRef>
+        </p:style>
+        <p:txBody>
+          <a:bodyPr rtlCol="0" anchor="ctr"/>
+          <a:lstStyle/>
+          <a:p>
+            <a:pPr algn="ctr"/>
+            <a:r>
+              <a:rPr lang="pt-BR" dirty="0" err="1" smtClean="0"/>
+              <a:t>Deallocated</a:t>
+            </a:r>
+            <a:endParaRPr lang="pt-BR" dirty="0"/>
+          </a:p>
+        </p:txBody>
+      </p:sp>
+    </p:spTree>
+  </p:cSld>
+  <p:clrMapOvr>
+    <a:masterClrMapping/>
+  </p:clrMapOvr>
+  <p:timing>
+    <p:tnLst>
+      <p:par>
+        <p:cTn id="1" dur="indefinite" restart="never" nodeType="tmRoot"/>
+      </p:par>
+    </p:tnLst>
+  </p:timing>
+</p:sld>
+</file>
+
+<file path=ppt/slides/slide21.xml><?xml version="1.0" encoding="utf-8"?>
+<p:sld xmlns:a="http://schemas.openxmlformats.org/drawingml/2006/main" xmlns:r="http://schemas.openxmlformats.org/officeDocument/2006/relationships" xmlns:p="http://schemas.openxmlformats.org/presentationml/2006/main">
+  <p:cSld>
+    <p:spTree>
+      <p:nvGrpSpPr>
+        <p:cNvPr id="1" name=""/>
+        <p:cNvGrpSpPr/>
+        <p:nvPr/>
+      </p:nvGrpSpPr>
+      <p:grpSpPr>
+        <a:xfrm>
+          <a:off x="0" y="0"/>
+          <a:ext cx="0" cy="0"/>
+          <a:chOff x="0" y="0"/>
+          <a:chExt cx="0" cy="0"/>
+        </a:xfrm>
+      </p:grpSpPr>
+      <p:sp>
+        <p:nvSpPr>
+          <p:cNvPr id="2" name="Título 1"/>
+          <p:cNvSpPr>
+            <a:spLocks noGrp="1"/>
+          </p:cNvSpPr>
+          <p:nvPr>
+            <p:ph type="title"/>
+          </p:nvPr>
+        </p:nvSpPr>
+        <p:spPr/>
+        <p:txBody>
+          <a:bodyPr/>
+          <a:lstStyle/>
+          <a:p>
+            <a:pPr eaLnBrk="1" hangingPunct="1"/>
+            <a:r>
+              <a:rPr lang="pt-BR" dirty="0" smtClean="0"/>
+              <a:t>Objetos de referência</a:t>
+            </a:r>
+            <a:endParaRPr lang="pt-BR" dirty="0"/>
+          </a:p>
+        </p:txBody>
+      </p:sp>
+      <p:sp>
+        <p:nvSpPr>
+          <p:cNvPr id="3" name="Espaço Reservado para Conteúdo 2"/>
+          <p:cNvSpPr>
+            <a:spLocks noGrp="1"/>
+          </p:cNvSpPr>
+          <p:nvPr>
+            <p:ph idx="1"/>
+          </p:nvPr>
+        </p:nvSpPr>
+        <p:spPr/>
+        <p:txBody>
+          <a:bodyPr/>
+          <a:lstStyle/>
+          <a:p>
+            <a:endParaRPr lang="pt-BR"/>
+          </a:p>
+        </p:txBody>
+      </p:sp>
+      <p:sp>
+        <p:nvSpPr>
+          <p:cNvPr id="4" name="Espaço Reservado para Número de Slide 3"/>
+          <p:cNvSpPr>
+            <a:spLocks noGrp="1"/>
+          </p:cNvSpPr>
+          <p:nvPr>
+            <p:ph type="sldNum" sz="quarter" idx="12"/>
+          </p:nvPr>
+        </p:nvSpPr>
+        <p:spPr/>
+        <p:txBody>
+          <a:bodyPr/>
+          <a:lstStyle/>
+          <a:p>
+            <a:pPr>
+              <a:defRPr/>
+            </a:pPr>
+            <a:fld id="{21B5E3EF-F5EF-4A0A-A70F-386D7016207D}" type="slidenum">
+              <a:rPr lang="pt-BR" smtClean="0"/>
+              <a:pPr>
+                <a:defRPr/>
+              </a:pPr>
+              <a:t>21</a:t>
             </a:fld>
             <a:endParaRPr lang="pt-BR"/>
           </a:p>
@@ -13633,10 +16994,6 @@
           <a:lstStyle/>
           <a:p>
             <a:r>
-              <a:rPr lang="pt-BR" dirty="0" smtClean="0"/>
-              <a:t>O </a:t>
-            </a:r>
-            <a:r>
               <a:rPr lang="pt-BR" dirty="0" err="1" smtClean="0"/>
               <a:t>Garbage</a:t>
             </a:r>

</xml_diff>

<commit_message>
Rascunho sobre tipos de referências pelo JVM.
</commit_message>
<xml_diff>
--- a/2-Java-Programmer-Modulo-II/11.Capitulo05.pptx
+++ b/2-Java-Programmer-Modulo-II/11.Capitulo05.pptx
@@ -5,7 +5,7 @@
     <p:sldMasterId id="2147483660" r:id="rId1"/>
   </p:sldMasterIdLst>
   <p:notesMasterIdLst>
-    <p:notesMasterId r:id="rId30"/>
+    <p:notesMasterId r:id="rId32"/>
   </p:notesMasterIdLst>
   <p:sldIdLst>
     <p:sldId id="256" r:id="rId2"/>
@@ -35,7 +35,9 @@
     <p:sldId id="325" r:id="rId26"/>
     <p:sldId id="327" r:id="rId27"/>
     <p:sldId id="328" r:id="rId28"/>
-    <p:sldId id="306" r:id="rId29"/>
+    <p:sldId id="330" r:id="rId29"/>
+    <p:sldId id="329" r:id="rId30"/>
+    <p:sldId id="306" r:id="rId31"/>
   </p:sldIdLst>
   <p:sldSz cx="9144000" cy="6858000" type="screen4x3"/>
   <p:notesSz cx="6858000" cy="9144000"/>
@@ -464,7 +466,7 @@
               <a:pPr>
                 <a:defRPr/>
               </a:pPr>
-              <a:t>‹#›</a:t>
+              <a:t>‹nº›</a:t>
             </a:fld>
             <a:endParaRPr lang="pt-BR"/>
           </a:p>
@@ -2466,6 +2468,93 @@
 </p:notes>
 </file>
 
+<file path=ppt/notesSlides/notesSlide29.xml><?xml version="1.0" encoding="utf-8"?>
+<p:notes xmlns:a="http://schemas.openxmlformats.org/drawingml/2006/main" xmlns:r="http://schemas.openxmlformats.org/officeDocument/2006/relationships" xmlns:p="http://schemas.openxmlformats.org/presentationml/2006/main">
+  <p:cSld>
+    <p:spTree>
+      <p:nvGrpSpPr>
+        <p:cNvPr id="1" name=""/>
+        <p:cNvGrpSpPr/>
+        <p:nvPr/>
+      </p:nvGrpSpPr>
+      <p:grpSpPr>
+        <a:xfrm>
+          <a:off x="0" y="0"/>
+          <a:ext cx="0" cy="0"/>
+          <a:chOff x="0" y="0"/>
+          <a:chExt cx="0" cy="0"/>
+        </a:xfrm>
+      </p:grpSpPr>
+      <p:sp>
+        <p:nvSpPr>
+          <p:cNvPr id="2" name="Espaço Reservado para Imagem de Slide 1"/>
+          <p:cNvSpPr>
+            <a:spLocks noGrp="1" noRot="1" noChangeAspect="1"/>
+          </p:cNvSpPr>
+          <p:nvPr>
+            <p:ph type="sldImg"/>
+          </p:nvPr>
+        </p:nvSpPr>
+        <p:spPr/>
+      </p:sp>
+      <p:sp>
+        <p:nvSpPr>
+          <p:cNvPr id="3" name="Espaço Reservado para Anotações 2"/>
+          <p:cNvSpPr>
+            <a:spLocks noGrp="1"/>
+          </p:cNvSpPr>
+          <p:nvPr>
+            <p:ph type="body" idx="1"/>
+          </p:nvPr>
+        </p:nvSpPr>
+        <p:spPr/>
+        <p:txBody>
+          <a:bodyPr>
+            <a:normAutofit/>
+          </a:bodyPr>
+          <a:lstStyle/>
+          <a:p>
+            <a:endParaRPr lang="pt-BR"/>
+          </a:p>
+        </p:txBody>
+      </p:sp>
+      <p:sp>
+        <p:nvSpPr>
+          <p:cNvPr id="4" name="Espaço Reservado para Número de Slide 3"/>
+          <p:cNvSpPr>
+            <a:spLocks noGrp="1"/>
+          </p:cNvSpPr>
+          <p:nvPr>
+            <p:ph type="sldNum" sz="quarter" idx="10"/>
+          </p:nvPr>
+        </p:nvSpPr>
+        <p:spPr/>
+        <p:txBody>
+          <a:bodyPr/>
+          <a:lstStyle/>
+          <a:p>
+            <a:pPr>
+              <a:defRPr/>
+            </a:pPr>
+            <a:fld id="{1935B8E8-55BE-43E9-B7F8-2CD1361E8ED0}" type="slidenum">
+              <a:rPr lang="pt-BR" smtClean="0"/>
+              <a:pPr>
+                <a:defRPr/>
+              </a:pPr>
+              <a:t>29</a:t>
+            </a:fld>
+            <a:endParaRPr lang="pt-BR"/>
+          </a:p>
+        </p:txBody>
+      </p:sp>
+    </p:spTree>
+  </p:cSld>
+  <p:clrMapOvr>
+    <a:masterClrMapping/>
+  </p:clrMapOvr>
+</p:notes>
+</file>
+
 <file path=ppt/notesSlides/notesSlide3.xml><?xml version="1.0" encoding="utf-8"?>
 <p:notes xmlns:a="http://schemas.openxmlformats.org/drawingml/2006/main" xmlns:r="http://schemas.openxmlformats.org/officeDocument/2006/relationships" xmlns:p="http://schemas.openxmlformats.org/presentationml/2006/main">
   <p:cSld>
@@ -2554,6 +2643,93 @@
                 <a:defRPr/>
               </a:pPr>
               <a:t>3</a:t>
+            </a:fld>
+            <a:endParaRPr lang="pt-BR"/>
+          </a:p>
+        </p:txBody>
+      </p:sp>
+    </p:spTree>
+  </p:cSld>
+  <p:clrMapOvr>
+    <a:masterClrMapping/>
+  </p:clrMapOvr>
+</p:notes>
+</file>
+
+<file path=ppt/notesSlides/notesSlide30.xml><?xml version="1.0" encoding="utf-8"?>
+<p:notes xmlns:a="http://schemas.openxmlformats.org/drawingml/2006/main" xmlns:r="http://schemas.openxmlformats.org/officeDocument/2006/relationships" xmlns:p="http://schemas.openxmlformats.org/presentationml/2006/main">
+  <p:cSld>
+    <p:spTree>
+      <p:nvGrpSpPr>
+        <p:cNvPr id="1" name=""/>
+        <p:cNvGrpSpPr/>
+        <p:nvPr/>
+      </p:nvGrpSpPr>
+      <p:grpSpPr>
+        <a:xfrm>
+          <a:off x="0" y="0"/>
+          <a:ext cx="0" cy="0"/>
+          <a:chOff x="0" y="0"/>
+          <a:chExt cx="0" cy="0"/>
+        </a:xfrm>
+      </p:grpSpPr>
+      <p:sp>
+        <p:nvSpPr>
+          <p:cNvPr id="2" name="Espaço Reservado para Imagem de Slide 1"/>
+          <p:cNvSpPr>
+            <a:spLocks noGrp="1" noRot="1" noChangeAspect="1"/>
+          </p:cNvSpPr>
+          <p:nvPr>
+            <p:ph type="sldImg"/>
+          </p:nvPr>
+        </p:nvSpPr>
+        <p:spPr/>
+      </p:sp>
+      <p:sp>
+        <p:nvSpPr>
+          <p:cNvPr id="3" name="Espaço Reservado para Anotações 2"/>
+          <p:cNvSpPr>
+            <a:spLocks noGrp="1"/>
+          </p:cNvSpPr>
+          <p:nvPr>
+            <p:ph type="body" idx="1"/>
+          </p:nvPr>
+        </p:nvSpPr>
+        <p:spPr/>
+        <p:txBody>
+          <a:bodyPr>
+            <a:normAutofit/>
+          </a:bodyPr>
+          <a:lstStyle/>
+          <a:p>
+            <a:endParaRPr lang="pt-BR"/>
+          </a:p>
+        </p:txBody>
+      </p:sp>
+      <p:sp>
+        <p:nvSpPr>
+          <p:cNvPr id="4" name="Espaço Reservado para Número de Slide 3"/>
+          <p:cNvSpPr>
+            <a:spLocks noGrp="1"/>
+          </p:cNvSpPr>
+          <p:nvPr>
+            <p:ph type="sldNum" sz="quarter" idx="10"/>
+          </p:nvPr>
+        </p:nvSpPr>
+        <p:spPr/>
+        <p:txBody>
+          <a:bodyPr/>
+          <a:lstStyle/>
+          <a:p>
+            <a:pPr>
+              <a:defRPr/>
+            </a:pPr>
+            <a:fld id="{1935B8E8-55BE-43E9-B7F8-2CD1361E8ED0}" type="slidenum">
+              <a:rPr lang="pt-BR" smtClean="0"/>
+              <a:pPr>
+                <a:defRPr/>
+              </a:pPr>
+              <a:t>30</a:t>
             </a:fld>
             <a:endParaRPr lang="pt-BR"/>
           </a:p>
@@ -3566,7 +3742,7 @@
               <a:pPr>
                 <a:defRPr/>
               </a:pPr>
-              <a:t>‹#›</a:t>
+              <a:t>‹nº›</a:t>
             </a:fld>
             <a:endParaRPr lang="pt-BR"/>
           </a:p>
@@ -3758,7 +3934,7 @@
               <a:pPr>
                 <a:defRPr/>
               </a:pPr>
-              <a:t>‹#›</a:t>
+              <a:t>‹nº›</a:t>
             </a:fld>
             <a:endParaRPr lang="pt-BR"/>
           </a:p>
@@ -3960,7 +4136,7 @@
               <a:pPr>
                 <a:defRPr/>
               </a:pPr>
-              <a:t>‹#›</a:t>
+              <a:t>‹nº›</a:t>
             </a:fld>
             <a:endParaRPr lang="pt-BR"/>
           </a:p>
@@ -4156,7 +4332,7 @@
               <a:pPr>
                 <a:defRPr/>
               </a:pPr>
-              <a:t>‹#›</a:t>
+              <a:t>‹nº›</a:t>
             </a:fld>
             <a:endParaRPr lang="pt-BR"/>
           </a:p>
@@ -4662,7 +4838,7 @@
               <a:pPr>
                 <a:defRPr/>
               </a:pPr>
-              <a:t>‹#›</a:t>
+              <a:t>‹nº›</a:t>
             </a:fld>
             <a:endParaRPr lang="pt-BR"/>
           </a:p>
@@ -4953,7 +5129,7 @@
               <a:pPr>
                 <a:defRPr/>
               </a:pPr>
-              <a:t>‹#›</a:t>
+              <a:t>‹nº›</a:t>
             </a:fld>
             <a:endParaRPr lang="pt-BR"/>
           </a:p>
@@ -5354,7 +5530,7 @@
               <a:pPr>
                 <a:defRPr/>
               </a:pPr>
-              <a:t>‹#›</a:t>
+              <a:t>‹nº›</a:t>
             </a:fld>
             <a:endParaRPr lang="pt-BR"/>
           </a:p>
@@ -5503,7 +5679,7 @@
               <a:pPr>
                 <a:defRPr/>
               </a:pPr>
-              <a:t>‹#›</a:t>
+              <a:t>‹nº›</a:t>
             </a:fld>
             <a:endParaRPr lang="pt-BR"/>
           </a:p>
@@ -5620,7 +5796,7 @@
               <a:pPr>
                 <a:defRPr/>
               </a:pPr>
-              <a:t>‹#›</a:t>
+              <a:t>‹nº›</a:t>
             </a:fld>
             <a:endParaRPr lang="pt-BR"/>
           </a:p>
@@ -5901,7 +6077,7 @@
               <a:pPr>
                 <a:defRPr/>
               </a:pPr>
-              <a:t>‹#›</a:t>
+              <a:t>‹nº›</a:t>
             </a:fld>
             <a:endParaRPr lang="pt-BR"/>
           </a:p>
@@ -6180,7 +6356,7 @@
               <a:pPr>
                 <a:defRPr/>
               </a:pPr>
-              <a:t>‹#›</a:t>
+              <a:t>‹nº›</a:t>
             </a:fld>
             <a:endParaRPr lang="pt-BR"/>
           </a:p>
@@ -6702,7 +6878,7 @@
               <a:pPr>
                 <a:defRPr/>
               </a:pPr>
-              <a:t>‹#›</a:t>
+              <a:t>‹nº›</a:t>
             </a:fld>
             <a:endParaRPr lang="pt-BR"/>
           </a:p>
@@ -14391,15 +14567,7 @@
             </a:r>
             <a:r>
               <a:rPr lang="pt-BR" sz="2000" dirty="0" smtClean="0"/>
-              <a:t>”, quando o JVM já alocou espaço em memória para registrar todos os membros de dados </a:t>
-            </a:r>
-            <a:r>
-              <a:rPr lang="pt-BR" sz="2000" dirty="0" smtClean="0"/>
-              <a:t>do </a:t>
-            </a:r>
-            <a:r>
-              <a:rPr lang="pt-BR" sz="2000" dirty="0" smtClean="0"/>
-              <a:t>objeto, mas ainda não o inicializou.</a:t>
+              <a:t>”, quando o JVM já alocou espaço em memória para registrar todos os membros de dados do objeto, mas ainda não o inicializou.</a:t>
             </a:r>
             <a:endParaRPr lang="pt-BR" sz="2000" dirty="0"/>
           </a:p>
@@ -15183,11 +15351,7 @@
             </a:pPr>
             <a:r>
               <a:rPr lang="pt-BR" sz="1800" dirty="0" smtClean="0"/>
-              <a:t>Incializa </a:t>
-            </a:r>
-            <a:r>
-              <a:rPr lang="pt-BR" sz="1800" dirty="0" smtClean="0"/>
-              <a:t>os membros da classe mãe;</a:t>
+              <a:t>Incializa os membros da classe mãe;</a:t>
             </a:r>
           </a:p>
           <a:p>
@@ -15213,11 +15377,7 @@
             </a:pPr>
             <a:r>
               <a:rPr lang="pt-BR" sz="1800" dirty="0" smtClean="0"/>
-              <a:t>Inicializa os membros da própria classe</a:t>
-            </a:r>
-            <a:r>
-              <a:rPr lang="pt-BR" sz="1800" dirty="0" smtClean="0"/>
-              <a:t>;</a:t>
+              <a:t>Inicializa os membros da própria classe;</a:t>
             </a:r>
             <a:endParaRPr lang="pt-BR" sz="1800" dirty="0"/>
           </a:p>
@@ -15233,7 +15393,6 @@
               <a:rPr lang="pt-BR" sz="1800" dirty="0" smtClean="0"/>
               <a:t>Executa o construtor da própria classe.</a:t>
             </a:r>
-            <a:endParaRPr lang="pt-BR" sz="1800" dirty="0" smtClean="0"/>
           </a:p>
         </p:txBody>
       </p:sp>
@@ -15996,11 +16155,7 @@
             </a:pPr>
             <a:r>
               <a:rPr lang="pt-BR" sz="2000" dirty="0" smtClean="0"/>
-              <a:t>Ao longo </a:t>
-            </a:r>
-            <a:r>
-              <a:rPr lang="pt-BR" sz="2000" dirty="0" smtClean="0"/>
-              <a:t>da aplicação, o objeto pode-se tornar invisível.</a:t>
+              <a:t>Ao longo da aplicação, o objeto pode-se tornar invisível.</a:t>
             </a:r>
           </a:p>
           <a:p>
@@ -17543,7 +17698,7 @@
             </a:pPr>
             <a:r>
               <a:rPr lang="pt-BR" sz="2000" dirty="0" smtClean="0"/>
-              <a:t>O objeto coletado é aquele que já foi identificado pelo GC para coleta mas ainda não teve a oportunidade iniciar o processo de finalização deste.</a:t>
+              <a:t>O objeto coletado é aquele que já foi identificado pelo GC para coleta mas ainda não teve a oportunidade de iniciar o processo de finalização deste.</a:t>
             </a:r>
             <a:endParaRPr lang="pt-BR" sz="2000" dirty="0"/>
           </a:p>
@@ -19810,7 +19965,7 @@
             <a:pPr eaLnBrk="1" hangingPunct="1"/>
             <a:r>
               <a:rPr lang="pt-BR" dirty="0" smtClean="0"/>
-              <a:t>Objetos de referência</a:t>
+              <a:t>Tipos de referência</a:t>
             </a:r>
             <a:endParaRPr lang="pt-BR" dirty="0"/>
           </a:p>
@@ -19831,7 +19986,83 @@
           <a:bodyPr/>
           <a:lstStyle/>
           <a:p>
-            <a:endParaRPr lang="pt-BR"/>
+            <a:pPr>
+              <a:spcBef>
+                <a:spcPts val="3000"/>
+              </a:spcBef>
+            </a:pPr>
+            <a:r>
+              <a:rPr lang="pt-BR" dirty="0" smtClean="0"/>
+              <a:t>Existem diferentes tipos de referências à objetos que podem ser utilizados pela ap</a:t>
+            </a:r>
+            <a:r>
+              <a:rPr lang="pt-BR" dirty="0" smtClean="0"/>
+              <a:t>licação:</a:t>
+            </a:r>
+          </a:p>
+          <a:p>
+            <a:pPr lvl="1">
+              <a:spcBef>
+                <a:spcPts val="1200"/>
+              </a:spcBef>
+            </a:pPr>
+            <a:r>
+              <a:rPr lang="pt-BR" dirty="0" smtClean="0"/>
+              <a:t>Referência </a:t>
+            </a:r>
+            <a:r>
+              <a:rPr lang="pt-BR" b="1" i="1" dirty="0" err="1" smtClean="0"/>
+              <a:t>strong</a:t>
+            </a:r>
+            <a:endParaRPr lang="pt-BR" b="1" i="1" dirty="0" smtClean="0"/>
+          </a:p>
+          <a:p>
+            <a:pPr lvl="1">
+              <a:spcBef>
+                <a:spcPts val="1200"/>
+              </a:spcBef>
+            </a:pPr>
+            <a:r>
+              <a:rPr lang="pt-BR" dirty="0" smtClean="0"/>
+              <a:t>Referência </a:t>
+            </a:r>
+            <a:r>
+              <a:rPr lang="pt-BR" b="1" i="1" dirty="0" err="1" smtClean="0"/>
+              <a:t>soft</a:t>
+            </a:r>
+            <a:endParaRPr lang="pt-BR" b="1" i="1" dirty="0" smtClean="0"/>
+          </a:p>
+          <a:p>
+            <a:pPr lvl="1">
+              <a:spcBef>
+                <a:spcPts val="1200"/>
+              </a:spcBef>
+            </a:pPr>
+            <a:r>
+              <a:rPr lang="pt-BR" dirty="0" smtClean="0"/>
+              <a:t>Referência </a:t>
+            </a:r>
+            <a:r>
+              <a:rPr lang="pt-BR" b="1" i="1" dirty="0" err="1" smtClean="0"/>
+              <a:t>weak</a:t>
+            </a:r>
+            <a:endParaRPr lang="pt-BR" b="1" i="1" dirty="0" smtClean="0"/>
+          </a:p>
+          <a:p>
+            <a:pPr lvl="1">
+              <a:spcBef>
+                <a:spcPts val="1200"/>
+              </a:spcBef>
+            </a:pPr>
+            <a:r>
+              <a:rPr lang="pt-BR" dirty="0" smtClean="0"/>
+              <a:t>Referência </a:t>
+            </a:r>
+            <a:r>
+              <a:rPr lang="pt-BR" b="1" i="1" dirty="0" err="1" smtClean="0"/>
+              <a:t>phantom</a:t>
+            </a:r>
+            <a:endParaRPr lang="pt-BR" b="1" i="1" dirty="0" smtClean="0"/>
           </a:p>
         </p:txBody>
       </p:sp>
@@ -19859,6 +20090,187 @@
                 <a:defRPr/>
               </a:pPr>
               <a:t>28</a:t>
+            </a:fld>
+            <a:endParaRPr lang="pt-BR"/>
+          </a:p>
+        </p:txBody>
+      </p:sp>
+    </p:spTree>
+  </p:cSld>
+  <p:clrMapOvr>
+    <a:masterClrMapping/>
+  </p:clrMapOvr>
+  <p:timing>
+    <p:tnLst>
+      <p:par>
+        <p:cTn id="1" dur="indefinite" restart="never" nodeType="tmRoot"/>
+      </p:par>
+    </p:tnLst>
+  </p:timing>
+</p:sld>
+</file>
+
+<file path=ppt/slides/slide29.xml><?xml version="1.0" encoding="utf-8"?>
+<p:sld xmlns:a="http://schemas.openxmlformats.org/drawingml/2006/main" xmlns:r="http://schemas.openxmlformats.org/officeDocument/2006/relationships" xmlns:p="http://schemas.openxmlformats.org/presentationml/2006/main">
+  <p:cSld>
+    <p:spTree>
+      <p:nvGrpSpPr>
+        <p:cNvPr id="1" name=""/>
+        <p:cNvGrpSpPr/>
+        <p:nvPr/>
+      </p:nvGrpSpPr>
+      <p:grpSpPr>
+        <a:xfrm>
+          <a:off x="0" y="0"/>
+          <a:ext cx="0" cy="0"/>
+          <a:chOff x="0" y="0"/>
+          <a:chExt cx="0" cy="0"/>
+        </a:xfrm>
+      </p:grpSpPr>
+      <p:sp>
+        <p:nvSpPr>
+          <p:cNvPr id="2" name="Título 1"/>
+          <p:cNvSpPr>
+            <a:spLocks noGrp="1"/>
+          </p:cNvSpPr>
+          <p:nvPr>
+            <p:ph type="title"/>
+          </p:nvPr>
+        </p:nvSpPr>
+        <p:spPr/>
+        <p:txBody>
+          <a:bodyPr/>
+          <a:lstStyle/>
+          <a:p>
+            <a:pPr eaLnBrk="1" hangingPunct="1"/>
+            <a:r>
+              <a:rPr lang="pt-BR" dirty="0" smtClean="0"/>
+              <a:t>Tipos de referência</a:t>
+            </a:r>
+            <a:endParaRPr lang="pt-BR" dirty="0"/>
+          </a:p>
+        </p:txBody>
+      </p:sp>
+      <p:sp>
+        <p:nvSpPr>
+          <p:cNvPr id="3" name="Espaço Reservado para Conteúdo 2"/>
+          <p:cNvSpPr>
+            <a:spLocks noGrp="1"/>
+          </p:cNvSpPr>
+          <p:nvPr>
+            <p:ph idx="1"/>
+          </p:nvPr>
+        </p:nvSpPr>
+        <p:spPr/>
+        <p:txBody>
+          <a:bodyPr/>
+          <a:lstStyle/>
+          <a:p>
+            <a:pPr>
+              <a:spcBef>
+                <a:spcPts val="3000"/>
+              </a:spcBef>
+            </a:pPr>
+            <a:r>
+              <a:rPr lang="pt-BR" dirty="0" smtClean="0"/>
+              <a:t>Referência </a:t>
+            </a:r>
+            <a:r>
+              <a:rPr lang="pt-BR" b="1" i="1" dirty="0" err="1" smtClean="0"/>
+              <a:t>strong</a:t>
+            </a:r>
+            <a:endParaRPr lang="pt-BR" b="1" i="1" dirty="0" smtClean="0"/>
+          </a:p>
+          <a:p>
+            <a:pPr lvl="1">
+              <a:spcBef>
+                <a:spcPts val="1200"/>
+              </a:spcBef>
+            </a:pPr>
+            <a:r>
+              <a:rPr lang="pt-BR" dirty="0" smtClean="0"/>
+              <a:t>Referência </a:t>
+            </a:r>
+            <a:r>
+              <a:rPr lang="pt-BR" dirty="0" err="1" smtClean="0"/>
+              <a:t>strong</a:t>
+            </a:r>
+            <a:endParaRPr lang="pt-BR" dirty="0" smtClean="0"/>
+          </a:p>
+          <a:p>
+            <a:pPr lvl="1">
+              <a:spcBef>
+                <a:spcPts val="1200"/>
+              </a:spcBef>
+            </a:pPr>
+            <a:r>
+              <a:rPr lang="pt-BR" dirty="0" smtClean="0"/>
+              <a:t>Referência </a:t>
+            </a:r>
+            <a:r>
+              <a:rPr lang="pt-BR" dirty="0" err="1" smtClean="0"/>
+              <a:t>soft</a:t>
+            </a:r>
+            <a:endParaRPr lang="pt-BR" dirty="0" smtClean="0"/>
+          </a:p>
+          <a:p>
+            <a:pPr lvl="1">
+              <a:spcBef>
+                <a:spcPts val="1200"/>
+              </a:spcBef>
+            </a:pPr>
+            <a:r>
+              <a:rPr lang="pt-BR" dirty="0" smtClean="0"/>
+              <a:t>Referência </a:t>
+            </a:r>
+            <a:r>
+              <a:rPr lang="pt-BR" dirty="0" err="1" smtClean="0"/>
+              <a:t>weak</a:t>
+            </a:r>
+            <a:endParaRPr lang="pt-BR" dirty="0" smtClean="0"/>
+          </a:p>
+          <a:p>
+            <a:pPr lvl="1">
+              <a:spcBef>
+                <a:spcPts val="1200"/>
+              </a:spcBef>
+            </a:pPr>
+            <a:r>
+              <a:rPr lang="pt-BR" dirty="0" smtClean="0"/>
+              <a:t>Referência </a:t>
+            </a:r>
+            <a:r>
+              <a:rPr lang="pt-BR" dirty="0" err="1" smtClean="0"/>
+              <a:t>phantom</a:t>
+            </a:r>
+            <a:endParaRPr lang="pt-BR" dirty="0" smtClean="0"/>
+          </a:p>
+        </p:txBody>
+      </p:sp>
+      <p:sp>
+        <p:nvSpPr>
+          <p:cNvPr id="4" name="Espaço Reservado para Número de Slide 3"/>
+          <p:cNvSpPr>
+            <a:spLocks noGrp="1"/>
+          </p:cNvSpPr>
+          <p:nvPr>
+            <p:ph type="sldNum" sz="quarter" idx="12"/>
+          </p:nvPr>
+        </p:nvSpPr>
+        <p:spPr/>
+        <p:txBody>
+          <a:bodyPr/>
+          <a:lstStyle/>
+          <a:p>
+            <a:pPr>
+              <a:defRPr/>
+            </a:pPr>
+            <a:fld id="{21B5E3EF-F5EF-4A0A-A70F-386D7016207D}" type="slidenum">
+              <a:rPr lang="pt-BR" smtClean="0"/>
+              <a:pPr>
+                <a:defRPr/>
+              </a:pPr>
+              <a:t>29</a:t>
             </a:fld>
             <a:endParaRPr lang="pt-BR"/>
           </a:p>
@@ -19965,6 +20377,157 @@
                 <a:defRPr/>
               </a:pPr>
               <a:t>3</a:t>
+            </a:fld>
+            <a:endParaRPr lang="pt-BR"/>
+          </a:p>
+        </p:txBody>
+      </p:sp>
+    </p:spTree>
+  </p:cSld>
+  <p:clrMapOvr>
+    <a:masterClrMapping/>
+  </p:clrMapOvr>
+  <p:timing>
+    <p:tnLst>
+      <p:par>
+        <p:cTn id="1" dur="indefinite" restart="never" nodeType="tmRoot"/>
+      </p:par>
+    </p:tnLst>
+  </p:timing>
+</p:sld>
+</file>
+
+<file path=ppt/slides/slide30.xml><?xml version="1.0" encoding="utf-8"?>
+<p:sld xmlns:a="http://schemas.openxmlformats.org/drawingml/2006/main" xmlns:r="http://schemas.openxmlformats.org/officeDocument/2006/relationships" xmlns:p="http://schemas.openxmlformats.org/presentationml/2006/main">
+  <p:cSld>
+    <p:spTree>
+      <p:nvGrpSpPr>
+        <p:cNvPr id="1" name=""/>
+        <p:cNvGrpSpPr/>
+        <p:nvPr/>
+      </p:nvGrpSpPr>
+      <p:grpSpPr>
+        <a:xfrm>
+          <a:off x="0" y="0"/>
+          <a:ext cx="0" cy="0"/>
+          <a:chOff x="0" y="0"/>
+          <a:chExt cx="0" cy="0"/>
+        </a:xfrm>
+      </p:grpSpPr>
+      <p:sp>
+        <p:nvSpPr>
+          <p:cNvPr id="2" name="Título 1"/>
+          <p:cNvSpPr>
+            <a:spLocks noGrp="1"/>
+          </p:cNvSpPr>
+          <p:nvPr>
+            <p:ph type="title"/>
+          </p:nvPr>
+        </p:nvSpPr>
+        <p:spPr/>
+        <p:txBody>
+          <a:bodyPr/>
+          <a:lstStyle/>
+          <a:p>
+            <a:pPr eaLnBrk="1" hangingPunct="1"/>
+            <a:r>
+              <a:rPr lang="pt-BR" dirty="0" smtClean="0"/>
+              <a:t>Tipos de referência</a:t>
+            </a:r>
+            <a:endParaRPr lang="pt-BR" dirty="0"/>
+          </a:p>
+        </p:txBody>
+      </p:sp>
+      <p:sp>
+        <p:nvSpPr>
+          <p:cNvPr id="3" name="Espaço Reservado para Conteúdo 2"/>
+          <p:cNvSpPr>
+            <a:spLocks noGrp="1"/>
+          </p:cNvSpPr>
+          <p:nvPr>
+            <p:ph idx="1"/>
+          </p:nvPr>
+        </p:nvSpPr>
+        <p:spPr/>
+        <p:txBody>
+          <a:bodyPr/>
+          <a:lstStyle/>
+          <a:p>
+            <a:pPr>
+              <a:spcBef>
+                <a:spcPts val="3000"/>
+              </a:spcBef>
+            </a:pPr>
+            <a:r>
+              <a:rPr lang="pt-BR" dirty="0" smtClean="0"/>
+              <a:t>Até o momento temos utilizado variáveis comuns para referenciar objetos em memória.</a:t>
+            </a:r>
+          </a:p>
+          <a:p>
+            <a:pPr>
+              <a:spcBef>
+                <a:spcPts val="3000"/>
+              </a:spcBef>
+            </a:pPr>
+            <a:r>
+              <a:rPr lang="pt-BR" dirty="0" smtClean="0"/>
+              <a:t>Tais variáveis são chamadas “</a:t>
+            </a:r>
+            <a:r>
+              <a:rPr lang="pt-BR" b="1" i="1" dirty="0" err="1" smtClean="0"/>
+              <a:t>strong</a:t>
+            </a:r>
+            <a:r>
+              <a:rPr lang="pt-BR" dirty="0" smtClean="0"/>
+              <a:t>”.</a:t>
+            </a:r>
+          </a:p>
+          <a:p>
+            <a:pPr>
+              <a:spcBef>
+                <a:spcPts val="3000"/>
+              </a:spcBef>
+            </a:pPr>
+            <a:r>
+              <a:rPr lang="pt-BR" dirty="0" smtClean="0"/>
+              <a:t>Uma variável </a:t>
+            </a:r>
+            <a:r>
+              <a:rPr lang="pt-BR" dirty="0" err="1" smtClean="0"/>
+              <a:t>strong</a:t>
+            </a:r>
+            <a:r>
+              <a:rPr lang="pt-BR" dirty="0" smtClean="0"/>
+              <a:t> é uma variável cujo objeto apontado nunca é coletado pelo GC.</a:t>
+            </a:r>
+            <a:endParaRPr lang="pt-BR" dirty="0"/>
+          </a:p>
+        </p:txBody>
+      </p:sp>
+      <p:sp>
+        <p:nvSpPr>
+          <p:cNvPr id="4" name="Espaço Reservado para Número de Slide 3"/>
+          <p:cNvSpPr>
+            <a:spLocks noGrp="1"/>
+          </p:cNvSpPr>
+          <p:nvPr>
+            <p:ph type="sldNum" sz="quarter" idx="12"/>
+          </p:nvPr>
+        </p:nvSpPr>
+        <p:spPr/>
+        <p:txBody>
+          <a:bodyPr/>
+          <a:lstStyle/>
+          <a:p>
+            <a:pPr>
+              <a:defRPr/>
+            </a:pPr>
+            <a:fld id="{21B5E3EF-F5EF-4A0A-A70F-386D7016207D}" type="slidenum">
+              <a:rPr lang="pt-BR" smtClean="0"/>
+              <a:pPr>
+                <a:defRPr/>
+              </a:pPr>
+              <a:t>30</a:t>
             </a:fld>
             <a:endParaRPr lang="pt-BR"/>
           </a:p>

</xml_diff>

<commit_message>
Fechamento do capítulo de Garbage Collector; Início do capítulo de tratamento de erros.
</commit_message>
<xml_diff>
--- a/2-Java-Programmer-Modulo-II/11.Capitulo05.pptx
+++ b/2-Java-Programmer-Modulo-II/11.Capitulo05.pptx
@@ -5,7 +5,7 @@
     <p:sldMasterId id="2147483660" r:id="rId1"/>
   </p:sldMasterIdLst>
   <p:notesMasterIdLst>
-    <p:notesMasterId r:id="rId32"/>
+    <p:notesMasterId r:id="rId35"/>
   </p:notesMasterIdLst>
   <p:sldIdLst>
     <p:sldId id="256" r:id="rId2"/>
@@ -37,7 +37,10 @@
     <p:sldId id="328" r:id="rId28"/>
     <p:sldId id="330" r:id="rId29"/>
     <p:sldId id="329" r:id="rId30"/>
-    <p:sldId id="306" r:id="rId31"/>
+    <p:sldId id="331" r:id="rId31"/>
+    <p:sldId id="333" r:id="rId32"/>
+    <p:sldId id="332" r:id="rId33"/>
+    <p:sldId id="334" r:id="rId34"/>
   </p:sldIdLst>
   <p:sldSz cx="9144000" cy="6858000" type="screen4x3"/>
   <p:notesSz cx="6858000" cy="9144000"/>
@@ -278,7 +281,7 @@
               <a:pPr>
                 <a:defRPr/>
               </a:pPr>
-              <a:t>02/04/2012</a:t>
+              <a:t>03/04/2012</a:t>
             </a:fld>
             <a:endParaRPr lang="pt-BR"/>
           </a:p>
@@ -466,7 +469,7 @@
               <a:pPr>
                 <a:defRPr/>
               </a:pPr>
-              <a:t>‹nº›</a:t>
+              <a:t>‹#›</a:t>
             </a:fld>
             <a:endParaRPr lang="pt-BR"/>
           </a:p>
@@ -2743,6 +2746,267 @@
 </p:notes>
 </file>
 
+<file path=ppt/notesSlides/notesSlide31.xml><?xml version="1.0" encoding="utf-8"?>
+<p:notes xmlns:a="http://schemas.openxmlformats.org/drawingml/2006/main" xmlns:r="http://schemas.openxmlformats.org/officeDocument/2006/relationships" xmlns:p="http://schemas.openxmlformats.org/presentationml/2006/main">
+  <p:cSld>
+    <p:spTree>
+      <p:nvGrpSpPr>
+        <p:cNvPr id="1" name=""/>
+        <p:cNvGrpSpPr/>
+        <p:nvPr/>
+      </p:nvGrpSpPr>
+      <p:grpSpPr>
+        <a:xfrm>
+          <a:off x="0" y="0"/>
+          <a:ext cx="0" cy="0"/>
+          <a:chOff x="0" y="0"/>
+          <a:chExt cx="0" cy="0"/>
+        </a:xfrm>
+      </p:grpSpPr>
+      <p:sp>
+        <p:nvSpPr>
+          <p:cNvPr id="2" name="Espaço Reservado para Imagem de Slide 1"/>
+          <p:cNvSpPr>
+            <a:spLocks noGrp="1" noRot="1" noChangeAspect="1"/>
+          </p:cNvSpPr>
+          <p:nvPr>
+            <p:ph type="sldImg"/>
+          </p:nvPr>
+        </p:nvSpPr>
+        <p:spPr/>
+      </p:sp>
+      <p:sp>
+        <p:nvSpPr>
+          <p:cNvPr id="3" name="Espaço Reservado para Anotações 2"/>
+          <p:cNvSpPr>
+            <a:spLocks noGrp="1"/>
+          </p:cNvSpPr>
+          <p:nvPr>
+            <p:ph type="body" idx="1"/>
+          </p:nvPr>
+        </p:nvSpPr>
+        <p:spPr/>
+        <p:txBody>
+          <a:bodyPr>
+            <a:normAutofit/>
+          </a:bodyPr>
+          <a:lstStyle/>
+          <a:p>
+            <a:endParaRPr lang="pt-BR"/>
+          </a:p>
+        </p:txBody>
+      </p:sp>
+      <p:sp>
+        <p:nvSpPr>
+          <p:cNvPr id="4" name="Espaço Reservado para Número de Slide 3"/>
+          <p:cNvSpPr>
+            <a:spLocks noGrp="1"/>
+          </p:cNvSpPr>
+          <p:nvPr>
+            <p:ph type="sldNum" sz="quarter" idx="10"/>
+          </p:nvPr>
+        </p:nvSpPr>
+        <p:spPr/>
+        <p:txBody>
+          <a:bodyPr/>
+          <a:lstStyle/>
+          <a:p>
+            <a:pPr>
+              <a:defRPr/>
+            </a:pPr>
+            <a:fld id="{1935B8E8-55BE-43E9-B7F8-2CD1361E8ED0}" type="slidenum">
+              <a:rPr lang="pt-BR" smtClean="0"/>
+              <a:pPr>
+                <a:defRPr/>
+              </a:pPr>
+              <a:t>31</a:t>
+            </a:fld>
+            <a:endParaRPr lang="pt-BR"/>
+          </a:p>
+        </p:txBody>
+      </p:sp>
+    </p:spTree>
+  </p:cSld>
+  <p:clrMapOvr>
+    <a:masterClrMapping/>
+  </p:clrMapOvr>
+</p:notes>
+</file>
+
+<file path=ppt/notesSlides/notesSlide32.xml><?xml version="1.0" encoding="utf-8"?>
+<p:notes xmlns:a="http://schemas.openxmlformats.org/drawingml/2006/main" xmlns:r="http://schemas.openxmlformats.org/officeDocument/2006/relationships" xmlns:p="http://schemas.openxmlformats.org/presentationml/2006/main">
+  <p:cSld>
+    <p:spTree>
+      <p:nvGrpSpPr>
+        <p:cNvPr id="1" name=""/>
+        <p:cNvGrpSpPr/>
+        <p:nvPr/>
+      </p:nvGrpSpPr>
+      <p:grpSpPr>
+        <a:xfrm>
+          <a:off x="0" y="0"/>
+          <a:ext cx="0" cy="0"/>
+          <a:chOff x="0" y="0"/>
+          <a:chExt cx="0" cy="0"/>
+        </a:xfrm>
+      </p:grpSpPr>
+      <p:sp>
+        <p:nvSpPr>
+          <p:cNvPr id="2" name="Espaço Reservado para Imagem de Slide 1"/>
+          <p:cNvSpPr>
+            <a:spLocks noGrp="1" noRot="1" noChangeAspect="1"/>
+          </p:cNvSpPr>
+          <p:nvPr>
+            <p:ph type="sldImg"/>
+          </p:nvPr>
+        </p:nvSpPr>
+        <p:spPr/>
+      </p:sp>
+      <p:sp>
+        <p:nvSpPr>
+          <p:cNvPr id="3" name="Espaço Reservado para Anotações 2"/>
+          <p:cNvSpPr>
+            <a:spLocks noGrp="1"/>
+          </p:cNvSpPr>
+          <p:nvPr>
+            <p:ph type="body" idx="1"/>
+          </p:nvPr>
+        </p:nvSpPr>
+        <p:spPr/>
+        <p:txBody>
+          <a:bodyPr>
+            <a:normAutofit/>
+          </a:bodyPr>
+          <a:lstStyle/>
+          <a:p>
+            <a:endParaRPr lang="pt-BR"/>
+          </a:p>
+        </p:txBody>
+      </p:sp>
+      <p:sp>
+        <p:nvSpPr>
+          <p:cNvPr id="4" name="Espaço Reservado para Número de Slide 3"/>
+          <p:cNvSpPr>
+            <a:spLocks noGrp="1"/>
+          </p:cNvSpPr>
+          <p:nvPr>
+            <p:ph type="sldNum" sz="quarter" idx="10"/>
+          </p:nvPr>
+        </p:nvSpPr>
+        <p:spPr/>
+        <p:txBody>
+          <a:bodyPr/>
+          <a:lstStyle/>
+          <a:p>
+            <a:pPr>
+              <a:defRPr/>
+            </a:pPr>
+            <a:fld id="{1935B8E8-55BE-43E9-B7F8-2CD1361E8ED0}" type="slidenum">
+              <a:rPr lang="pt-BR" smtClean="0"/>
+              <a:pPr>
+                <a:defRPr/>
+              </a:pPr>
+              <a:t>32</a:t>
+            </a:fld>
+            <a:endParaRPr lang="pt-BR"/>
+          </a:p>
+        </p:txBody>
+      </p:sp>
+    </p:spTree>
+  </p:cSld>
+  <p:clrMapOvr>
+    <a:masterClrMapping/>
+  </p:clrMapOvr>
+</p:notes>
+</file>
+
+<file path=ppt/notesSlides/notesSlide33.xml><?xml version="1.0" encoding="utf-8"?>
+<p:notes xmlns:a="http://schemas.openxmlformats.org/drawingml/2006/main" xmlns:r="http://schemas.openxmlformats.org/officeDocument/2006/relationships" xmlns:p="http://schemas.openxmlformats.org/presentationml/2006/main">
+  <p:cSld>
+    <p:spTree>
+      <p:nvGrpSpPr>
+        <p:cNvPr id="1" name=""/>
+        <p:cNvGrpSpPr/>
+        <p:nvPr/>
+      </p:nvGrpSpPr>
+      <p:grpSpPr>
+        <a:xfrm>
+          <a:off x="0" y="0"/>
+          <a:ext cx="0" cy="0"/>
+          <a:chOff x="0" y="0"/>
+          <a:chExt cx="0" cy="0"/>
+        </a:xfrm>
+      </p:grpSpPr>
+      <p:sp>
+        <p:nvSpPr>
+          <p:cNvPr id="2" name="Slide Image Placeholder 1"/>
+          <p:cNvSpPr>
+            <a:spLocks noGrp="1" noRot="1" noChangeAspect="1"/>
+          </p:cNvSpPr>
+          <p:nvPr>
+            <p:ph type="sldImg"/>
+          </p:nvPr>
+        </p:nvSpPr>
+        <p:spPr/>
+      </p:sp>
+      <p:sp>
+        <p:nvSpPr>
+          <p:cNvPr id="3" name="Notes Placeholder 2"/>
+          <p:cNvSpPr>
+            <a:spLocks noGrp="1"/>
+          </p:cNvSpPr>
+          <p:nvPr>
+            <p:ph type="body" idx="1"/>
+          </p:nvPr>
+        </p:nvSpPr>
+        <p:spPr/>
+        <p:txBody>
+          <a:bodyPr>
+            <a:normAutofit/>
+          </a:bodyPr>
+          <a:lstStyle/>
+          <a:p>
+            <a:endParaRPr lang="pt-BR"/>
+          </a:p>
+        </p:txBody>
+      </p:sp>
+      <p:sp>
+        <p:nvSpPr>
+          <p:cNvPr id="4" name="Slide Number Placeholder 3"/>
+          <p:cNvSpPr>
+            <a:spLocks noGrp="1"/>
+          </p:cNvSpPr>
+          <p:nvPr>
+            <p:ph type="sldNum" sz="quarter" idx="10"/>
+          </p:nvPr>
+        </p:nvSpPr>
+        <p:spPr/>
+        <p:txBody>
+          <a:bodyPr/>
+          <a:lstStyle/>
+          <a:p>
+            <a:pPr>
+              <a:defRPr/>
+            </a:pPr>
+            <a:fld id="{1935B8E8-55BE-43E9-B7F8-2CD1361E8ED0}" type="slidenum">
+              <a:rPr lang="pt-BR" smtClean="0"/>
+              <a:pPr>
+                <a:defRPr/>
+              </a:pPr>
+              <a:t>33</a:t>
+            </a:fld>
+            <a:endParaRPr lang="pt-BR"/>
+          </a:p>
+        </p:txBody>
+      </p:sp>
+    </p:spTree>
+  </p:cSld>
+  <p:clrMapOvr>
+    <a:masterClrMapping/>
+  </p:clrMapOvr>
+</p:notes>
+</file>
+
 <file path=ppt/notesSlides/notesSlide4.xml><?xml version="1.0" encoding="utf-8"?>
 <p:notes xmlns:a="http://schemas.openxmlformats.org/drawingml/2006/main" xmlns:r="http://schemas.openxmlformats.org/officeDocument/2006/relationships" xmlns:p="http://schemas.openxmlformats.org/presentationml/2006/main">
   <p:cSld>
@@ -3683,7 +3947,7 @@
               <a:pPr>
                 <a:defRPr/>
               </a:pPr>
-              <a:t>02/04/2012</a:t>
+              <a:t>03/04/2012</a:t>
             </a:fld>
             <a:endParaRPr lang="pt-BR"/>
           </a:p>
@@ -3742,7 +4006,7 @@
               <a:pPr>
                 <a:defRPr/>
               </a:pPr>
-              <a:t>‹nº›</a:t>
+              <a:t>‹#›</a:t>
             </a:fld>
             <a:endParaRPr lang="pt-BR"/>
           </a:p>
@@ -3875,7 +4139,7 @@
               <a:pPr>
                 <a:defRPr/>
               </a:pPr>
-              <a:t>02/04/2012</a:t>
+              <a:t>03/04/2012</a:t>
             </a:fld>
             <a:endParaRPr lang="pt-BR"/>
           </a:p>
@@ -3934,7 +4198,7 @@
               <a:pPr>
                 <a:defRPr/>
               </a:pPr>
-              <a:t>‹nº›</a:t>
+              <a:t>‹#›</a:t>
             </a:fld>
             <a:endParaRPr lang="pt-BR"/>
           </a:p>
@@ -4077,7 +4341,7 @@
               <a:pPr>
                 <a:defRPr/>
               </a:pPr>
-              <a:t>02/04/2012</a:t>
+              <a:t>03/04/2012</a:t>
             </a:fld>
             <a:endParaRPr lang="pt-BR"/>
           </a:p>
@@ -4136,7 +4400,7 @@
               <a:pPr>
                 <a:defRPr/>
               </a:pPr>
-              <a:t>‹nº›</a:t>
+              <a:t>‹#›</a:t>
             </a:fld>
             <a:endParaRPr lang="pt-BR"/>
           </a:p>
@@ -4273,7 +4537,7 @@
               <a:pPr>
                 <a:defRPr/>
               </a:pPr>
-              <a:t>02/04/2012</a:t>
+              <a:t>03/04/2012</a:t>
             </a:fld>
             <a:endParaRPr lang="pt-BR"/>
           </a:p>
@@ -4332,7 +4596,7 @@
               <a:pPr>
                 <a:defRPr/>
               </a:pPr>
-              <a:t>‹nº›</a:t>
+              <a:t>‹#›</a:t>
             </a:fld>
             <a:endParaRPr lang="pt-BR"/>
           </a:p>
@@ -4779,7 +5043,7 @@
               <a:pPr>
                 <a:defRPr/>
               </a:pPr>
-              <a:t>02/04/2012</a:t>
+              <a:t>03/04/2012</a:t>
             </a:fld>
             <a:endParaRPr lang="pt-BR"/>
           </a:p>
@@ -4838,7 +5102,7 @@
               <a:pPr>
                 <a:defRPr/>
               </a:pPr>
-              <a:t>‹nº›</a:t>
+              <a:t>‹#›</a:t>
             </a:fld>
             <a:endParaRPr lang="pt-BR"/>
           </a:p>
@@ -5070,7 +5334,7 @@
               <a:pPr>
                 <a:defRPr/>
               </a:pPr>
-              <a:t>02/04/2012</a:t>
+              <a:t>03/04/2012</a:t>
             </a:fld>
             <a:endParaRPr lang="pt-BR"/>
           </a:p>
@@ -5129,7 +5393,7 @@
               <a:pPr>
                 <a:defRPr/>
               </a:pPr>
-              <a:t>‹nº›</a:t>
+              <a:t>‹#›</a:t>
             </a:fld>
             <a:endParaRPr lang="pt-BR"/>
           </a:p>
@@ -5471,7 +5735,7 @@
               <a:pPr>
                 <a:defRPr/>
               </a:pPr>
-              <a:t>02/04/2012</a:t>
+              <a:t>03/04/2012</a:t>
             </a:fld>
             <a:endParaRPr lang="pt-BR"/>
           </a:p>
@@ -5530,7 +5794,7 @@
               <a:pPr>
                 <a:defRPr/>
               </a:pPr>
-              <a:t>‹nº›</a:t>
+              <a:t>‹#›</a:t>
             </a:fld>
             <a:endParaRPr lang="pt-BR"/>
           </a:p>
@@ -5620,7 +5884,7 @@
               <a:pPr>
                 <a:defRPr/>
               </a:pPr>
-              <a:t>02/04/2012</a:t>
+              <a:t>03/04/2012</a:t>
             </a:fld>
             <a:endParaRPr lang="pt-BR"/>
           </a:p>
@@ -5679,7 +5943,7 @@
               <a:pPr>
                 <a:defRPr/>
               </a:pPr>
-              <a:t>‹nº›</a:t>
+              <a:t>‹#›</a:t>
             </a:fld>
             <a:endParaRPr lang="pt-BR"/>
           </a:p>
@@ -5737,7 +6001,7 @@
               <a:pPr>
                 <a:defRPr/>
               </a:pPr>
-              <a:t>02/04/2012</a:t>
+              <a:t>03/04/2012</a:t>
             </a:fld>
             <a:endParaRPr lang="pt-BR"/>
           </a:p>
@@ -5796,7 +6060,7 @@
               <a:pPr>
                 <a:defRPr/>
               </a:pPr>
-              <a:t>‹nº›</a:t>
+              <a:t>‹#›</a:t>
             </a:fld>
             <a:endParaRPr lang="pt-BR"/>
           </a:p>
@@ -6013,7 +6277,7 @@
               <a:pPr>
                 <a:defRPr/>
               </a:pPr>
-              <a:t>02/04/2012</a:t>
+              <a:t>03/04/2012</a:t>
             </a:fld>
             <a:endParaRPr lang="pt-BR"/>
           </a:p>
@@ -6077,7 +6341,7 @@
               <a:pPr>
                 <a:defRPr/>
               </a:pPr>
-              <a:t>‹nº›</a:t>
+              <a:t>‹#›</a:t>
             </a:fld>
             <a:endParaRPr lang="pt-BR"/>
           </a:p>
@@ -6297,7 +6561,7 @@
               <a:pPr>
                 <a:defRPr/>
               </a:pPr>
-              <a:t>02/04/2012</a:t>
+              <a:t>03/04/2012</a:t>
             </a:fld>
             <a:endParaRPr lang="pt-BR"/>
           </a:p>
@@ -6356,7 +6620,7 @@
               <a:pPr>
                 <a:defRPr/>
               </a:pPr>
-              <a:t>‹nº›</a:t>
+              <a:t>‹#›</a:t>
             </a:fld>
             <a:endParaRPr lang="pt-BR"/>
           </a:p>
@@ -6775,7 +7039,7 @@
               <a:pPr>
                 <a:defRPr/>
               </a:pPr>
-              <a:t>02/04/2012</a:t>
+              <a:t>03/04/2012</a:t>
             </a:fld>
             <a:endParaRPr lang="pt-BR"/>
           </a:p>
@@ -6878,7 +7142,7 @@
               <a:pPr>
                 <a:defRPr/>
               </a:pPr>
-              <a:t>‹nº›</a:t>
+              <a:t>‹#›</a:t>
             </a:fld>
             <a:endParaRPr lang="pt-BR"/>
           </a:p>
@@ -19993,11 +20257,7 @@
             </a:pPr>
             <a:r>
               <a:rPr lang="pt-BR" dirty="0" smtClean="0"/>
-              <a:t>Existem diferentes tipos de referências à objetos que podem ser utilizados pela ap</a:t>
-            </a:r>
-            <a:r>
-              <a:rPr lang="pt-BR" dirty="0" smtClean="0"/>
-              <a:t>licação:</a:t>
+              <a:t>Existem diferentes tipos de referências à objetos que podem ser utilizados pela aplicação:</a:t>
             </a:r>
           </a:p>
           <a:p>
@@ -20184,66 +20444,78 @@
           <a:p>
             <a:pPr lvl="1">
               <a:spcBef>
-                <a:spcPts val="1200"/>
+                <a:spcPts val="3000"/>
               </a:spcBef>
             </a:pPr>
             <a:r>
-              <a:rPr lang="pt-BR" dirty="0" smtClean="0"/>
-              <a:t>Referência </a:t>
-            </a:r>
-            <a:r>
-              <a:rPr lang="pt-BR" dirty="0" err="1" smtClean="0"/>
-              <a:t>strong</a:t>
-            </a:r>
-            <a:endParaRPr lang="pt-BR" dirty="0" smtClean="0"/>
+              <a:rPr lang="pt-BR" sz="2400" dirty="0" smtClean="0"/>
+              <a:t>Uma referência strong (referência forte) é o tipo mais comum utilizado no Java.</a:t>
+            </a:r>
           </a:p>
           <a:p>
             <a:pPr lvl="1">
               <a:spcBef>
-                <a:spcPts val="1200"/>
+                <a:spcPts val="3000"/>
               </a:spcBef>
             </a:pPr>
             <a:r>
-              <a:rPr lang="pt-BR" dirty="0" smtClean="0"/>
-              <a:t>Referência </a:t>
-            </a:r>
-            <a:r>
-              <a:rPr lang="pt-BR" dirty="0" err="1" smtClean="0"/>
-              <a:t>soft</a:t>
-            </a:r>
-            <a:endParaRPr lang="pt-BR" dirty="0" smtClean="0"/>
-          </a:p>
-          <a:p>
-            <a:pPr lvl="1">
+              <a:rPr lang="pt-BR" sz="2400" dirty="0" smtClean="0"/>
+              <a:t>Referências strong tratam-se de variáveis comuns que apontam para objetos em memória que sempre sobrevivem à passagem do Garbage Collector.</a:t>
+            </a:r>
+          </a:p>
+          <a:p>
+            <a:pPr marL="446088" lvl="1" indent="3175" algn="ctr">
               <a:spcBef>
-                <a:spcPts val="1200"/>
+                <a:spcPts val="0"/>
               </a:spcBef>
+              <a:buNone/>
             </a:pPr>
-            <a:r>
-              <a:rPr lang="pt-BR" dirty="0" smtClean="0"/>
-              <a:t>Referência </a:t>
-            </a:r>
-            <a:r>
-              <a:rPr lang="pt-BR" dirty="0" err="1" smtClean="0"/>
-              <a:t>weak</a:t>
-            </a:r>
-            <a:endParaRPr lang="pt-BR" dirty="0" smtClean="0"/>
-          </a:p>
-          <a:p>
-            <a:pPr lvl="1">
+            <a:endParaRPr lang="pt-BR" sz="2400" dirty="0" smtClean="0">
+              <a:solidFill>
+                <a:srgbClr val="FFC000"/>
+              </a:solidFill>
+            </a:endParaRPr>
+          </a:p>
+          <a:p>
+            <a:pPr marL="1439863" lvl="1" indent="3175">
               <a:spcBef>
-                <a:spcPts val="1200"/>
+                <a:spcPts val="0"/>
               </a:spcBef>
+              <a:buNone/>
             </a:pPr>
             <a:r>
-              <a:rPr lang="pt-BR" dirty="0" smtClean="0"/>
-              <a:t>Referência </a:t>
-            </a:r>
-            <a:r>
-              <a:rPr lang="pt-BR" dirty="0" err="1" smtClean="0"/>
-              <a:t>phantom</a:t>
-            </a:r>
-            <a:endParaRPr lang="pt-BR" dirty="0" smtClean="0"/>
+              <a:rPr lang="pt-BR" sz="2400" dirty="0" smtClean="0">
+                <a:solidFill>
+                  <a:srgbClr val="FFC000"/>
+                </a:solidFill>
+              </a:rPr>
+              <a:t>Cliente c = new Cliente();</a:t>
+            </a:r>
+          </a:p>
+          <a:p>
+            <a:pPr marL="1439863" lvl="1" indent="3175">
+              <a:spcBef>
+                <a:spcPts val="0"/>
+              </a:spcBef>
+              <a:buNone/>
+            </a:pPr>
+            <a:r>
+              <a:rPr lang="pt-BR" sz="2400" dirty="0" smtClean="0"/>
+              <a:t>System.out.println(</a:t>
+            </a:r>
+            <a:r>
+              <a:rPr lang="pt-BR" sz="2400" dirty="0" smtClean="0">
+                <a:solidFill>
+                  <a:srgbClr val="FFC000"/>
+                </a:solidFill>
+              </a:rPr>
+              <a:t>c.getNome()</a:t>
+            </a:r>
+            <a:r>
+              <a:rPr lang="pt-BR" sz="2400" dirty="0" smtClean="0"/>
+              <a:t>);</a:t>
+            </a:r>
+            <a:endParaRPr lang="pt-BR" sz="2400" dirty="0" smtClean="0"/>
           </a:p>
         </p:txBody>
       </p:sp>
@@ -20460,47 +20732,198 @@
             </a:pPr>
             <a:r>
               <a:rPr lang="pt-BR" dirty="0" smtClean="0"/>
-              <a:t>Até o momento temos utilizado variáveis comuns para referenciar objetos em memória.</a:t>
-            </a:r>
-          </a:p>
-          <a:p>
-            <a:pPr>
+              <a:t>Referência </a:t>
+            </a:r>
+            <a:r>
+              <a:rPr lang="pt-BR" b="1" i="1" dirty="0" smtClean="0"/>
+              <a:t>soft</a:t>
+            </a:r>
+            <a:endParaRPr lang="pt-BR" b="1" i="1" dirty="0" smtClean="0"/>
+          </a:p>
+          <a:p>
+            <a:pPr lvl="1">
               <a:spcBef>
-                <a:spcPts val="3000"/>
+                <a:spcPts val="1200"/>
               </a:spcBef>
             </a:pPr>
             <a:r>
-              <a:rPr lang="pt-BR" dirty="0" smtClean="0"/>
-              <a:t>Tais variáveis são chamadas “</a:t>
-            </a:r>
-            <a:r>
-              <a:rPr lang="pt-BR" b="1" i="1" dirty="0" err="1" smtClean="0"/>
-              <a:t>strong</a:t>
-            </a:r>
-            <a:r>
-              <a:rPr lang="pt-BR" dirty="0" smtClean="0"/>
-              <a:t>”.</a:t>
-            </a:r>
-          </a:p>
-          <a:p>
-            <a:pPr>
+              <a:rPr lang="pt-BR" sz="2000" dirty="0" smtClean="0"/>
+              <a:t>Uma referência </a:t>
+            </a:r>
+            <a:r>
+              <a:rPr lang="pt-BR" sz="2000" b="1" i="1" dirty="0" smtClean="0"/>
+              <a:t>soft</a:t>
+            </a:r>
+            <a:r>
+              <a:rPr lang="pt-BR" sz="2000" dirty="0" smtClean="0"/>
+              <a:t> é criada através da classe </a:t>
+            </a:r>
+            <a:r>
+              <a:rPr lang="pt-BR" sz="2000" b="1" i="1" dirty="0" smtClean="0"/>
+              <a:t>java.lang.ref.SoftReference</a:t>
+            </a:r>
+            <a:r>
+              <a:rPr lang="pt-BR" sz="2000" dirty="0" smtClean="0"/>
+              <a:t>:</a:t>
+            </a:r>
+          </a:p>
+          <a:p>
+            <a:pPr lvl="1">
               <a:spcBef>
-                <a:spcPts val="3000"/>
+                <a:spcPts val="1200"/>
               </a:spcBef>
             </a:pPr>
             <a:r>
-              <a:rPr lang="pt-BR" dirty="0" smtClean="0"/>
-              <a:t>Uma variável </a:t>
-            </a:r>
-            <a:r>
-              <a:rPr lang="pt-BR" dirty="0" err="1" smtClean="0"/>
-              <a:t>strong</a:t>
-            </a:r>
-            <a:r>
-              <a:rPr lang="pt-BR" dirty="0" smtClean="0"/>
-              <a:t> é uma variável cujo objeto apontado nunca é coletado pelo GC.</a:t>
-            </a:r>
-            <a:endParaRPr lang="pt-BR" dirty="0"/>
+              <a:rPr lang="pt-BR" sz="2000" dirty="0" smtClean="0"/>
+              <a:t>Objetos em memória que são apontados por referências </a:t>
+            </a:r>
+            <a:r>
+              <a:rPr lang="pt-BR" sz="2000" b="1" i="1" dirty="0" smtClean="0"/>
+              <a:t>soft</a:t>
+            </a:r>
+            <a:r>
+              <a:rPr lang="pt-BR" sz="2000" dirty="0" smtClean="0"/>
+              <a:t> podem ser excluídas </a:t>
+            </a:r>
+            <a:r>
+              <a:rPr lang="pt-BR" sz="2000" dirty="0" smtClean="0"/>
+              <a:t>eliminadas pelo </a:t>
+            </a:r>
+            <a:r>
+              <a:rPr lang="pt-BR" sz="2000" dirty="0" smtClean="0"/>
+              <a:t>GC em situações de memória escassa.</a:t>
+            </a:r>
+            <a:endParaRPr lang="pt-BR" sz="2000" dirty="0" smtClean="0"/>
+          </a:p>
+          <a:p>
+            <a:pPr lvl="1">
+              <a:spcBef>
+                <a:spcPts val="1200"/>
+              </a:spcBef>
+            </a:pPr>
+            <a:r>
+              <a:rPr lang="pt-BR" sz="2000" dirty="0" smtClean="0"/>
+              <a:t>Desta forma, antes de utilizar o objeto, devemos avaliar se o mesmo ainda existe em memória.</a:t>
+            </a:r>
+          </a:p>
+          <a:p>
+            <a:pPr marL="446088" lvl="1" indent="3175">
+              <a:spcBef>
+                <a:spcPts val="0"/>
+              </a:spcBef>
+              <a:buNone/>
+            </a:pPr>
+            <a:endParaRPr lang="pt-BR" sz="1600" dirty="0" smtClean="0">
+              <a:solidFill>
+                <a:srgbClr val="FFC000"/>
+              </a:solidFill>
+            </a:endParaRPr>
+          </a:p>
+          <a:p>
+            <a:pPr marL="446088" lvl="1" indent="3175">
+              <a:spcBef>
+                <a:spcPts val="0"/>
+              </a:spcBef>
+              <a:buNone/>
+            </a:pPr>
+            <a:endParaRPr lang="pt-BR" sz="1600" dirty="0" smtClean="0">
+              <a:solidFill>
+                <a:srgbClr val="FFC000"/>
+              </a:solidFill>
+            </a:endParaRPr>
+          </a:p>
+          <a:p>
+            <a:pPr marL="446088" lvl="1" indent="3175">
+              <a:spcBef>
+                <a:spcPts val="0"/>
+              </a:spcBef>
+              <a:buNone/>
+            </a:pPr>
+            <a:r>
+              <a:rPr lang="pt-BR" sz="1600" dirty="0" smtClean="0">
+                <a:solidFill>
+                  <a:srgbClr val="FFC000"/>
+                </a:solidFill>
+              </a:rPr>
+              <a:t>SoftReference&lt;Cliente&gt; c = new SoftReference&lt;Cliente&gt;(new Cliente());</a:t>
+            </a:r>
+          </a:p>
+          <a:p>
+            <a:pPr marL="446088" lvl="1" indent="3175">
+              <a:spcBef>
+                <a:spcPts val="0"/>
+              </a:spcBef>
+              <a:buNone/>
+            </a:pPr>
+            <a:r>
+              <a:rPr lang="pt-BR" sz="1600" dirty="0" smtClean="0"/>
+              <a:t>...</a:t>
+            </a:r>
+          </a:p>
+          <a:p>
+            <a:pPr marL="446088" lvl="1" indent="3175">
+              <a:spcBef>
+                <a:spcPts val="0"/>
+              </a:spcBef>
+              <a:buNone/>
+            </a:pPr>
+            <a:r>
+              <a:rPr lang="pt-BR" sz="1600" dirty="0" smtClean="0"/>
+              <a:t>if (</a:t>
+            </a:r>
+            <a:r>
+              <a:rPr lang="pt-BR" sz="1600" dirty="0" smtClean="0">
+                <a:solidFill>
+                  <a:srgbClr val="FFC000"/>
+                </a:solidFill>
+              </a:rPr>
+              <a:t>c.get()</a:t>
+            </a:r>
+            <a:r>
+              <a:rPr lang="pt-BR" sz="1600" dirty="0" smtClean="0"/>
+              <a:t> != null) {</a:t>
+            </a:r>
+          </a:p>
+          <a:p>
+            <a:pPr marL="446088" lvl="1" indent="3175">
+              <a:spcBef>
+                <a:spcPts val="0"/>
+              </a:spcBef>
+              <a:buNone/>
+            </a:pPr>
+            <a:r>
+              <a:rPr lang="pt-BR" sz="1600" dirty="0" smtClean="0"/>
+              <a:t>	</a:t>
+            </a:r>
+            <a:r>
+              <a:rPr lang="pt-BR" sz="1600" dirty="0" smtClean="0"/>
+              <a:t>System.out.println(</a:t>
+            </a:r>
+            <a:r>
+              <a:rPr lang="pt-BR" sz="1600" dirty="0" smtClean="0">
+                <a:solidFill>
+                  <a:srgbClr val="FFC000"/>
+                </a:solidFill>
+              </a:rPr>
+              <a:t>c.get()</a:t>
+            </a:r>
+            <a:r>
+              <a:rPr lang="pt-BR" sz="1600" dirty="0" smtClean="0"/>
+              <a:t>.getNome());</a:t>
+            </a:r>
+          </a:p>
+          <a:p>
+            <a:pPr marL="446088" lvl="1" indent="3175">
+              <a:spcBef>
+                <a:spcPts val="0"/>
+              </a:spcBef>
+              <a:buNone/>
+            </a:pPr>
+            <a:r>
+              <a:rPr lang="pt-BR" sz="1600" dirty="0" smtClean="0"/>
+              <a:t>}</a:t>
+            </a:r>
+            <a:endParaRPr lang="pt-BR" sz="1600" dirty="0" smtClean="0"/>
           </a:p>
         </p:txBody>
       </p:sp>
@@ -20545,6 +20968,661 @@
       </p:par>
     </p:tnLst>
   </p:timing>
+</p:sld>
+</file>
+
+<file path=ppt/slides/slide31.xml><?xml version="1.0" encoding="utf-8"?>
+<p:sld xmlns:a="http://schemas.openxmlformats.org/drawingml/2006/main" xmlns:r="http://schemas.openxmlformats.org/officeDocument/2006/relationships" xmlns:p="http://schemas.openxmlformats.org/presentationml/2006/main">
+  <p:cSld>
+    <p:spTree>
+      <p:nvGrpSpPr>
+        <p:cNvPr id="1" name=""/>
+        <p:cNvGrpSpPr/>
+        <p:nvPr/>
+      </p:nvGrpSpPr>
+      <p:grpSpPr>
+        <a:xfrm>
+          <a:off x="0" y="0"/>
+          <a:ext cx="0" cy="0"/>
+          <a:chOff x="0" y="0"/>
+          <a:chExt cx="0" cy="0"/>
+        </a:xfrm>
+      </p:grpSpPr>
+      <p:sp>
+        <p:nvSpPr>
+          <p:cNvPr id="2" name="Título 1"/>
+          <p:cNvSpPr>
+            <a:spLocks noGrp="1"/>
+          </p:cNvSpPr>
+          <p:nvPr>
+            <p:ph type="title"/>
+          </p:nvPr>
+        </p:nvSpPr>
+        <p:spPr/>
+        <p:txBody>
+          <a:bodyPr/>
+          <a:lstStyle/>
+          <a:p>
+            <a:pPr eaLnBrk="1" hangingPunct="1"/>
+            <a:r>
+              <a:rPr lang="pt-BR" dirty="0" smtClean="0"/>
+              <a:t>Tipos de referência</a:t>
+            </a:r>
+            <a:endParaRPr lang="pt-BR" dirty="0"/>
+          </a:p>
+        </p:txBody>
+      </p:sp>
+      <p:sp>
+        <p:nvSpPr>
+          <p:cNvPr id="3" name="Espaço Reservado para Conteúdo 2"/>
+          <p:cNvSpPr>
+            <a:spLocks noGrp="1"/>
+          </p:cNvSpPr>
+          <p:nvPr>
+            <p:ph idx="1"/>
+          </p:nvPr>
+        </p:nvSpPr>
+        <p:spPr>
+          <a:xfrm>
+            <a:off x="457200" y="1600200"/>
+            <a:ext cx="7615262" cy="4525963"/>
+          </a:xfrm>
+        </p:spPr>
+        <p:txBody>
+          <a:bodyPr/>
+          <a:lstStyle/>
+          <a:p>
+            <a:pPr>
+              <a:spcBef>
+                <a:spcPts val="3000"/>
+              </a:spcBef>
+            </a:pPr>
+            <a:r>
+              <a:rPr lang="pt-BR" dirty="0" smtClean="0"/>
+              <a:t>Referência </a:t>
+            </a:r>
+            <a:r>
+              <a:rPr lang="pt-BR" b="1" i="1" dirty="0" smtClean="0"/>
+              <a:t>weak</a:t>
+            </a:r>
+            <a:endParaRPr lang="pt-BR" b="1" i="1" dirty="0" smtClean="0"/>
+          </a:p>
+          <a:p>
+            <a:pPr lvl="1">
+              <a:spcBef>
+                <a:spcPts val="1200"/>
+              </a:spcBef>
+            </a:pPr>
+            <a:r>
+              <a:rPr lang="pt-BR" sz="2000" dirty="0" smtClean="0"/>
+              <a:t>Uma referência </a:t>
+            </a:r>
+            <a:r>
+              <a:rPr lang="pt-BR" sz="2000" b="1" i="1" dirty="0" smtClean="0"/>
+              <a:t>weak </a:t>
+            </a:r>
+            <a:r>
+              <a:rPr lang="pt-BR" sz="2000" dirty="0" smtClean="0"/>
+              <a:t>é criada através da classe </a:t>
+            </a:r>
+            <a:r>
+              <a:rPr lang="pt-BR" sz="2000" b="1" i="1" dirty="0" smtClean="0"/>
+              <a:t>java.lang.ref.WeakReference</a:t>
+            </a:r>
+            <a:r>
+              <a:rPr lang="pt-BR" sz="2000" dirty="0" smtClean="0"/>
+              <a:t>:</a:t>
+            </a:r>
+          </a:p>
+          <a:p>
+            <a:pPr lvl="1">
+              <a:spcBef>
+                <a:spcPts val="1200"/>
+              </a:spcBef>
+            </a:pPr>
+            <a:r>
+              <a:rPr lang="pt-BR" sz="2000" dirty="0" smtClean="0"/>
+              <a:t>Objetos em memória que são apontados por referências </a:t>
+            </a:r>
+            <a:r>
+              <a:rPr lang="pt-BR" sz="2000" b="1" i="1" dirty="0" smtClean="0"/>
+              <a:t>weak</a:t>
+            </a:r>
+            <a:r>
+              <a:rPr lang="pt-BR" sz="2000" dirty="0" smtClean="0"/>
+              <a:t> </a:t>
+            </a:r>
+            <a:r>
+              <a:rPr lang="pt-BR" sz="2000" u="sng" dirty="0" smtClean="0"/>
+              <a:t>sempre são excluídas da memória a cada passagem do GC</a:t>
+            </a:r>
+            <a:r>
+              <a:rPr lang="pt-BR" sz="2000" dirty="0" smtClean="0"/>
+              <a:t>.</a:t>
+            </a:r>
+            <a:endParaRPr lang="pt-BR" sz="2000" dirty="0" smtClean="0"/>
+          </a:p>
+          <a:p>
+            <a:pPr lvl="1">
+              <a:spcBef>
+                <a:spcPts val="1200"/>
+              </a:spcBef>
+            </a:pPr>
+            <a:r>
+              <a:rPr lang="pt-BR" sz="2000" dirty="0" smtClean="0"/>
+              <a:t>Desta forma, também devemos avaliar se o objeto ainda está na memória antes de utlizá-lo.</a:t>
+            </a:r>
+          </a:p>
+          <a:p>
+            <a:pPr marL="446088" lvl="1" indent="3175">
+              <a:spcBef>
+                <a:spcPts val="0"/>
+              </a:spcBef>
+              <a:buNone/>
+            </a:pPr>
+            <a:endParaRPr lang="pt-BR" sz="1600" dirty="0" smtClean="0">
+              <a:solidFill>
+                <a:srgbClr val="FFC000"/>
+              </a:solidFill>
+            </a:endParaRPr>
+          </a:p>
+          <a:p>
+            <a:pPr marL="446088" lvl="1" indent="3175">
+              <a:spcBef>
+                <a:spcPts val="0"/>
+              </a:spcBef>
+              <a:buNone/>
+            </a:pPr>
+            <a:endParaRPr lang="pt-BR" sz="1600" dirty="0" smtClean="0">
+              <a:solidFill>
+                <a:srgbClr val="FFC000"/>
+              </a:solidFill>
+            </a:endParaRPr>
+          </a:p>
+          <a:p>
+            <a:pPr marL="446088" lvl="1" indent="3175">
+              <a:spcBef>
+                <a:spcPts val="0"/>
+              </a:spcBef>
+              <a:buNone/>
+            </a:pPr>
+            <a:r>
+              <a:rPr lang="pt-BR" sz="1600" dirty="0" smtClean="0">
+                <a:solidFill>
+                  <a:srgbClr val="FFC000"/>
+                </a:solidFill>
+              </a:rPr>
+              <a:t>WeakReference&lt;Cliente&gt; c = new WeakReference&lt;Cliente&gt;(new Cliente());</a:t>
+            </a:r>
+          </a:p>
+          <a:p>
+            <a:pPr marL="446088" lvl="1" indent="3175">
+              <a:spcBef>
+                <a:spcPts val="0"/>
+              </a:spcBef>
+              <a:buNone/>
+            </a:pPr>
+            <a:r>
+              <a:rPr lang="pt-BR" sz="1600" dirty="0" smtClean="0"/>
+              <a:t>...</a:t>
+            </a:r>
+          </a:p>
+          <a:p>
+            <a:pPr marL="446088" lvl="1" indent="3175">
+              <a:spcBef>
+                <a:spcPts val="0"/>
+              </a:spcBef>
+              <a:buNone/>
+            </a:pPr>
+            <a:r>
+              <a:rPr lang="pt-BR" sz="1600" dirty="0" smtClean="0"/>
+              <a:t>if (</a:t>
+            </a:r>
+            <a:r>
+              <a:rPr lang="pt-BR" sz="1600" dirty="0" smtClean="0">
+                <a:solidFill>
+                  <a:srgbClr val="FFC000"/>
+                </a:solidFill>
+              </a:rPr>
+              <a:t>c.get()</a:t>
+            </a:r>
+            <a:r>
+              <a:rPr lang="pt-BR" sz="1600" dirty="0" smtClean="0"/>
+              <a:t> != null) {</a:t>
+            </a:r>
+          </a:p>
+          <a:p>
+            <a:pPr marL="446088" lvl="1" indent="3175">
+              <a:spcBef>
+                <a:spcPts val="0"/>
+              </a:spcBef>
+              <a:buNone/>
+            </a:pPr>
+            <a:r>
+              <a:rPr lang="pt-BR" sz="1600" dirty="0" smtClean="0"/>
+              <a:t>	</a:t>
+            </a:r>
+            <a:r>
+              <a:rPr lang="pt-BR" sz="1600" dirty="0" smtClean="0"/>
+              <a:t>System.out.println(</a:t>
+            </a:r>
+            <a:r>
+              <a:rPr lang="pt-BR" sz="1600" dirty="0" smtClean="0">
+                <a:solidFill>
+                  <a:srgbClr val="FFC000"/>
+                </a:solidFill>
+              </a:rPr>
+              <a:t>c.get()</a:t>
+            </a:r>
+            <a:r>
+              <a:rPr lang="pt-BR" sz="1600" dirty="0" smtClean="0"/>
+              <a:t>.getNome());</a:t>
+            </a:r>
+          </a:p>
+          <a:p>
+            <a:pPr marL="446088" lvl="1" indent="3175">
+              <a:spcBef>
+                <a:spcPts val="0"/>
+              </a:spcBef>
+              <a:buNone/>
+            </a:pPr>
+            <a:r>
+              <a:rPr lang="pt-BR" sz="1600" dirty="0" smtClean="0"/>
+              <a:t>}</a:t>
+            </a:r>
+            <a:endParaRPr lang="pt-BR" sz="1600" dirty="0" smtClean="0"/>
+          </a:p>
+        </p:txBody>
+      </p:sp>
+      <p:sp>
+        <p:nvSpPr>
+          <p:cNvPr id="4" name="Espaço Reservado para Número de Slide 3"/>
+          <p:cNvSpPr>
+            <a:spLocks noGrp="1"/>
+          </p:cNvSpPr>
+          <p:nvPr>
+            <p:ph type="sldNum" sz="quarter" idx="12"/>
+          </p:nvPr>
+        </p:nvSpPr>
+        <p:spPr/>
+        <p:txBody>
+          <a:bodyPr/>
+          <a:lstStyle/>
+          <a:p>
+            <a:pPr>
+              <a:defRPr/>
+            </a:pPr>
+            <a:fld id="{21B5E3EF-F5EF-4A0A-A70F-386D7016207D}" type="slidenum">
+              <a:rPr lang="pt-BR" smtClean="0"/>
+              <a:pPr>
+                <a:defRPr/>
+              </a:pPr>
+              <a:t>31</a:t>
+            </a:fld>
+            <a:endParaRPr lang="pt-BR"/>
+          </a:p>
+        </p:txBody>
+      </p:sp>
+    </p:spTree>
+  </p:cSld>
+  <p:clrMapOvr>
+    <a:masterClrMapping/>
+  </p:clrMapOvr>
+  <p:timing>
+    <p:tnLst>
+      <p:par>
+        <p:cTn id="1" dur="indefinite" restart="never" nodeType="tmRoot"/>
+      </p:par>
+    </p:tnLst>
+  </p:timing>
+</p:sld>
+</file>
+
+<file path=ppt/slides/slide32.xml><?xml version="1.0" encoding="utf-8"?>
+<p:sld xmlns:a="http://schemas.openxmlformats.org/drawingml/2006/main" xmlns:r="http://schemas.openxmlformats.org/officeDocument/2006/relationships" xmlns:p="http://schemas.openxmlformats.org/presentationml/2006/main">
+  <p:cSld>
+    <p:spTree>
+      <p:nvGrpSpPr>
+        <p:cNvPr id="1" name=""/>
+        <p:cNvGrpSpPr/>
+        <p:nvPr/>
+      </p:nvGrpSpPr>
+      <p:grpSpPr>
+        <a:xfrm>
+          <a:off x="0" y="0"/>
+          <a:ext cx="0" cy="0"/>
+          <a:chOff x="0" y="0"/>
+          <a:chExt cx="0" cy="0"/>
+        </a:xfrm>
+      </p:grpSpPr>
+      <p:sp>
+        <p:nvSpPr>
+          <p:cNvPr id="2" name="Título 1"/>
+          <p:cNvSpPr>
+            <a:spLocks noGrp="1"/>
+          </p:cNvSpPr>
+          <p:nvPr>
+            <p:ph type="title"/>
+          </p:nvPr>
+        </p:nvSpPr>
+        <p:spPr/>
+        <p:txBody>
+          <a:bodyPr/>
+          <a:lstStyle/>
+          <a:p>
+            <a:pPr eaLnBrk="1" hangingPunct="1"/>
+            <a:r>
+              <a:rPr lang="pt-BR" dirty="0" smtClean="0"/>
+              <a:t>Tipos de referência</a:t>
+            </a:r>
+            <a:endParaRPr lang="pt-BR" dirty="0"/>
+          </a:p>
+        </p:txBody>
+      </p:sp>
+      <p:sp>
+        <p:nvSpPr>
+          <p:cNvPr id="3" name="Espaço Reservado para Conteúdo 2"/>
+          <p:cNvSpPr>
+            <a:spLocks noGrp="1"/>
+          </p:cNvSpPr>
+          <p:nvPr>
+            <p:ph idx="1"/>
+          </p:nvPr>
+        </p:nvSpPr>
+        <p:spPr>
+          <a:xfrm>
+            <a:off x="457200" y="1600200"/>
+            <a:ext cx="7615262" cy="4525963"/>
+          </a:xfrm>
+        </p:spPr>
+        <p:txBody>
+          <a:bodyPr/>
+          <a:lstStyle/>
+          <a:p>
+            <a:pPr>
+              <a:spcBef>
+                <a:spcPts val="3000"/>
+              </a:spcBef>
+            </a:pPr>
+            <a:r>
+              <a:rPr lang="pt-BR" dirty="0" smtClean="0"/>
+              <a:t>Referência </a:t>
+            </a:r>
+            <a:r>
+              <a:rPr lang="pt-BR" b="1" i="1" dirty="0" smtClean="0"/>
+              <a:t>phantom</a:t>
+            </a:r>
+            <a:endParaRPr lang="pt-BR" b="1" i="1" dirty="0" smtClean="0"/>
+          </a:p>
+          <a:p>
+            <a:pPr lvl="1">
+              <a:spcBef>
+                <a:spcPts val="1200"/>
+              </a:spcBef>
+            </a:pPr>
+            <a:r>
+              <a:rPr lang="pt-BR" sz="2000" dirty="0" smtClean="0"/>
+              <a:t>Uma referência </a:t>
+            </a:r>
+            <a:r>
+              <a:rPr lang="pt-BR" sz="2000" b="1" i="1" dirty="0" smtClean="0"/>
+              <a:t>phantom </a:t>
+            </a:r>
+            <a:r>
+              <a:rPr lang="pt-BR" sz="2000" dirty="0" smtClean="0"/>
+              <a:t>é criada através da classe </a:t>
+            </a:r>
+            <a:r>
+              <a:rPr lang="pt-BR" sz="2000" b="1" i="1" dirty="0" smtClean="0"/>
+              <a:t>java.lang.ref.PhantomReference</a:t>
+            </a:r>
+            <a:r>
+              <a:rPr lang="pt-BR" sz="2000" dirty="0" smtClean="0"/>
+              <a:t>:</a:t>
+            </a:r>
+          </a:p>
+          <a:p>
+            <a:pPr lvl="1">
+              <a:spcBef>
+                <a:spcPts val="1200"/>
+              </a:spcBef>
+            </a:pPr>
+            <a:r>
+              <a:rPr lang="pt-BR" sz="2000" dirty="0" smtClean="0"/>
+              <a:t>Referências do tipo phantom representam objetos que já foram finalizados pelo GC mas ainda não foram desalocados da memória.</a:t>
+            </a:r>
+          </a:p>
+          <a:p>
+            <a:pPr marL="446088" lvl="1" indent="3175">
+              <a:spcBef>
+                <a:spcPts val="0"/>
+              </a:spcBef>
+              <a:buNone/>
+            </a:pPr>
+            <a:endParaRPr lang="pt-BR" sz="1600" dirty="0" smtClean="0">
+              <a:solidFill>
+                <a:srgbClr val="FFC000"/>
+              </a:solidFill>
+            </a:endParaRPr>
+          </a:p>
+          <a:p>
+            <a:pPr marL="446088" lvl="1" indent="3175">
+              <a:spcBef>
+                <a:spcPts val="0"/>
+              </a:spcBef>
+              <a:buNone/>
+            </a:pPr>
+            <a:endParaRPr lang="pt-BR" sz="1600" dirty="0" smtClean="0">
+              <a:solidFill>
+                <a:srgbClr val="FFC000"/>
+              </a:solidFill>
+            </a:endParaRPr>
+          </a:p>
+          <a:p>
+            <a:pPr marL="446088" lvl="1" indent="3175">
+              <a:spcBef>
+                <a:spcPts val="0"/>
+              </a:spcBef>
+              <a:buNone/>
+            </a:pPr>
+            <a:r>
+              <a:rPr lang="pt-BR" sz="1800" dirty="0" smtClean="0">
+                <a:solidFill>
+                  <a:srgbClr val="FFC000"/>
+                </a:solidFill>
+              </a:rPr>
+              <a:t>PhantomReference&lt;Cliente&gt; c =</a:t>
+            </a:r>
+          </a:p>
+          <a:p>
+            <a:pPr marL="446088" lvl="1" indent="3175">
+              <a:spcBef>
+                <a:spcPts val="0"/>
+              </a:spcBef>
+              <a:buNone/>
+            </a:pPr>
+            <a:r>
+              <a:rPr lang="pt-BR" sz="1800" dirty="0" smtClean="0">
+                <a:solidFill>
+                  <a:srgbClr val="FFC000"/>
+                </a:solidFill>
+              </a:rPr>
+              <a:t>	</a:t>
+            </a:r>
+            <a:r>
+              <a:rPr lang="pt-BR" sz="1800" dirty="0" smtClean="0">
+                <a:solidFill>
+                  <a:srgbClr val="FFC000"/>
+                </a:solidFill>
+              </a:rPr>
+              <a:t>	new </a:t>
+            </a:r>
+            <a:r>
+              <a:rPr lang="pt-BR" sz="1800" dirty="0" smtClean="0">
+                <a:solidFill>
+                  <a:srgbClr val="FFC000"/>
+                </a:solidFill>
+              </a:rPr>
+              <a:t>Phantom</a:t>
+            </a:r>
+            <a:r>
+              <a:rPr lang="pt-BR" sz="1800" dirty="0" smtClean="0">
+                <a:solidFill>
+                  <a:srgbClr val="FFC000"/>
+                </a:solidFill>
+              </a:rPr>
+              <a:t>Reference&lt;Cliente&gt;(new Cliente());</a:t>
+            </a:r>
+          </a:p>
+        </p:txBody>
+      </p:sp>
+      <p:sp>
+        <p:nvSpPr>
+          <p:cNvPr id="4" name="Espaço Reservado para Número de Slide 3"/>
+          <p:cNvSpPr>
+            <a:spLocks noGrp="1"/>
+          </p:cNvSpPr>
+          <p:nvPr>
+            <p:ph type="sldNum" sz="quarter" idx="12"/>
+          </p:nvPr>
+        </p:nvSpPr>
+        <p:spPr/>
+        <p:txBody>
+          <a:bodyPr/>
+          <a:lstStyle/>
+          <a:p>
+            <a:pPr>
+              <a:defRPr/>
+            </a:pPr>
+            <a:fld id="{21B5E3EF-F5EF-4A0A-A70F-386D7016207D}" type="slidenum">
+              <a:rPr lang="pt-BR" smtClean="0"/>
+              <a:pPr>
+                <a:defRPr/>
+              </a:pPr>
+              <a:t>32</a:t>
+            </a:fld>
+            <a:endParaRPr lang="pt-BR"/>
+          </a:p>
+        </p:txBody>
+      </p:sp>
+    </p:spTree>
+  </p:cSld>
+  <p:clrMapOvr>
+    <a:masterClrMapping/>
+  </p:clrMapOvr>
+  <p:timing>
+    <p:tnLst>
+      <p:par>
+        <p:cTn id="1" dur="indefinite" restart="never" nodeType="tmRoot"/>
+      </p:par>
+    </p:tnLst>
+  </p:timing>
+</p:sld>
+</file>
+
+<file path=ppt/slides/slide33.xml><?xml version="1.0" encoding="utf-8"?>
+<p:sld xmlns:a="http://schemas.openxmlformats.org/drawingml/2006/main" xmlns:r="http://schemas.openxmlformats.org/officeDocument/2006/relationships" xmlns:p="http://schemas.openxmlformats.org/presentationml/2006/main">
+  <p:cSld>
+    <p:spTree>
+      <p:nvGrpSpPr>
+        <p:cNvPr id="1" name=""/>
+        <p:cNvGrpSpPr/>
+        <p:nvPr/>
+      </p:nvGrpSpPr>
+      <p:grpSpPr>
+        <a:xfrm>
+          <a:off x="0" y="0"/>
+          <a:ext cx="0" cy="0"/>
+          <a:chOff x="0" y="0"/>
+          <a:chExt cx="0" cy="0"/>
+        </a:xfrm>
+      </p:grpSpPr>
+      <p:sp>
+        <p:nvSpPr>
+          <p:cNvPr id="2" name="Title 1"/>
+          <p:cNvSpPr>
+            <a:spLocks noGrp="1"/>
+          </p:cNvSpPr>
+          <p:nvPr>
+            <p:ph type="title"/>
+          </p:nvPr>
+        </p:nvSpPr>
+        <p:spPr/>
+        <p:txBody>
+          <a:bodyPr/>
+          <a:lstStyle/>
+          <a:p>
+            <a:r>
+              <a:rPr lang="pt-BR" smtClean="0"/>
+              <a:t>Exercícios</a:t>
+            </a:r>
+            <a:endParaRPr lang="pt-BR" dirty="0"/>
+          </a:p>
+        </p:txBody>
+      </p:sp>
+      <p:sp>
+        <p:nvSpPr>
+          <p:cNvPr id="3" name="Content Placeholder 2"/>
+          <p:cNvSpPr>
+            <a:spLocks noGrp="1"/>
+          </p:cNvSpPr>
+          <p:nvPr>
+            <p:ph idx="1"/>
+          </p:nvPr>
+        </p:nvSpPr>
+        <p:spPr/>
+        <p:txBody>
+          <a:bodyPr/>
+          <a:lstStyle/>
+          <a:p>
+            <a:r>
+              <a:rPr lang="pt-BR" dirty="0" smtClean="0"/>
+              <a:t>Fixação 1</a:t>
+            </a:r>
+          </a:p>
+          <a:p>
+            <a:r>
+              <a:rPr lang="pt-BR" dirty="0" smtClean="0"/>
+              <a:t>Fixação 2</a:t>
+            </a:r>
+            <a:endParaRPr lang="pt-BR" dirty="0"/>
+          </a:p>
+        </p:txBody>
+      </p:sp>
+      <p:sp>
+        <p:nvSpPr>
+          <p:cNvPr id="4" name="Slide Number Placeholder 3"/>
+          <p:cNvSpPr>
+            <a:spLocks noGrp="1"/>
+          </p:cNvSpPr>
+          <p:nvPr>
+            <p:ph type="sldNum" sz="quarter" idx="12"/>
+          </p:nvPr>
+        </p:nvSpPr>
+        <p:spPr/>
+        <p:txBody>
+          <a:bodyPr/>
+          <a:lstStyle/>
+          <a:p>
+            <a:pPr>
+              <a:defRPr/>
+            </a:pPr>
+            <a:fld id="{21B5E3EF-F5EF-4A0A-A70F-386D7016207D}" type="slidenum">
+              <a:rPr lang="pt-BR" smtClean="0"/>
+              <a:pPr>
+                <a:defRPr/>
+              </a:pPr>
+              <a:t>33</a:t>
+            </a:fld>
+            <a:endParaRPr lang="pt-BR"/>
+          </a:p>
+        </p:txBody>
+      </p:sp>
+    </p:spTree>
+  </p:cSld>
+  <p:clrMapOvr>
+    <a:masterClrMapping/>
+  </p:clrMapOvr>
 </p:sld>
 </file>
 

</xml_diff>